<commit_message>
Updated Presentation with Text for speaking
</commit_message>
<xml_diff>
--- a/Presentation/Presentation.pptx
+++ b/Presentation/Presentation.pptx
@@ -4,6 +4,9 @@
   <p:sldMasterIdLst>
     <p:sldMasterId id="2147483648" r:id="rId1"/>
   </p:sldMasterIdLst>
+  <p:notesMasterIdLst>
+    <p:notesMasterId r:id="rId21"/>
+  </p:notesMasterIdLst>
   <p:sldIdLst>
     <p:sldId id="256" r:id="rId2"/>
     <p:sldId id="267" r:id="rId3"/>
@@ -11,17 +14,19 @@
     <p:sldId id="271" r:id="rId5"/>
     <p:sldId id="257" r:id="rId6"/>
     <p:sldId id="268" r:id="rId7"/>
-    <p:sldId id="261" r:id="rId8"/>
-    <p:sldId id="274" r:id="rId9"/>
-    <p:sldId id="272" r:id="rId10"/>
-    <p:sldId id="265" r:id="rId11"/>
-    <p:sldId id="273" r:id="rId12"/>
-    <p:sldId id="269" r:id="rId13"/>
-    <p:sldId id="264" r:id="rId14"/>
-    <p:sldId id="275" r:id="rId15"/>
-    <p:sldId id="266" r:id="rId16"/>
-    <p:sldId id="270" r:id="rId17"/>
-    <p:sldId id="259" r:id="rId18"/>
+    <p:sldId id="277" r:id="rId8"/>
+    <p:sldId id="276" r:id="rId9"/>
+    <p:sldId id="261" r:id="rId10"/>
+    <p:sldId id="274" r:id="rId11"/>
+    <p:sldId id="272" r:id="rId12"/>
+    <p:sldId id="265" r:id="rId13"/>
+    <p:sldId id="273" r:id="rId14"/>
+    <p:sldId id="269" r:id="rId15"/>
+    <p:sldId id="264" r:id="rId16"/>
+    <p:sldId id="275" r:id="rId17"/>
+    <p:sldId id="266" r:id="rId18"/>
+    <p:sldId id="270" r:id="rId19"/>
+    <p:sldId id="259" r:id="rId20"/>
   </p:sldIdLst>
   <p:sldSz cx="12192000" cy="6858000"/>
   <p:notesSz cx="6858000" cy="9144000"/>
@@ -149,6 +154,2244 @@
     </p:extLst>
   </p:cmAuthor>
 </p:cmAuthorLst>
+</file>
+
+<file path=ppt/notesMasters/notesMaster1.xml><?xml version="1.0" encoding="utf-8"?>
+<p:notesMaster xmlns:a="http://schemas.openxmlformats.org/drawingml/2006/main" xmlns:r="http://schemas.openxmlformats.org/officeDocument/2006/relationships" xmlns:p="http://schemas.openxmlformats.org/presentationml/2006/main">
+  <p:cSld>
+    <p:bg>
+      <p:bgRef idx="1001">
+        <a:schemeClr val="bg1"/>
+      </p:bgRef>
+    </p:bg>
+    <p:spTree>
+      <p:nvGrpSpPr>
+        <p:cNvPr id="1" name=""/>
+        <p:cNvGrpSpPr/>
+        <p:nvPr/>
+      </p:nvGrpSpPr>
+      <p:grpSpPr>
+        <a:xfrm>
+          <a:off x="0" y="0"/>
+          <a:ext cx="0" cy="0"/>
+          <a:chOff x="0" y="0"/>
+          <a:chExt cx="0" cy="0"/>
+        </a:xfrm>
+      </p:grpSpPr>
+      <p:sp>
+        <p:nvSpPr>
+          <p:cNvPr id="2" name="Zástupný symbol pro záhlaví 1"/>
+          <p:cNvSpPr>
+            <a:spLocks noGrp="1"/>
+          </p:cNvSpPr>
+          <p:nvPr>
+            <p:ph type="hdr" sz="quarter"/>
+          </p:nvPr>
+        </p:nvSpPr>
+        <p:spPr>
+          <a:xfrm>
+            <a:off x="0" y="0"/>
+            <a:ext cx="2971800" cy="458788"/>
+          </a:xfrm>
+          <a:prstGeom prst="rect">
+            <a:avLst/>
+          </a:prstGeom>
+        </p:spPr>
+        <p:txBody>
+          <a:bodyPr vert="horz" lIns="91440" tIns="45720" rIns="91440" bIns="45720" rtlCol="0"/>
+          <a:lstStyle>
+            <a:lvl1pPr algn="l">
+              <a:defRPr sz="1200"/>
+            </a:lvl1pPr>
+          </a:lstStyle>
+          <a:p>
+            <a:endParaRPr lang="cs-CZ"/>
+          </a:p>
+        </p:txBody>
+      </p:sp>
+      <p:sp>
+        <p:nvSpPr>
+          <p:cNvPr id="3" name="Zástupný symbol pro datum 2"/>
+          <p:cNvSpPr>
+            <a:spLocks noGrp="1"/>
+          </p:cNvSpPr>
+          <p:nvPr>
+            <p:ph type="dt" idx="1"/>
+          </p:nvPr>
+        </p:nvSpPr>
+        <p:spPr>
+          <a:xfrm>
+            <a:off x="3884613" y="0"/>
+            <a:ext cx="2971800" cy="458788"/>
+          </a:xfrm>
+          <a:prstGeom prst="rect">
+            <a:avLst/>
+          </a:prstGeom>
+        </p:spPr>
+        <p:txBody>
+          <a:bodyPr vert="horz" lIns="91440" tIns="45720" rIns="91440" bIns="45720" rtlCol="0"/>
+          <a:lstStyle>
+            <a:lvl1pPr algn="r">
+              <a:defRPr sz="1200"/>
+            </a:lvl1pPr>
+          </a:lstStyle>
+          <a:p>
+            <a:fld id="{2610D134-D424-48DC-B576-06513DB14862}" type="datetimeFigureOut">
+              <a:rPr lang="cs-CZ" smtClean="0"/>
+              <a:t>13.05.2017</a:t>
+            </a:fld>
+            <a:endParaRPr lang="cs-CZ"/>
+          </a:p>
+        </p:txBody>
+      </p:sp>
+      <p:sp>
+        <p:nvSpPr>
+          <p:cNvPr id="4" name="Zástupný symbol pro obrázek snímku 3"/>
+          <p:cNvSpPr>
+            <a:spLocks noGrp="1" noRot="1" noChangeAspect="1"/>
+          </p:cNvSpPr>
+          <p:nvPr>
+            <p:ph type="sldImg" idx="2"/>
+          </p:nvPr>
+        </p:nvSpPr>
+        <p:spPr>
+          <a:xfrm>
+            <a:off x="685800" y="1143000"/>
+            <a:ext cx="5486400" cy="3086100"/>
+          </a:xfrm>
+          <a:prstGeom prst="rect">
+            <a:avLst/>
+          </a:prstGeom>
+          <a:noFill/>
+          <a:ln w="12700">
+            <a:solidFill>
+              <a:prstClr val="black"/>
+            </a:solidFill>
+          </a:ln>
+        </p:spPr>
+        <p:txBody>
+          <a:bodyPr vert="horz" lIns="91440" tIns="45720" rIns="91440" bIns="45720" rtlCol="0" anchor="ctr"/>
+          <a:lstStyle/>
+          <a:p>
+            <a:endParaRPr lang="cs-CZ"/>
+          </a:p>
+        </p:txBody>
+      </p:sp>
+      <p:sp>
+        <p:nvSpPr>
+          <p:cNvPr id="5" name="Zástupný symbol pro poznámky 4"/>
+          <p:cNvSpPr>
+            <a:spLocks noGrp="1"/>
+          </p:cNvSpPr>
+          <p:nvPr>
+            <p:ph type="body" sz="quarter" idx="3"/>
+          </p:nvPr>
+        </p:nvSpPr>
+        <p:spPr>
+          <a:xfrm>
+            <a:off x="685800" y="4400550"/>
+            <a:ext cx="5486400" cy="3600450"/>
+          </a:xfrm>
+          <a:prstGeom prst="rect">
+            <a:avLst/>
+          </a:prstGeom>
+        </p:spPr>
+        <p:txBody>
+          <a:bodyPr vert="horz" lIns="91440" tIns="45720" rIns="91440" bIns="45720" rtlCol="0"/>
+          <a:lstStyle/>
+          <a:p>
+            <a:pPr lvl="0"/>
+            <a:r>
+              <a:rPr lang="cs-CZ" smtClean="0"/>
+              <a:t>Upravte styly předlohy textu.</a:t>
+            </a:r>
+          </a:p>
+          <a:p>
+            <a:pPr lvl="1"/>
+            <a:r>
+              <a:rPr lang="cs-CZ" smtClean="0"/>
+              <a:t>Druhá úroveň</a:t>
+            </a:r>
+          </a:p>
+          <a:p>
+            <a:pPr lvl="2"/>
+            <a:r>
+              <a:rPr lang="cs-CZ" smtClean="0"/>
+              <a:t>Třetí úroveň</a:t>
+            </a:r>
+          </a:p>
+          <a:p>
+            <a:pPr lvl="3"/>
+            <a:r>
+              <a:rPr lang="cs-CZ" smtClean="0"/>
+              <a:t>Čtvrtá úroveň</a:t>
+            </a:r>
+          </a:p>
+          <a:p>
+            <a:pPr lvl="4"/>
+            <a:r>
+              <a:rPr lang="cs-CZ" smtClean="0"/>
+              <a:t>Pátá úroveň</a:t>
+            </a:r>
+            <a:endParaRPr lang="cs-CZ"/>
+          </a:p>
+        </p:txBody>
+      </p:sp>
+      <p:sp>
+        <p:nvSpPr>
+          <p:cNvPr id="6" name="Zástupný symbol pro zápatí 5"/>
+          <p:cNvSpPr>
+            <a:spLocks noGrp="1"/>
+          </p:cNvSpPr>
+          <p:nvPr>
+            <p:ph type="ftr" sz="quarter" idx="4"/>
+          </p:nvPr>
+        </p:nvSpPr>
+        <p:spPr>
+          <a:xfrm>
+            <a:off x="0" y="8685213"/>
+            <a:ext cx="2971800" cy="458787"/>
+          </a:xfrm>
+          <a:prstGeom prst="rect">
+            <a:avLst/>
+          </a:prstGeom>
+        </p:spPr>
+        <p:txBody>
+          <a:bodyPr vert="horz" lIns="91440" tIns="45720" rIns="91440" bIns="45720" rtlCol="0" anchor="b"/>
+          <a:lstStyle>
+            <a:lvl1pPr algn="l">
+              <a:defRPr sz="1200"/>
+            </a:lvl1pPr>
+          </a:lstStyle>
+          <a:p>
+            <a:endParaRPr lang="cs-CZ"/>
+          </a:p>
+        </p:txBody>
+      </p:sp>
+      <p:sp>
+        <p:nvSpPr>
+          <p:cNvPr id="7" name="Zástupný symbol pro číslo snímku 6"/>
+          <p:cNvSpPr>
+            <a:spLocks noGrp="1"/>
+          </p:cNvSpPr>
+          <p:nvPr>
+            <p:ph type="sldNum" sz="quarter" idx="5"/>
+          </p:nvPr>
+        </p:nvSpPr>
+        <p:spPr>
+          <a:xfrm>
+            <a:off x="3884613" y="8685213"/>
+            <a:ext cx="2971800" cy="458787"/>
+          </a:xfrm>
+          <a:prstGeom prst="rect">
+            <a:avLst/>
+          </a:prstGeom>
+        </p:spPr>
+        <p:txBody>
+          <a:bodyPr vert="horz" lIns="91440" tIns="45720" rIns="91440" bIns="45720" rtlCol="0" anchor="b"/>
+          <a:lstStyle>
+            <a:lvl1pPr algn="r">
+              <a:defRPr sz="1200"/>
+            </a:lvl1pPr>
+          </a:lstStyle>
+          <a:p>
+            <a:fld id="{6FA6E7A2-E6B5-47DC-8D32-382F19FA4CCF}" type="slidenum">
+              <a:rPr lang="cs-CZ" smtClean="0"/>
+              <a:t>‹#›</a:t>
+            </a:fld>
+            <a:endParaRPr lang="cs-CZ"/>
+          </a:p>
+        </p:txBody>
+      </p:sp>
+    </p:spTree>
+    <p:extLst>
+      <p:ext uri="{BB962C8B-B14F-4D97-AF65-F5344CB8AC3E}">
+        <p14:creationId xmlns:p14="http://schemas.microsoft.com/office/powerpoint/2010/main" val="3369794857"/>
+      </p:ext>
+    </p:extLst>
+  </p:cSld>
+  <p:clrMap bg1="lt1" tx1="dk1" bg2="lt2" tx2="dk2" accent1="accent1" accent2="accent2" accent3="accent3" accent4="accent4" accent5="accent5" accent6="accent6" hlink="hlink" folHlink="folHlink"/>
+  <p:notesStyle>
+    <a:lvl1pPr marL="0" algn="l" defTabSz="914400" rtl="0" eaLnBrk="1" latinLnBrk="0" hangingPunct="1">
+      <a:defRPr sz="1200" kern="1200">
+        <a:solidFill>
+          <a:schemeClr val="tx1"/>
+        </a:solidFill>
+        <a:latin typeface="+mn-lt"/>
+        <a:ea typeface="+mn-ea"/>
+        <a:cs typeface="+mn-cs"/>
+      </a:defRPr>
+    </a:lvl1pPr>
+    <a:lvl2pPr marL="457200" algn="l" defTabSz="914400" rtl="0" eaLnBrk="1" latinLnBrk="0" hangingPunct="1">
+      <a:defRPr sz="1200" kern="1200">
+        <a:solidFill>
+          <a:schemeClr val="tx1"/>
+        </a:solidFill>
+        <a:latin typeface="+mn-lt"/>
+        <a:ea typeface="+mn-ea"/>
+        <a:cs typeface="+mn-cs"/>
+      </a:defRPr>
+    </a:lvl2pPr>
+    <a:lvl3pPr marL="914400" algn="l" defTabSz="914400" rtl="0" eaLnBrk="1" latinLnBrk="0" hangingPunct="1">
+      <a:defRPr sz="1200" kern="1200">
+        <a:solidFill>
+          <a:schemeClr val="tx1"/>
+        </a:solidFill>
+        <a:latin typeface="+mn-lt"/>
+        <a:ea typeface="+mn-ea"/>
+        <a:cs typeface="+mn-cs"/>
+      </a:defRPr>
+    </a:lvl3pPr>
+    <a:lvl4pPr marL="1371600" algn="l" defTabSz="914400" rtl="0" eaLnBrk="1" latinLnBrk="0" hangingPunct="1">
+      <a:defRPr sz="1200" kern="1200">
+        <a:solidFill>
+          <a:schemeClr val="tx1"/>
+        </a:solidFill>
+        <a:latin typeface="+mn-lt"/>
+        <a:ea typeface="+mn-ea"/>
+        <a:cs typeface="+mn-cs"/>
+      </a:defRPr>
+    </a:lvl4pPr>
+    <a:lvl5pPr marL="1828800" algn="l" defTabSz="914400" rtl="0" eaLnBrk="1" latinLnBrk="0" hangingPunct="1">
+      <a:defRPr sz="1200" kern="1200">
+        <a:solidFill>
+          <a:schemeClr val="tx1"/>
+        </a:solidFill>
+        <a:latin typeface="+mn-lt"/>
+        <a:ea typeface="+mn-ea"/>
+        <a:cs typeface="+mn-cs"/>
+      </a:defRPr>
+    </a:lvl5pPr>
+    <a:lvl6pPr marL="2286000" algn="l" defTabSz="914400" rtl="0" eaLnBrk="1" latinLnBrk="0" hangingPunct="1">
+      <a:defRPr sz="1200" kern="1200">
+        <a:solidFill>
+          <a:schemeClr val="tx1"/>
+        </a:solidFill>
+        <a:latin typeface="+mn-lt"/>
+        <a:ea typeface="+mn-ea"/>
+        <a:cs typeface="+mn-cs"/>
+      </a:defRPr>
+    </a:lvl6pPr>
+    <a:lvl7pPr marL="2743200" algn="l" defTabSz="914400" rtl="0" eaLnBrk="1" latinLnBrk="0" hangingPunct="1">
+      <a:defRPr sz="1200" kern="1200">
+        <a:solidFill>
+          <a:schemeClr val="tx1"/>
+        </a:solidFill>
+        <a:latin typeface="+mn-lt"/>
+        <a:ea typeface="+mn-ea"/>
+        <a:cs typeface="+mn-cs"/>
+      </a:defRPr>
+    </a:lvl7pPr>
+    <a:lvl8pPr marL="3200400" algn="l" defTabSz="914400" rtl="0" eaLnBrk="1" latinLnBrk="0" hangingPunct="1">
+      <a:defRPr sz="1200" kern="1200">
+        <a:solidFill>
+          <a:schemeClr val="tx1"/>
+        </a:solidFill>
+        <a:latin typeface="+mn-lt"/>
+        <a:ea typeface="+mn-ea"/>
+        <a:cs typeface="+mn-cs"/>
+      </a:defRPr>
+    </a:lvl8pPr>
+    <a:lvl9pPr marL="3657600" algn="l" defTabSz="914400" rtl="0" eaLnBrk="1" latinLnBrk="0" hangingPunct="1">
+      <a:defRPr sz="1200" kern="1200">
+        <a:solidFill>
+          <a:schemeClr val="tx1"/>
+        </a:solidFill>
+        <a:latin typeface="+mn-lt"/>
+        <a:ea typeface="+mn-ea"/>
+        <a:cs typeface="+mn-cs"/>
+      </a:defRPr>
+    </a:lvl9pPr>
+  </p:notesStyle>
+</p:notesMaster>
+</file>
+
+<file path=ppt/notesSlides/notesSlide1.xml><?xml version="1.0" encoding="utf-8"?>
+<p:notes xmlns:a="http://schemas.openxmlformats.org/drawingml/2006/main" xmlns:r="http://schemas.openxmlformats.org/officeDocument/2006/relationships" xmlns:p="http://schemas.openxmlformats.org/presentationml/2006/main">
+  <p:cSld>
+    <p:spTree>
+      <p:nvGrpSpPr>
+        <p:cNvPr id="1" name=""/>
+        <p:cNvGrpSpPr/>
+        <p:nvPr/>
+      </p:nvGrpSpPr>
+      <p:grpSpPr>
+        <a:xfrm>
+          <a:off x="0" y="0"/>
+          <a:ext cx="0" cy="0"/>
+          <a:chOff x="0" y="0"/>
+          <a:chExt cx="0" cy="0"/>
+        </a:xfrm>
+      </p:grpSpPr>
+      <p:sp>
+        <p:nvSpPr>
+          <p:cNvPr id="2" name="Zástupný symbol pro obrázek snímku 1"/>
+          <p:cNvSpPr>
+            <a:spLocks noGrp="1" noRot="1" noChangeAspect="1"/>
+          </p:cNvSpPr>
+          <p:nvPr>
+            <p:ph type="sldImg"/>
+          </p:nvPr>
+        </p:nvSpPr>
+        <p:spPr/>
+      </p:sp>
+      <p:sp>
+        <p:nvSpPr>
+          <p:cNvPr id="3" name="Zástupný symbol pro poznámky 2"/>
+          <p:cNvSpPr>
+            <a:spLocks noGrp="1"/>
+          </p:cNvSpPr>
+          <p:nvPr>
+            <p:ph type="body" idx="1"/>
+          </p:nvPr>
+        </p:nvSpPr>
+        <p:spPr/>
+        <p:txBody>
+          <a:bodyPr/>
+          <a:lstStyle/>
+          <a:p>
+            <a:r>
+              <a:rPr lang="cs-CZ" dirty="0" smtClean="0"/>
+              <a:t>Dobrý</a:t>
+            </a:r>
+            <a:r>
+              <a:rPr lang="cs-CZ" baseline="0" dirty="0" smtClean="0"/>
+              <a:t> den, nyní vám představím náš projekt na předmět řízení databází, který byl rozdělen do 3 fází.</a:t>
+            </a:r>
+            <a:endParaRPr lang="cs-CZ" dirty="0"/>
+          </a:p>
+        </p:txBody>
+      </p:sp>
+      <p:sp>
+        <p:nvSpPr>
+          <p:cNvPr id="4" name="Zástupný symbol pro číslo snímku 3"/>
+          <p:cNvSpPr>
+            <a:spLocks noGrp="1"/>
+          </p:cNvSpPr>
+          <p:nvPr>
+            <p:ph type="sldNum" sz="quarter" idx="10"/>
+          </p:nvPr>
+        </p:nvSpPr>
+        <p:spPr/>
+        <p:txBody>
+          <a:bodyPr/>
+          <a:lstStyle/>
+          <a:p>
+            <a:fld id="{6FA6E7A2-E6B5-47DC-8D32-382F19FA4CCF}" type="slidenum">
+              <a:rPr lang="cs-CZ" smtClean="0"/>
+              <a:t>1</a:t>
+            </a:fld>
+            <a:endParaRPr lang="cs-CZ" dirty="0"/>
+          </a:p>
+        </p:txBody>
+      </p:sp>
+    </p:spTree>
+    <p:extLst>
+      <p:ext uri="{BB962C8B-B14F-4D97-AF65-F5344CB8AC3E}">
+        <p14:creationId xmlns:p14="http://schemas.microsoft.com/office/powerpoint/2010/main" val="3027976476"/>
+      </p:ext>
+    </p:extLst>
+  </p:cSld>
+  <p:clrMapOvr>
+    <a:masterClrMapping/>
+  </p:clrMapOvr>
+</p:notes>
+</file>
+
+<file path=ppt/notesSlides/notesSlide10.xml><?xml version="1.0" encoding="utf-8"?>
+<p:notes xmlns:a="http://schemas.openxmlformats.org/drawingml/2006/main" xmlns:r="http://schemas.openxmlformats.org/officeDocument/2006/relationships" xmlns:p="http://schemas.openxmlformats.org/presentationml/2006/main">
+  <p:cSld>
+    <p:spTree>
+      <p:nvGrpSpPr>
+        <p:cNvPr id="1" name=""/>
+        <p:cNvGrpSpPr/>
+        <p:nvPr/>
+      </p:nvGrpSpPr>
+      <p:grpSpPr>
+        <a:xfrm>
+          <a:off x="0" y="0"/>
+          <a:ext cx="0" cy="0"/>
+          <a:chOff x="0" y="0"/>
+          <a:chExt cx="0" cy="0"/>
+        </a:xfrm>
+      </p:grpSpPr>
+      <p:sp>
+        <p:nvSpPr>
+          <p:cNvPr id="2" name="Zástupný symbol pro obrázek snímku 1"/>
+          <p:cNvSpPr>
+            <a:spLocks noGrp="1" noRot="1" noChangeAspect="1"/>
+          </p:cNvSpPr>
+          <p:nvPr>
+            <p:ph type="sldImg"/>
+          </p:nvPr>
+        </p:nvSpPr>
+        <p:spPr/>
+      </p:sp>
+      <p:sp>
+        <p:nvSpPr>
+          <p:cNvPr id="3" name="Zástupný symbol pro poznámky 2"/>
+          <p:cNvSpPr>
+            <a:spLocks noGrp="1"/>
+          </p:cNvSpPr>
+          <p:nvPr>
+            <p:ph type="body" idx="1"/>
+          </p:nvPr>
+        </p:nvSpPr>
+        <p:spPr/>
+        <p:txBody>
+          <a:bodyPr/>
+          <a:lstStyle/>
+          <a:p>
+            <a:pPr marL="0" marR="0" lvl="0" indent="0" algn="l" defTabSz="914400" rtl="0" eaLnBrk="1" fontAlgn="auto" latinLnBrk="0" hangingPunct="1">
+              <a:lnSpc>
+                <a:spcPct val="100000"/>
+              </a:lnSpc>
+              <a:spcBef>
+                <a:spcPts val="0"/>
+              </a:spcBef>
+              <a:spcAft>
+                <a:spcPts val="0"/>
+              </a:spcAft>
+              <a:buClrTx/>
+              <a:buSzTx/>
+              <a:buFontTx/>
+              <a:buNone/>
+              <a:tabLst/>
+              <a:defRPr/>
+            </a:pPr>
+            <a:r>
+              <a:rPr lang="cs-CZ" dirty="0" smtClean="0"/>
+              <a:t>SKIP</a:t>
+            </a:r>
+          </a:p>
+        </p:txBody>
+      </p:sp>
+      <p:sp>
+        <p:nvSpPr>
+          <p:cNvPr id="4" name="Zástupný symbol pro číslo snímku 3"/>
+          <p:cNvSpPr>
+            <a:spLocks noGrp="1"/>
+          </p:cNvSpPr>
+          <p:nvPr>
+            <p:ph type="sldNum" sz="quarter" idx="10"/>
+          </p:nvPr>
+        </p:nvSpPr>
+        <p:spPr/>
+        <p:txBody>
+          <a:bodyPr/>
+          <a:lstStyle/>
+          <a:p>
+            <a:fld id="{6FA6E7A2-E6B5-47DC-8D32-382F19FA4CCF}" type="slidenum">
+              <a:rPr lang="cs-CZ" smtClean="0"/>
+              <a:t>10</a:t>
+            </a:fld>
+            <a:endParaRPr lang="cs-CZ"/>
+          </a:p>
+        </p:txBody>
+      </p:sp>
+    </p:spTree>
+    <p:extLst>
+      <p:ext uri="{BB962C8B-B14F-4D97-AF65-F5344CB8AC3E}">
+        <p14:creationId xmlns:p14="http://schemas.microsoft.com/office/powerpoint/2010/main" val="1747810078"/>
+      </p:ext>
+    </p:extLst>
+  </p:cSld>
+  <p:clrMapOvr>
+    <a:masterClrMapping/>
+  </p:clrMapOvr>
+</p:notes>
+</file>
+
+<file path=ppt/notesSlides/notesSlide11.xml><?xml version="1.0" encoding="utf-8"?>
+<p:notes xmlns:a="http://schemas.openxmlformats.org/drawingml/2006/main" xmlns:r="http://schemas.openxmlformats.org/officeDocument/2006/relationships" xmlns:p="http://schemas.openxmlformats.org/presentationml/2006/main">
+  <p:cSld>
+    <p:spTree>
+      <p:nvGrpSpPr>
+        <p:cNvPr id="1" name=""/>
+        <p:cNvGrpSpPr/>
+        <p:nvPr/>
+      </p:nvGrpSpPr>
+      <p:grpSpPr>
+        <a:xfrm>
+          <a:off x="0" y="0"/>
+          <a:ext cx="0" cy="0"/>
+          <a:chOff x="0" y="0"/>
+          <a:chExt cx="0" cy="0"/>
+        </a:xfrm>
+      </p:grpSpPr>
+      <p:sp>
+        <p:nvSpPr>
+          <p:cNvPr id="2" name="Zástupný symbol pro obrázek snímku 1"/>
+          <p:cNvSpPr>
+            <a:spLocks noGrp="1" noRot="1" noChangeAspect="1"/>
+          </p:cNvSpPr>
+          <p:nvPr>
+            <p:ph type="sldImg"/>
+          </p:nvPr>
+        </p:nvSpPr>
+        <p:spPr/>
+      </p:sp>
+      <p:sp>
+        <p:nvSpPr>
+          <p:cNvPr id="3" name="Zástupný symbol pro poznámky 2"/>
+          <p:cNvSpPr>
+            <a:spLocks noGrp="1"/>
+          </p:cNvSpPr>
+          <p:nvPr>
+            <p:ph type="body" idx="1"/>
+          </p:nvPr>
+        </p:nvSpPr>
+        <p:spPr/>
+        <p:txBody>
+          <a:bodyPr/>
+          <a:lstStyle/>
+          <a:p>
+            <a:r>
+              <a:rPr lang="cs-CZ" dirty="0" smtClean="0"/>
+              <a:t>Pokud</a:t>
+            </a:r>
+            <a:r>
+              <a:rPr lang="cs-CZ" baseline="0" dirty="0" smtClean="0"/>
+              <a:t> přeskočím jednotlivé animace a přechody, tak se dostanu k vkládaní dat, která lze vkládat pomocí záložky </a:t>
+            </a:r>
+            <a:r>
+              <a:rPr lang="cs-CZ" baseline="0" dirty="0" err="1" smtClean="0"/>
+              <a:t>Add</a:t>
+            </a:r>
+            <a:r>
+              <a:rPr lang="cs-CZ" baseline="0" dirty="0" smtClean="0"/>
+              <a:t>. Vložení je možné jak kliknutím a vyhledáním souboru, tak pomocí </a:t>
+            </a:r>
+            <a:r>
+              <a:rPr lang="cs-CZ" baseline="0" dirty="0" err="1" smtClean="0"/>
+              <a:t>Drag</a:t>
+            </a:r>
+            <a:r>
+              <a:rPr lang="en-US" baseline="0" dirty="0" err="1" smtClean="0"/>
+              <a:t>AndDrop</a:t>
+            </a:r>
+            <a:r>
+              <a:rPr lang="en-US" baseline="0" dirty="0" smtClean="0"/>
+              <a:t>. Po </a:t>
+            </a:r>
+            <a:r>
+              <a:rPr lang="cs-CZ" baseline="0" dirty="0" smtClean="0"/>
+              <a:t>zpracování souboru v jiném vláknu, se zobrazí počet nově přidaných a nekonzistentních řádků, nebo případně informace o tom, že soubor byl již jednou přidán a nelze ho vložit znovu.</a:t>
+            </a:r>
+            <a:endParaRPr lang="cs-CZ" dirty="0"/>
+          </a:p>
+        </p:txBody>
+      </p:sp>
+      <p:sp>
+        <p:nvSpPr>
+          <p:cNvPr id="4" name="Zástupný symbol pro číslo snímku 3"/>
+          <p:cNvSpPr>
+            <a:spLocks noGrp="1"/>
+          </p:cNvSpPr>
+          <p:nvPr>
+            <p:ph type="sldNum" sz="quarter" idx="10"/>
+          </p:nvPr>
+        </p:nvSpPr>
+        <p:spPr/>
+        <p:txBody>
+          <a:bodyPr/>
+          <a:lstStyle/>
+          <a:p>
+            <a:fld id="{6FA6E7A2-E6B5-47DC-8D32-382F19FA4CCF}" type="slidenum">
+              <a:rPr lang="cs-CZ" smtClean="0"/>
+              <a:t>11</a:t>
+            </a:fld>
+            <a:endParaRPr lang="cs-CZ"/>
+          </a:p>
+        </p:txBody>
+      </p:sp>
+    </p:spTree>
+    <p:extLst>
+      <p:ext uri="{BB962C8B-B14F-4D97-AF65-F5344CB8AC3E}">
+        <p14:creationId xmlns:p14="http://schemas.microsoft.com/office/powerpoint/2010/main" val="2418382441"/>
+      </p:ext>
+    </p:extLst>
+  </p:cSld>
+  <p:clrMapOvr>
+    <a:masterClrMapping/>
+  </p:clrMapOvr>
+</p:notes>
+</file>
+
+<file path=ppt/notesSlides/notesSlide12.xml><?xml version="1.0" encoding="utf-8"?>
+<p:notes xmlns:a="http://schemas.openxmlformats.org/drawingml/2006/main" xmlns:r="http://schemas.openxmlformats.org/officeDocument/2006/relationships" xmlns:p="http://schemas.openxmlformats.org/presentationml/2006/main">
+  <p:cSld>
+    <p:spTree>
+      <p:nvGrpSpPr>
+        <p:cNvPr id="1" name=""/>
+        <p:cNvGrpSpPr/>
+        <p:nvPr/>
+      </p:nvGrpSpPr>
+      <p:grpSpPr>
+        <a:xfrm>
+          <a:off x="0" y="0"/>
+          <a:ext cx="0" cy="0"/>
+          <a:chOff x="0" y="0"/>
+          <a:chExt cx="0" cy="0"/>
+        </a:xfrm>
+      </p:grpSpPr>
+      <p:sp>
+        <p:nvSpPr>
+          <p:cNvPr id="2" name="Zástupný symbol pro obrázek snímku 1"/>
+          <p:cNvSpPr>
+            <a:spLocks noGrp="1" noRot="1" noChangeAspect="1"/>
+          </p:cNvSpPr>
+          <p:nvPr>
+            <p:ph type="sldImg"/>
+          </p:nvPr>
+        </p:nvSpPr>
+        <p:spPr/>
+      </p:sp>
+      <p:sp>
+        <p:nvSpPr>
+          <p:cNvPr id="3" name="Zástupný symbol pro poznámky 2"/>
+          <p:cNvSpPr>
+            <a:spLocks noGrp="1"/>
+          </p:cNvSpPr>
+          <p:nvPr>
+            <p:ph type="body" idx="1"/>
+          </p:nvPr>
+        </p:nvSpPr>
+        <p:spPr/>
+        <p:txBody>
+          <a:bodyPr/>
+          <a:lstStyle/>
+          <a:p>
+            <a:r>
+              <a:rPr lang="cs-CZ" dirty="0" smtClean="0"/>
+              <a:t>Hlavním oknem je vyhledávací okno,</a:t>
+            </a:r>
+            <a:r>
+              <a:rPr lang="cs-CZ" baseline="0" dirty="0" smtClean="0"/>
+              <a:t> kde lze zobrazovat data z databáze, lze data filtrovat a lze graficky vidět nekonzistence. Vždy je vidět počet aktuálně zobrazených řádků a aktuálně zvolený filtr, který si lze navolit sám, nebo si vybrat z 10ti nejpoužívanějších. Každý nekonzistentní řádek je zvýrazněn šedivou barvou a každá nekonzistentní hodnota je zvýrazněna červeně. Jednotlivé řádky, které jsou nekonzistentní jsou vždy pod sebou.</a:t>
+            </a:r>
+            <a:endParaRPr lang="cs-CZ" dirty="0"/>
+          </a:p>
+        </p:txBody>
+      </p:sp>
+      <p:sp>
+        <p:nvSpPr>
+          <p:cNvPr id="4" name="Zástupný symbol pro číslo snímku 3"/>
+          <p:cNvSpPr>
+            <a:spLocks noGrp="1"/>
+          </p:cNvSpPr>
+          <p:nvPr>
+            <p:ph type="sldNum" sz="quarter" idx="10"/>
+          </p:nvPr>
+        </p:nvSpPr>
+        <p:spPr/>
+        <p:txBody>
+          <a:bodyPr/>
+          <a:lstStyle/>
+          <a:p>
+            <a:fld id="{6FA6E7A2-E6B5-47DC-8D32-382F19FA4CCF}" type="slidenum">
+              <a:rPr lang="cs-CZ" smtClean="0"/>
+              <a:t>12</a:t>
+            </a:fld>
+            <a:endParaRPr lang="cs-CZ"/>
+          </a:p>
+        </p:txBody>
+      </p:sp>
+    </p:spTree>
+    <p:extLst>
+      <p:ext uri="{BB962C8B-B14F-4D97-AF65-F5344CB8AC3E}">
+        <p14:creationId xmlns:p14="http://schemas.microsoft.com/office/powerpoint/2010/main" val="4198366648"/>
+      </p:ext>
+    </p:extLst>
+  </p:cSld>
+  <p:clrMapOvr>
+    <a:masterClrMapping/>
+  </p:clrMapOvr>
+</p:notes>
+</file>
+
+<file path=ppt/notesSlides/notesSlide13.xml><?xml version="1.0" encoding="utf-8"?>
+<p:notes xmlns:a="http://schemas.openxmlformats.org/drawingml/2006/main" xmlns:r="http://schemas.openxmlformats.org/officeDocument/2006/relationships" xmlns:p="http://schemas.openxmlformats.org/presentationml/2006/main">
+  <p:cSld>
+    <p:spTree>
+      <p:nvGrpSpPr>
+        <p:cNvPr id="1" name=""/>
+        <p:cNvGrpSpPr/>
+        <p:nvPr/>
+      </p:nvGrpSpPr>
+      <p:grpSpPr>
+        <a:xfrm>
+          <a:off x="0" y="0"/>
+          <a:ext cx="0" cy="0"/>
+          <a:chOff x="0" y="0"/>
+          <a:chExt cx="0" cy="0"/>
+        </a:xfrm>
+      </p:grpSpPr>
+      <p:sp>
+        <p:nvSpPr>
+          <p:cNvPr id="2" name="Zástupný symbol pro obrázek snímku 1"/>
+          <p:cNvSpPr>
+            <a:spLocks noGrp="1" noRot="1" noChangeAspect="1"/>
+          </p:cNvSpPr>
+          <p:nvPr>
+            <p:ph type="sldImg"/>
+          </p:nvPr>
+        </p:nvSpPr>
+        <p:spPr/>
+      </p:sp>
+      <p:sp>
+        <p:nvSpPr>
+          <p:cNvPr id="3" name="Zástupný symbol pro poznámky 2"/>
+          <p:cNvSpPr>
+            <a:spLocks noGrp="1"/>
+          </p:cNvSpPr>
+          <p:nvPr>
+            <p:ph type="body" idx="1"/>
+          </p:nvPr>
+        </p:nvSpPr>
+        <p:spPr/>
+        <p:txBody>
+          <a:bodyPr/>
+          <a:lstStyle/>
+          <a:p>
+            <a:r>
+              <a:rPr lang="cs-CZ" dirty="0" smtClean="0"/>
+              <a:t>Samotné</a:t>
+            </a:r>
+            <a:r>
+              <a:rPr lang="cs-CZ" baseline="0" dirty="0" smtClean="0"/>
+              <a:t> filtrování je možné nastavit dle zadání, buďto jako rozsah hodnot, vybranou hodnotu, nebo maximální hodnotu. Zobrazené hodnoty jsou vždy aktuální s hodnotami v databázi, tedy maxima, minima i samotné hodnoty vždy odpovídají realitě.</a:t>
+            </a:r>
+            <a:endParaRPr lang="cs-CZ" dirty="0"/>
+          </a:p>
+        </p:txBody>
+      </p:sp>
+      <p:sp>
+        <p:nvSpPr>
+          <p:cNvPr id="4" name="Zástupný symbol pro číslo snímku 3"/>
+          <p:cNvSpPr>
+            <a:spLocks noGrp="1"/>
+          </p:cNvSpPr>
+          <p:nvPr>
+            <p:ph type="sldNum" sz="quarter" idx="10"/>
+          </p:nvPr>
+        </p:nvSpPr>
+        <p:spPr/>
+        <p:txBody>
+          <a:bodyPr/>
+          <a:lstStyle/>
+          <a:p>
+            <a:fld id="{6FA6E7A2-E6B5-47DC-8D32-382F19FA4CCF}" type="slidenum">
+              <a:rPr lang="cs-CZ" smtClean="0"/>
+              <a:t>13</a:t>
+            </a:fld>
+            <a:endParaRPr lang="cs-CZ"/>
+          </a:p>
+        </p:txBody>
+      </p:sp>
+    </p:spTree>
+    <p:extLst>
+      <p:ext uri="{BB962C8B-B14F-4D97-AF65-F5344CB8AC3E}">
+        <p14:creationId xmlns:p14="http://schemas.microsoft.com/office/powerpoint/2010/main" val="3674845006"/>
+      </p:ext>
+    </p:extLst>
+  </p:cSld>
+  <p:clrMapOvr>
+    <a:masterClrMapping/>
+  </p:clrMapOvr>
+</p:notes>
+</file>
+
+<file path=ppt/notesSlides/notesSlide14.xml><?xml version="1.0" encoding="utf-8"?>
+<p:notes xmlns:a="http://schemas.openxmlformats.org/drawingml/2006/main" xmlns:r="http://schemas.openxmlformats.org/officeDocument/2006/relationships" xmlns:p="http://schemas.openxmlformats.org/presentationml/2006/main">
+  <p:cSld>
+    <p:spTree>
+      <p:nvGrpSpPr>
+        <p:cNvPr id="1" name=""/>
+        <p:cNvGrpSpPr/>
+        <p:nvPr/>
+      </p:nvGrpSpPr>
+      <p:grpSpPr>
+        <a:xfrm>
+          <a:off x="0" y="0"/>
+          <a:ext cx="0" cy="0"/>
+          <a:chOff x="0" y="0"/>
+          <a:chExt cx="0" cy="0"/>
+        </a:xfrm>
+      </p:grpSpPr>
+      <p:sp>
+        <p:nvSpPr>
+          <p:cNvPr id="2" name="Zástupný symbol pro obrázek snímku 1"/>
+          <p:cNvSpPr>
+            <a:spLocks noGrp="1" noRot="1" noChangeAspect="1"/>
+          </p:cNvSpPr>
+          <p:nvPr>
+            <p:ph type="sldImg"/>
+          </p:nvPr>
+        </p:nvSpPr>
+        <p:spPr/>
+      </p:sp>
+      <p:sp>
+        <p:nvSpPr>
+          <p:cNvPr id="3" name="Zástupný symbol pro poznámky 2"/>
+          <p:cNvSpPr>
+            <a:spLocks noGrp="1"/>
+          </p:cNvSpPr>
+          <p:nvPr>
+            <p:ph type="body" idx="1"/>
+          </p:nvPr>
+        </p:nvSpPr>
+        <p:spPr/>
+        <p:txBody>
+          <a:bodyPr/>
+          <a:lstStyle/>
+          <a:p>
+            <a:pPr marL="0" marR="0" lvl="0" indent="0" algn="l" defTabSz="914400" rtl="0" eaLnBrk="1" fontAlgn="auto" latinLnBrk="0" hangingPunct="1">
+              <a:lnSpc>
+                <a:spcPct val="100000"/>
+              </a:lnSpc>
+              <a:spcBef>
+                <a:spcPts val="0"/>
+              </a:spcBef>
+              <a:spcAft>
+                <a:spcPts val="0"/>
+              </a:spcAft>
+              <a:buClrTx/>
+              <a:buSzTx/>
+              <a:buFontTx/>
+              <a:buNone/>
+              <a:tabLst/>
+              <a:defRPr/>
+            </a:pPr>
+            <a:r>
+              <a:rPr lang="cs-CZ" dirty="0" smtClean="0"/>
+              <a:t>SKIP</a:t>
+            </a:r>
+          </a:p>
+        </p:txBody>
+      </p:sp>
+      <p:sp>
+        <p:nvSpPr>
+          <p:cNvPr id="4" name="Zástupný symbol pro číslo snímku 3"/>
+          <p:cNvSpPr>
+            <a:spLocks noGrp="1"/>
+          </p:cNvSpPr>
+          <p:nvPr>
+            <p:ph type="sldNum" sz="quarter" idx="10"/>
+          </p:nvPr>
+        </p:nvSpPr>
+        <p:spPr/>
+        <p:txBody>
+          <a:bodyPr/>
+          <a:lstStyle/>
+          <a:p>
+            <a:fld id="{6FA6E7A2-E6B5-47DC-8D32-382F19FA4CCF}" type="slidenum">
+              <a:rPr lang="cs-CZ" smtClean="0"/>
+              <a:t>14</a:t>
+            </a:fld>
+            <a:endParaRPr lang="cs-CZ"/>
+          </a:p>
+        </p:txBody>
+      </p:sp>
+    </p:spTree>
+    <p:extLst>
+      <p:ext uri="{BB962C8B-B14F-4D97-AF65-F5344CB8AC3E}">
+        <p14:creationId xmlns:p14="http://schemas.microsoft.com/office/powerpoint/2010/main" val="2371879441"/>
+      </p:ext>
+    </p:extLst>
+  </p:cSld>
+  <p:clrMapOvr>
+    <a:masterClrMapping/>
+  </p:clrMapOvr>
+</p:notes>
+</file>
+
+<file path=ppt/notesSlides/notesSlide15.xml><?xml version="1.0" encoding="utf-8"?>
+<p:notes xmlns:a="http://schemas.openxmlformats.org/drawingml/2006/main" xmlns:r="http://schemas.openxmlformats.org/officeDocument/2006/relationships" xmlns:p="http://schemas.openxmlformats.org/presentationml/2006/main">
+  <p:cSld>
+    <p:spTree>
+      <p:nvGrpSpPr>
+        <p:cNvPr id="1" name=""/>
+        <p:cNvGrpSpPr/>
+        <p:nvPr/>
+      </p:nvGrpSpPr>
+      <p:grpSpPr>
+        <a:xfrm>
+          <a:off x="0" y="0"/>
+          <a:ext cx="0" cy="0"/>
+          <a:chOff x="0" y="0"/>
+          <a:chExt cx="0" cy="0"/>
+        </a:xfrm>
+      </p:grpSpPr>
+      <p:sp>
+        <p:nvSpPr>
+          <p:cNvPr id="2" name="Zástupný symbol pro obrázek snímku 1"/>
+          <p:cNvSpPr>
+            <a:spLocks noGrp="1" noRot="1" noChangeAspect="1"/>
+          </p:cNvSpPr>
+          <p:nvPr>
+            <p:ph type="sldImg"/>
+          </p:nvPr>
+        </p:nvSpPr>
+        <p:spPr/>
+      </p:sp>
+      <p:sp>
+        <p:nvSpPr>
+          <p:cNvPr id="3" name="Zástupný symbol pro poznámky 2"/>
+          <p:cNvSpPr>
+            <a:spLocks noGrp="1"/>
+          </p:cNvSpPr>
+          <p:nvPr>
+            <p:ph type="body" idx="1"/>
+          </p:nvPr>
+        </p:nvSpPr>
+        <p:spPr/>
+        <p:txBody>
+          <a:bodyPr/>
+          <a:lstStyle/>
+          <a:p>
+            <a:r>
+              <a:rPr lang="cs-CZ" dirty="0" smtClean="0"/>
+              <a:t>Poslední,</a:t>
+            </a:r>
+            <a:r>
+              <a:rPr lang="cs-CZ" baseline="0" dirty="0" smtClean="0"/>
+              <a:t> třetí částí, je kód samotné aplikace.</a:t>
+            </a:r>
+            <a:endParaRPr lang="cs-CZ" dirty="0"/>
+          </a:p>
+        </p:txBody>
+      </p:sp>
+      <p:sp>
+        <p:nvSpPr>
+          <p:cNvPr id="4" name="Zástupný symbol pro číslo snímku 3"/>
+          <p:cNvSpPr>
+            <a:spLocks noGrp="1"/>
+          </p:cNvSpPr>
+          <p:nvPr>
+            <p:ph type="sldNum" sz="quarter" idx="10"/>
+          </p:nvPr>
+        </p:nvSpPr>
+        <p:spPr/>
+        <p:txBody>
+          <a:bodyPr/>
+          <a:lstStyle/>
+          <a:p>
+            <a:fld id="{6FA6E7A2-E6B5-47DC-8D32-382F19FA4CCF}" type="slidenum">
+              <a:rPr lang="cs-CZ" smtClean="0"/>
+              <a:t>15</a:t>
+            </a:fld>
+            <a:endParaRPr lang="cs-CZ"/>
+          </a:p>
+        </p:txBody>
+      </p:sp>
+    </p:spTree>
+    <p:extLst>
+      <p:ext uri="{BB962C8B-B14F-4D97-AF65-F5344CB8AC3E}">
+        <p14:creationId xmlns:p14="http://schemas.microsoft.com/office/powerpoint/2010/main" val="2934961192"/>
+      </p:ext>
+    </p:extLst>
+  </p:cSld>
+  <p:clrMapOvr>
+    <a:masterClrMapping/>
+  </p:clrMapOvr>
+</p:notes>
+</file>
+
+<file path=ppt/notesSlides/notesSlide16.xml><?xml version="1.0" encoding="utf-8"?>
+<p:notes xmlns:a="http://schemas.openxmlformats.org/drawingml/2006/main" xmlns:r="http://schemas.openxmlformats.org/officeDocument/2006/relationships" xmlns:p="http://schemas.openxmlformats.org/presentationml/2006/main">
+  <p:cSld>
+    <p:spTree>
+      <p:nvGrpSpPr>
+        <p:cNvPr id="1" name=""/>
+        <p:cNvGrpSpPr/>
+        <p:nvPr/>
+      </p:nvGrpSpPr>
+      <p:grpSpPr>
+        <a:xfrm>
+          <a:off x="0" y="0"/>
+          <a:ext cx="0" cy="0"/>
+          <a:chOff x="0" y="0"/>
+          <a:chExt cx="0" cy="0"/>
+        </a:xfrm>
+      </p:grpSpPr>
+      <p:sp>
+        <p:nvSpPr>
+          <p:cNvPr id="2" name="Zástupný symbol pro obrázek snímku 1"/>
+          <p:cNvSpPr>
+            <a:spLocks noGrp="1" noRot="1" noChangeAspect="1"/>
+          </p:cNvSpPr>
+          <p:nvPr>
+            <p:ph type="sldImg"/>
+          </p:nvPr>
+        </p:nvSpPr>
+        <p:spPr/>
+      </p:sp>
+      <p:sp>
+        <p:nvSpPr>
+          <p:cNvPr id="3" name="Zástupný symbol pro poznámky 2"/>
+          <p:cNvSpPr>
+            <a:spLocks noGrp="1"/>
+          </p:cNvSpPr>
+          <p:nvPr>
+            <p:ph type="body" idx="1"/>
+          </p:nvPr>
+        </p:nvSpPr>
+        <p:spPr/>
+        <p:txBody>
+          <a:bodyPr/>
+          <a:lstStyle/>
+          <a:p>
+            <a:pPr marL="0" marR="0" lvl="0" indent="0" algn="l" defTabSz="914400" rtl="0" eaLnBrk="1" fontAlgn="auto" latinLnBrk="0" hangingPunct="1">
+              <a:lnSpc>
+                <a:spcPct val="100000"/>
+              </a:lnSpc>
+              <a:spcBef>
+                <a:spcPts val="0"/>
+              </a:spcBef>
+              <a:spcAft>
+                <a:spcPts val="0"/>
+              </a:spcAft>
+              <a:buClrTx/>
+              <a:buSzTx/>
+              <a:buFontTx/>
+              <a:buNone/>
+              <a:tabLst/>
+              <a:defRPr/>
+            </a:pPr>
+            <a:r>
+              <a:rPr lang="cs-CZ" dirty="0" smtClean="0"/>
+              <a:t>SKIP</a:t>
+            </a:r>
+          </a:p>
+        </p:txBody>
+      </p:sp>
+      <p:sp>
+        <p:nvSpPr>
+          <p:cNvPr id="4" name="Zástupný symbol pro číslo snímku 3"/>
+          <p:cNvSpPr>
+            <a:spLocks noGrp="1"/>
+          </p:cNvSpPr>
+          <p:nvPr>
+            <p:ph type="sldNum" sz="quarter" idx="10"/>
+          </p:nvPr>
+        </p:nvSpPr>
+        <p:spPr/>
+        <p:txBody>
+          <a:bodyPr/>
+          <a:lstStyle/>
+          <a:p>
+            <a:fld id="{6FA6E7A2-E6B5-47DC-8D32-382F19FA4CCF}" type="slidenum">
+              <a:rPr lang="cs-CZ" smtClean="0"/>
+              <a:t>16</a:t>
+            </a:fld>
+            <a:endParaRPr lang="cs-CZ" dirty="0"/>
+          </a:p>
+        </p:txBody>
+      </p:sp>
+    </p:spTree>
+    <p:extLst>
+      <p:ext uri="{BB962C8B-B14F-4D97-AF65-F5344CB8AC3E}">
+        <p14:creationId xmlns:p14="http://schemas.microsoft.com/office/powerpoint/2010/main" val="472018940"/>
+      </p:ext>
+    </p:extLst>
+  </p:cSld>
+  <p:clrMapOvr>
+    <a:masterClrMapping/>
+  </p:clrMapOvr>
+</p:notes>
+</file>
+
+<file path=ppt/notesSlides/notesSlide17.xml><?xml version="1.0" encoding="utf-8"?>
+<p:notes xmlns:a="http://schemas.openxmlformats.org/drawingml/2006/main" xmlns:r="http://schemas.openxmlformats.org/officeDocument/2006/relationships" xmlns:p="http://schemas.openxmlformats.org/presentationml/2006/main">
+  <p:cSld>
+    <p:spTree>
+      <p:nvGrpSpPr>
+        <p:cNvPr id="1" name=""/>
+        <p:cNvGrpSpPr/>
+        <p:nvPr/>
+      </p:nvGrpSpPr>
+      <p:grpSpPr>
+        <a:xfrm>
+          <a:off x="0" y="0"/>
+          <a:ext cx="0" cy="0"/>
+          <a:chOff x="0" y="0"/>
+          <a:chExt cx="0" cy="0"/>
+        </a:xfrm>
+      </p:grpSpPr>
+      <p:sp>
+        <p:nvSpPr>
+          <p:cNvPr id="2" name="Zástupný symbol pro obrázek snímku 1"/>
+          <p:cNvSpPr>
+            <a:spLocks noGrp="1" noRot="1" noChangeAspect="1"/>
+          </p:cNvSpPr>
+          <p:nvPr>
+            <p:ph type="sldImg"/>
+          </p:nvPr>
+        </p:nvSpPr>
+        <p:spPr/>
+      </p:sp>
+      <p:sp>
+        <p:nvSpPr>
+          <p:cNvPr id="3" name="Zástupný symbol pro poznámky 2"/>
+          <p:cNvSpPr>
+            <a:spLocks noGrp="1"/>
+          </p:cNvSpPr>
+          <p:nvPr>
+            <p:ph type="body" idx="1"/>
+          </p:nvPr>
+        </p:nvSpPr>
+        <p:spPr/>
+        <p:txBody>
+          <a:bodyPr/>
+          <a:lstStyle/>
+          <a:p>
+            <a:r>
+              <a:rPr lang="cs-CZ" dirty="0" smtClean="0"/>
+              <a:t>Na obrázku vidíte</a:t>
+            </a:r>
+            <a:r>
+              <a:rPr lang="cs-CZ" baseline="0" dirty="0" smtClean="0"/>
+              <a:t> blokové rozvržení, které odpovídá třídám aplikace. Pokud začnu zleva, data jsou z databáze načítána pomocí Konektoru, který staví na interface, díky čemuž lze napojit i jiné typy databází. Konektor poskytuje veškeré třídy nutné k importu a čtení z databáze, včetně získávání podrobnějších informací, jakou jsou hodnoty pro filtr, protože veškerá data se získávání z databáze, nikoliv z načtených hodnot v aplikaci.</a:t>
+            </a:r>
+          </a:p>
+          <a:p>
+            <a:endParaRPr lang="cs-CZ" baseline="0" dirty="0" smtClean="0"/>
+          </a:p>
+          <a:p>
+            <a:r>
+              <a:rPr lang="cs-CZ" baseline="0" dirty="0" smtClean="0"/>
+              <a:t>Dále samotná aplikace implementuje veškerou komunikaci s konektorem, tedy import, zobrazení dat do tabulky, zvýraznění nekonzistencí a hlavně o filtrování dat. </a:t>
+            </a:r>
+          </a:p>
+          <a:p>
+            <a:endParaRPr lang="cs-CZ" baseline="0" dirty="0" smtClean="0"/>
+          </a:p>
+          <a:p>
+            <a:r>
+              <a:rPr lang="cs-CZ" baseline="0" dirty="0" smtClean="0"/>
+              <a:t>Při importu se využívá Data </a:t>
+            </a:r>
+            <a:r>
+              <a:rPr lang="cs-CZ" baseline="0" dirty="0" err="1" smtClean="0"/>
+              <a:t>Parser</a:t>
+            </a:r>
+            <a:r>
+              <a:rPr lang="cs-CZ" baseline="0" dirty="0" smtClean="0"/>
+              <a:t>, který umí zpracovat 3 typy vstupních souborů. CSV, JSON a XML.</a:t>
+            </a:r>
+          </a:p>
+          <a:p>
+            <a:endParaRPr lang="cs-CZ" baseline="0" dirty="0" smtClean="0"/>
+          </a:p>
+          <a:p>
+            <a:r>
+              <a:rPr lang="cs-CZ" baseline="0" dirty="0" smtClean="0"/>
+              <a:t>Samotná data jsou načítána do objektů, které jsou identické s databázovým modelem.</a:t>
+            </a:r>
+            <a:endParaRPr lang="cs-CZ" dirty="0"/>
+          </a:p>
+        </p:txBody>
+      </p:sp>
+      <p:sp>
+        <p:nvSpPr>
+          <p:cNvPr id="4" name="Zástupný symbol pro číslo snímku 3"/>
+          <p:cNvSpPr>
+            <a:spLocks noGrp="1"/>
+          </p:cNvSpPr>
+          <p:nvPr>
+            <p:ph type="sldNum" sz="quarter" idx="10"/>
+          </p:nvPr>
+        </p:nvSpPr>
+        <p:spPr/>
+        <p:txBody>
+          <a:bodyPr/>
+          <a:lstStyle/>
+          <a:p>
+            <a:fld id="{6FA6E7A2-E6B5-47DC-8D32-382F19FA4CCF}" type="slidenum">
+              <a:rPr lang="cs-CZ" smtClean="0"/>
+              <a:t>17</a:t>
+            </a:fld>
+            <a:endParaRPr lang="cs-CZ"/>
+          </a:p>
+        </p:txBody>
+      </p:sp>
+    </p:spTree>
+    <p:extLst>
+      <p:ext uri="{BB962C8B-B14F-4D97-AF65-F5344CB8AC3E}">
+        <p14:creationId xmlns:p14="http://schemas.microsoft.com/office/powerpoint/2010/main" val="1154485790"/>
+      </p:ext>
+    </p:extLst>
+  </p:cSld>
+  <p:clrMapOvr>
+    <a:masterClrMapping/>
+  </p:clrMapOvr>
+</p:notes>
+</file>
+
+<file path=ppt/notesSlides/notesSlide18.xml><?xml version="1.0" encoding="utf-8"?>
+<p:notes xmlns:a="http://schemas.openxmlformats.org/drawingml/2006/main" xmlns:r="http://schemas.openxmlformats.org/officeDocument/2006/relationships" xmlns:p="http://schemas.openxmlformats.org/presentationml/2006/main">
+  <p:cSld>
+    <p:spTree>
+      <p:nvGrpSpPr>
+        <p:cNvPr id="1" name=""/>
+        <p:cNvGrpSpPr/>
+        <p:nvPr/>
+      </p:nvGrpSpPr>
+      <p:grpSpPr>
+        <a:xfrm>
+          <a:off x="0" y="0"/>
+          <a:ext cx="0" cy="0"/>
+          <a:chOff x="0" y="0"/>
+          <a:chExt cx="0" cy="0"/>
+        </a:xfrm>
+      </p:grpSpPr>
+      <p:sp>
+        <p:nvSpPr>
+          <p:cNvPr id="2" name="Zástupný symbol pro obrázek snímku 1"/>
+          <p:cNvSpPr>
+            <a:spLocks noGrp="1" noRot="1" noChangeAspect="1"/>
+          </p:cNvSpPr>
+          <p:nvPr>
+            <p:ph type="sldImg"/>
+          </p:nvPr>
+        </p:nvSpPr>
+        <p:spPr/>
+      </p:sp>
+      <p:sp>
+        <p:nvSpPr>
+          <p:cNvPr id="3" name="Zástupný symbol pro poznámky 2"/>
+          <p:cNvSpPr>
+            <a:spLocks noGrp="1"/>
+          </p:cNvSpPr>
+          <p:nvPr>
+            <p:ph type="body" idx="1"/>
+          </p:nvPr>
+        </p:nvSpPr>
+        <p:spPr/>
+        <p:txBody>
+          <a:bodyPr/>
+          <a:lstStyle/>
+          <a:p>
+            <a:pPr marL="0" marR="0" lvl="0" indent="0" algn="l" defTabSz="914400" rtl="0" eaLnBrk="1" fontAlgn="auto" latinLnBrk="0" hangingPunct="1">
+              <a:lnSpc>
+                <a:spcPct val="100000"/>
+              </a:lnSpc>
+              <a:spcBef>
+                <a:spcPts val="0"/>
+              </a:spcBef>
+              <a:spcAft>
+                <a:spcPts val="0"/>
+              </a:spcAft>
+              <a:buClrTx/>
+              <a:buSzTx/>
+              <a:buFontTx/>
+              <a:buNone/>
+              <a:tabLst/>
+              <a:defRPr/>
+            </a:pPr>
+            <a:r>
+              <a:rPr lang="cs-CZ" dirty="0" smtClean="0"/>
+              <a:t>SKIP</a:t>
+            </a:r>
+          </a:p>
+        </p:txBody>
+      </p:sp>
+      <p:sp>
+        <p:nvSpPr>
+          <p:cNvPr id="4" name="Zástupný symbol pro číslo snímku 3"/>
+          <p:cNvSpPr>
+            <a:spLocks noGrp="1"/>
+          </p:cNvSpPr>
+          <p:nvPr>
+            <p:ph type="sldNum" sz="quarter" idx="10"/>
+          </p:nvPr>
+        </p:nvSpPr>
+        <p:spPr/>
+        <p:txBody>
+          <a:bodyPr/>
+          <a:lstStyle/>
+          <a:p>
+            <a:fld id="{6FA6E7A2-E6B5-47DC-8D32-382F19FA4CCF}" type="slidenum">
+              <a:rPr lang="cs-CZ" smtClean="0"/>
+              <a:t>18</a:t>
+            </a:fld>
+            <a:endParaRPr lang="cs-CZ"/>
+          </a:p>
+        </p:txBody>
+      </p:sp>
+    </p:spTree>
+    <p:extLst>
+      <p:ext uri="{BB962C8B-B14F-4D97-AF65-F5344CB8AC3E}">
+        <p14:creationId xmlns:p14="http://schemas.microsoft.com/office/powerpoint/2010/main" val="2984759749"/>
+      </p:ext>
+    </p:extLst>
+  </p:cSld>
+  <p:clrMapOvr>
+    <a:masterClrMapping/>
+  </p:clrMapOvr>
+</p:notes>
+</file>
+
+<file path=ppt/notesSlides/notesSlide19.xml><?xml version="1.0" encoding="utf-8"?>
+<p:notes xmlns:a="http://schemas.openxmlformats.org/drawingml/2006/main" xmlns:r="http://schemas.openxmlformats.org/officeDocument/2006/relationships" xmlns:p="http://schemas.openxmlformats.org/presentationml/2006/main">
+  <p:cSld>
+    <p:spTree>
+      <p:nvGrpSpPr>
+        <p:cNvPr id="1" name=""/>
+        <p:cNvGrpSpPr/>
+        <p:nvPr/>
+      </p:nvGrpSpPr>
+      <p:grpSpPr>
+        <a:xfrm>
+          <a:off x="0" y="0"/>
+          <a:ext cx="0" cy="0"/>
+          <a:chOff x="0" y="0"/>
+          <a:chExt cx="0" cy="0"/>
+        </a:xfrm>
+      </p:grpSpPr>
+      <p:sp>
+        <p:nvSpPr>
+          <p:cNvPr id="2" name="Zástupný symbol pro obrázek snímku 1"/>
+          <p:cNvSpPr>
+            <a:spLocks noGrp="1" noRot="1" noChangeAspect="1"/>
+          </p:cNvSpPr>
+          <p:nvPr>
+            <p:ph type="sldImg"/>
+          </p:nvPr>
+        </p:nvSpPr>
+        <p:spPr/>
+      </p:sp>
+      <p:sp>
+        <p:nvSpPr>
+          <p:cNvPr id="3" name="Zástupný symbol pro poznámky 2"/>
+          <p:cNvSpPr>
+            <a:spLocks noGrp="1"/>
+          </p:cNvSpPr>
+          <p:nvPr>
+            <p:ph type="body" idx="1"/>
+          </p:nvPr>
+        </p:nvSpPr>
+        <p:spPr/>
+        <p:txBody>
+          <a:bodyPr/>
+          <a:lstStyle/>
+          <a:p>
+            <a:r>
+              <a:rPr lang="cs-CZ" dirty="0" smtClean="0"/>
+              <a:t>Každý v našem teamu měl</a:t>
+            </a:r>
+            <a:r>
+              <a:rPr lang="cs-CZ" baseline="0" dirty="0" smtClean="0"/>
+              <a:t> své primární zaměření, nicméně o každém problému jsme společně diskutovali a dosáhli tak nejlepších možných řešení.</a:t>
+            </a:r>
+          </a:p>
+          <a:p>
+            <a:r>
+              <a:rPr lang="cs-CZ" baseline="0" dirty="0" smtClean="0"/>
+              <a:t>Děkuji za pozornost.</a:t>
+            </a:r>
+            <a:endParaRPr lang="cs-CZ" dirty="0"/>
+          </a:p>
+        </p:txBody>
+      </p:sp>
+      <p:sp>
+        <p:nvSpPr>
+          <p:cNvPr id="4" name="Zástupný symbol pro číslo snímku 3"/>
+          <p:cNvSpPr>
+            <a:spLocks noGrp="1"/>
+          </p:cNvSpPr>
+          <p:nvPr>
+            <p:ph type="sldNum" sz="quarter" idx="10"/>
+          </p:nvPr>
+        </p:nvSpPr>
+        <p:spPr/>
+        <p:txBody>
+          <a:bodyPr/>
+          <a:lstStyle/>
+          <a:p>
+            <a:fld id="{6FA6E7A2-E6B5-47DC-8D32-382F19FA4CCF}" type="slidenum">
+              <a:rPr lang="cs-CZ" smtClean="0"/>
+              <a:t>19</a:t>
+            </a:fld>
+            <a:endParaRPr lang="cs-CZ"/>
+          </a:p>
+        </p:txBody>
+      </p:sp>
+    </p:spTree>
+    <p:extLst>
+      <p:ext uri="{BB962C8B-B14F-4D97-AF65-F5344CB8AC3E}">
+        <p14:creationId xmlns:p14="http://schemas.microsoft.com/office/powerpoint/2010/main" val="1006851642"/>
+      </p:ext>
+    </p:extLst>
+  </p:cSld>
+  <p:clrMapOvr>
+    <a:masterClrMapping/>
+  </p:clrMapOvr>
+</p:notes>
+</file>
+
+<file path=ppt/notesSlides/notesSlide2.xml><?xml version="1.0" encoding="utf-8"?>
+<p:notes xmlns:a="http://schemas.openxmlformats.org/drawingml/2006/main" xmlns:r="http://schemas.openxmlformats.org/officeDocument/2006/relationships" xmlns:p="http://schemas.openxmlformats.org/presentationml/2006/main">
+  <p:cSld>
+    <p:spTree>
+      <p:nvGrpSpPr>
+        <p:cNvPr id="1" name=""/>
+        <p:cNvGrpSpPr/>
+        <p:nvPr/>
+      </p:nvGrpSpPr>
+      <p:grpSpPr>
+        <a:xfrm>
+          <a:off x="0" y="0"/>
+          <a:ext cx="0" cy="0"/>
+          <a:chOff x="0" y="0"/>
+          <a:chExt cx="0" cy="0"/>
+        </a:xfrm>
+      </p:grpSpPr>
+      <p:sp>
+        <p:nvSpPr>
+          <p:cNvPr id="2" name="Zástupný symbol pro obrázek snímku 1"/>
+          <p:cNvSpPr>
+            <a:spLocks noGrp="1" noRot="1" noChangeAspect="1"/>
+          </p:cNvSpPr>
+          <p:nvPr>
+            <p:ph type="sldImg"/>
+          </p:nvPr>
+        </p:nvSpPr>
+        <p:spPr/>
+      </p:sp>
+      <p:sp>
+        <p:nvSpPr>
+          <p:cNvPr id="3" name="Zástupný symbol pro poznámky 2"/>
+          <p:cNvSpPr>
+            <a:spLocks noGrp="1"/>
+          </p:cNvSpPr>
+          <p:nvPr>
+            <p:ph type="body" idx="1"/>
+          </p:nvPr>
+        </p:nvSpPr>
+        <p:spPr/>
+        <p:txBody>
+          <a:bodyPr/>
+          <a:lstStyle/>
+          <a:p>
+            <a:r>
+              <a:rPr lang="cs-CZ" dirty="0" smtClean="0"/>
+              <a:t>SKIP</a:t>
+            </a:r>
+            <a:endParaRPr lang="cs-CZ" dirty="0"/>
+          </a:p>
+        </p:txBody>
+      </p:sp>
+      <p:sp>
+        <p:nvSpPr>
+          <p:cNvPr id="4" name="Zástupný symbol pro číslo snímku 3"/>
+          <p:cNvSpPr>
+            <a:spLocks noGrp="1"/>
+          </p:cNvSpPr>
+          <p:nvPr>
+            <p:ph type="sldNum" sz="quarter" idx="10"/>
+          </p:nvPr>
+        </p:nvSpPr>
+        <p:spPr/>
+        <p:txBody>
+          <a:bodyPr/>
+          <a:lstStyle/>
+          <a:p>
+            <a:fld id="{6FA6E7A2-E6B5-47DC-8D32-382F19FA4CCF}" type="slidenum">
+              <a:rPr lang="cs-CZ" smtClean="0"/>
+              <a:t>2</a:t>
+            </a:fld>
+            <a:endParaRPr lang="cs-CZ" dirty="0"/>
+          </a:p>
+        </p:txBody>
+      </p:sp>
+    </p:spTree>
+    <p:extLst>
+      <p:ext uri="{BB962C8B-B14F-4D97-AF65-F5344CB8AC3E}">
+        <p14:creationId xmlns:p14="http://schemas.microsoft.com/office/powerpoint/2010/main" val="166196919"/>
+      </p:ext>
+    </p:extLst>
+  </p:cSld>
+  <p:clrMapOvr>
+    <a:masterClrMapping/>
+  </p:clrMapOvr>
+</p:notes>
+</file>
+
+<file path=ppt/notesSlides/notesSlide3.xml><?xml version="1.0" encoding="utf-8"?>
+<p:notes xmlns:a="http://schemas.openxmlformats.org/drawingml/2006/main" xmlns:r="http://schemas.openxmlformats.org/officeDocument/2006/relationships" xmlns:p="http://schemas.openxmlformats.org/presentationml/2006/main">
+  <p:cSld>
+    <p:spTree>
+      <p:nvGrpSpPr>
+        <p:cNvPr id="1" name=""/>
+        <p:cNvGrpSpPr/>
+        <p:nvPr/>
+      </p:nvGrpSpPr>
+      <p:grpSpPr>
+        <a:xfrm>
+          <a:off x="0" y="0"/>
+          <a:ext cx="0" cy="0"/>
+          <a:chOff x="0" y="0"/>
+          <a:chExt cx="0" cy="0"/>
+        </a:xfrm>
+      </p:grpSpPr>
+      <p:sp>
+        <p:nvSpPr>
+          <p:cNvPr id="2" name="Zástupný symbol pro obrázek snímku 1"/>
+          <p:cNvSpPr>
+            <a:spLocks noGrp="1" noRot="1" noChangeAspect="1"/>
+          </p:cNvSpPr>
+          <p:nvPr>
+            <p:ph type="sldImg"/>
+          </p:nvPr>
+        </p:nvSpPr>
+        <p:spPr/>
+      </p:sp>
+      <p:sp>
+        <p:nvSpPr>
+          <p:cNvPr id="3" name="Zástupný symbol pro poznámky 2"/>
+          <p:cNvSpPr>
+            <a:spLocks noGrp="1"/>
+          </p:cNvSpPr>
+          <p:nvPr>
+            <p:ph type="body" idx="1"/>
+          </p:nvPr>
+        </p:nvSpPr>
+        <p:spPr/>
+        <p:txBody>
+          <a:bodyPr/>
+          <a:lstStyle/>
+          <a:p>
+            <a:r>
+              <a:rPr lang="cs-CZ" dirty="0" smtClean="0"/>
+              <a:t>První fází byl návrh a implementace databáze.</a:t>
+            </a:r>
+            <a:endParaRPr lang="cs-CZ" dirty="0"/>
+          </a:p>
+        </p:txBody>
+      </p:sp>
+      <p:sp>
+        <p:nvSpPr>
+          <p:cNvPr id="4" name="Zástupný symbol pro číslo snímku 3"/>
+          <p:cNvSpPr>
+            <a:spLocks noGrp="1"/>
+          </p:cNvSpPr>
+          <p:nvPr>
+            <p:ph type="sldNum" sz="quarter" idx="10"/>
+          </p:nvPr>
+        </p:nvSpPr>
+        <p:spPr/>
+        <p:txBody>
+          <a:bodyPr/>
+          <a:lstStyle/>
+          <a:p>
+            <a:fld id="{6FA6E7A2-E6B5-47DC-8D32-382F19FA4CCF}" type="slidenum">
+              <a:rPr lang="cs-CZ" smtClean="0"/>
+              <a:t>3</a:t>
+            </a:fld>
+            <a:endParaRPr lang="cs-CZ" dirty="0"/>
+          </a:p>
+        </p:txBody>
+      </p:sp>
+    </p:spTree>
+    <p:extLst>
+      <p:ext uri="{BB962C8B-B14F-4D97-AF65-F5344CB8AC3E}">
+        <p14:creationId xmlns:p14="http://schemas.microsoft.com/office/powerpoint/2010/main" val="3261565488"/>
+      </p:ext>
+    </p:extLst>
+  </p:cSld>
+  <p:clrMapOvr>
+    <a:masterClrMapping/>
+  </p:clrMapOvr>
+</p:notes>
+</file>
+
+<file path=ppt/notesSlides/notesSlide4.xml><?xml version="1.0" encoding="utf-8"?>
+<p:notes xmlns:a="http://schemas.openxmlformats.org/drawingml/2006/main" xmlns:r="http://schemas.openxmlformats.org/officeDocument/2006/relationships" xmlns:p="http://schemas.openxmlformats.org/presentationml/2006/main">
+  <p:cSld>
+    <p:spTree>
+      <p:nvGrpSpPr>
+        <p:cNvPr id="1" name=""/>
+        <p:cNvGrpSpPr/>
+        <p:nvPr/>
+      </p:nvGrpSpPr>
+      <p:grpSpPr>
+        <a:xfrm>
+          <a:off x="0" y="0"/>
+          <a:ext cx="0" cy="0"/>
+          <a:chOff x="0" y="0"/>
+          <a:chExt cx="0" cy="0"/>
+        </a:xfrm>
+      </p:grpSpPr>
+      <p:sp>
+        <p:nvSpPr>
+          <p:cNvPr id="2" name="Zástupný symbol pro obrázek snímku 1"/>
+          <p:cNvSpPr>
+            <a:spLocks noGrp="1" noRot="1" noChangeAspect="1"/>
+          </p:cNvSpPr>
+          <p:nvPr>
+            <p:ph type="sldImg"/>
+          </p:nvPr>
+        </p:nvSpPr>
+        <p:spPr/>
+      </p:sp>
+      <p:sp>
+        <p:nvSpPr>
+          <p:cNvPr id="3" name="Zástupný symbol pro poznámky 2"/>
+          <p:cNvSpPr>
+            <a:spLocks noGrp="1"/>
+          </p:cNvSpPr>
+          <p:nvPr>
+            <p:ph type="body" idx="1"/>
+          </p:nvPr>
+        </p:nvSpPr>
+        <p:spPr/>
+        <p:txBody>
+          <a:bodyPr/>
+          <a:lstStyle/>
+          <a:p>
+            <a:pPr marL="0" marR="0" lvl="0" indent="0" algn="l" defTabSz="914400" rtl="0" eaLnBrk="1" fontAlgn="auto" latinLnBrk="0" hangingPunct="1">
+              <a:lnSpc>
+                <a:spcPct val="100000"/>
+              </a:lnSpc>
+              <a:spcBef>
+                <a:spcPts val="0"/>
+              </a:spcBef>
+              <a:spcAft>
+                <a:spcPts val="0"/>
+              </a:spcAft>
+              <a:buClrTx/>
+              <a:buSzTx/>
+              <a:buFontTx/>
+              <a:buNone/>
+              <a:tabLst/>
+              <a:defRPr/>
+            </a:pPr>
+            <a:r>
+              <a:rPr lang="cs-CZ" dirty="0" smtClean="0"/>
+              <a:t>SKIP</a:t>
+            </a:r>
+          </a:p>
+        </p:txBody>
+      </p:sp>
+      <p:sp>
+        <p:nvSpPr>
+          <p:cNvPr id="4" name="Zástupný symbol pro číslo snímku 3"/>
+          <p:cNvSpPr>
+            <a:spLocks noGrp="1"/>
+          </p:cNvSpPr>
+          <p:nvPr>
+            <p:ph type="sldNum" sz="quarter" idx="10"/>
+          </p:nvPr>
+        </p:nvSpPr>
+        <p:spPr/>
+        <p:txBody>
+          <a:bodyPr/>
+          <a:lstStyle/>
+          <a:p>
+            <a:fld id="{6FA6E7A2-E6B5-47DC-8D32-382F19FA4CCF}" type="slidenum">
+              <a:rPr lang="cs-CZ" smtClean="0"/>
+              <a:t>4</a:t>
+            </a:fld>
+            <a:endParaRPr lang="cs-CZ" dirty="0"/>
+          </a:p>
+        </p:txBody>
+      </p:sp>
+    </p:spTree>
+    <p:extLst>
+      <p:ext uri="{BB962C8B-B14F-4D97-AF65-F5344CB8AC3E}">
+        <p14:creationId xmlns:p14="http://schemas.microsoft.com/office/powerpoint/2010/main" val="431870831"/>
+      </p:ext>
+    </p:extLst>
+  </p:cSld>
+  <p:clrMapOvr>
+    <a:masterClrMapping/>
+  </p:clrMapOvr>
+</p:notes>
+</file>
+
+<file path=ppt/notesSlides/notesSlide5.xml><?xml version="1.0" encoding="utf-8"?>
+<p:notes xmlns:a="http://schemas.openxmlformats.org/drawingml/2006/main" xmlns:r="http://schemas.openxmlformats.org/officeDocument/2006/relationships" xmlns:p="http://schemas.openxmlformats.org/presentationml/2006/main">
+  <p:cSld>
+    <p:spTree>
+      <p:nvGrpSpPr>
+        <p:cNvPr id="1" name=""/>
+        <p:cNvGrpSpPr/>
+        <p:nvPr/>
+      </p:nvGrpSpPr>
+      <p:grpSpPr>
+        <a:xfrm>
+          <a:off x="0" y="0"/>
+          <a:ext cx="0" cy="0"/>
+          <a:chOff x="0" y="0"/>
+          <a:chExt cx="0" cy="0"/>
+        </a:xfrm>
+      </p:grpSpPr>
+      <p:sp>
+        <p:nvSpPr>
+          <p:cNvPr id="2" name="Zástupný symbol pro obrázek snímku 1"/>
+          <p:cNvSpPr>
+            <a:spLocks noGrp="1" noRot="1" noChangeAspect="1"/>
+          </p:cNvSpPr>
+          <p:nvPr>
+            <p:ph type="sldImg"/>
+          </p:nvPr>
+        </p:nvSpPr>
+        <p:spPr/>
+      </p:sp>
+      <p:sp>
+        <p:nvSpPr>
+          <p:cNvPr id="3" name="Zástupný symbol pro poznámky 2"/>
+          <p:cNvSpPr>
+            <a:spLocks noGrp="1"/>
+          </p:cNvSpPr>
+          <p:nvPr>
+            <p:ph type="body" idx="1"/>
+          </p:nvPr>
+        </p:nvSpPr>
+        <p:spPr/>
+        <p:txBody>
+          <a:bodyPr/>
+          <a:lstStyle/>
+          <a:p>
+            <a:r>
+              <a:rPr lang="cs-CZ" dirty="0" smtClean="0"/>
+              <a:t>Databáze</a:t>
+            </a:r>
+            <a:r>
+              <a:rPr lang="cs-CZ" baseline="0" dirty="0" smtClean="0"/>
+              <a:t> byla navrhnuta tak, že každá část notebooku má vlastní tabulku, která obsahuje jedinečné ID a všechny parametry, například RAM obsahuje typ, frekvenci a velikost. Všechny tyto tabulky se spojují do jediné velké M:N tabulky, která vše spojuje do jednoho celku. Hlavní tabulka navíc ještě kromě jednotlivých částí obsahuje rozměry jednotlivých modelů a unikátní produktové číslo. Nakonec je v databázi tabulka, obsahující veškerou historii vyhledávání a tabulka s </a:t>
+            </a:r>
+            <a:r>
+              <a:rPr lang="cs-CZ" baseline="0" dirty="0" err="1" smtClean="0"/>
+              <a:t>hashy</a:t>
+            </a:r>
+            <a:r>
+              <a:rPr lang="cs-CZ" baseline="0" dirty="0" smtClean="0"/>
+              <a:t> jednotlivých přidaných souborů.</a:t>
+            </a:r>
+          </a:p>
+        </p:txBody>
+      </p:sp>
+      <p:sp>
+        <p:nvSpPr>
+          <p:cNvPr id="4" name="Zástupný symbol pro číslo snímku 3"/>
+          <p:cNvSpPr>
+            <a:spLocks noGrp="1"/>
+          </p:cNvSpPr>
+          <p:nvPr>
+            <p:ph type="sldNum" sz="quarter" idx="10"/>
+          </p:nvPr>
+        </p:nvSpPr>
+        <p:spPr/>
+        <p:txBody>
+          <a:bodyPr/>
+          <a:lstStyle/>
+          <a:p>
+            <a:fld id="{6FA6E7A2-E6B5-47DC-8D32-382F19FA4CCF}" type="slidenum">
+              <a:rPr lang="cs-CZ" smtClean="0"/>
+              <a:t>5</a:t>
+            </a:fld>
+            <a:endParaRPr lang="cs-CZ"/>
+          </a:p>
+        </p:txBody>
+      </p:sp>
+    </p:spTree>
+    <p:extLst>
+      <p:ext uri="{BB962C8B-B14F-4D97-AF65-F5344CB8AC3E}">
+        <p14:creationId xmlns:p14="http://schemas.microsoft.com/office/powerpoint/2010/main" val="825345541"/>
+      </p:ext>
+    </p:extLst>
+  </p:cSld>
+  <p:clrMapOvr>
+    <a:masterClrMapping/>
+  </p:clrMapOvr>
+</p:notes>
+</file>
+
+<file path=ppt/notesSlides/notesSlide6.xml><?xml version="1.0" encoding="utf-8"?>
+<p:notes xmlns:a="http://schemas.openxmlformats.org/drawingml/2006/main" xmlns:r="http://schemas.openxmlformats.org/officeDocument/2006/relationships" xmlns:p="http://schemas.openxmlformats.org/presentationml/2006/main">
+  <p:cSld>
+    <p:spTree>
+      <p:nvGrpSpPr>
+        <p:cNvPr id="1" name=""/>
+        <p:cNvGrpSpPr/>
+        <p:nvPr/>
+      </p:nvGrpSpPr>
+      <p:grpSpPr>
+        <a:xfrm>
+          <a:off x="0" y="0"/>
+          <a:ext cx="0" cy="0"/>
+          <a:chOff x="0" y="0"/>
+          <a:chExt cx="0" cy="0"/>
+        </a:xfrm>
+      </p:grpSpPr>
+      <p:sp>
+        <p:nvSpPr>
+          <p:cNvPr id="2" name="Zástupný symbol pro obrázek snímku 1"/>
+          <p:cNvSpPr>
+            <a:spLocks noGrp="1" noRot="1" noChangeAspect="1"/>
+          </p:cNvSpPr>
+          <p:nvPr>
+            <p:ph type="sldImg"/>
+          </p:nvPr>
+        </p:nvSpPr>
+        <p:spPr/>
+      </p:sp>
+      <p:sp>
+        <p:nvSpPr>
+          <p:cNvPr id="3" name="Zástupný symbol pro poznámky 2"/>
+          <p:cNvSpPr>
+            <a:spLocks noGrp="1"/>
+          </p:cNvSpPr>
+          <p:nvPr>
+            <p:ph type="body" idx="1"/>
+          </p:nvPr>
+        </p:nvSpPr>
+        <p:spPr/>
+        <p:txBody>
+          <a:bodyPr/>
+          <a:lstStyle/>
+          <a:p>
+            <a:pPr marL="0" marR="0" lvl="0" indent="0" algn="l" defTabSz="914400" rtl="0" eaLnBrk="1" fontAlgn="auto" latinLnBrk="0" hangingPunct="1">
+              <a:lnSpc>
+                <a:spcPct val="100000"/>
+              </a:lnSpc>
+              <a:spcBef>
+                <a:spcPts val="0"/>
+              </a:spcBef>
+              <a:spcAft>
+                <a:spcPts val="0"/>
+              </a:spcAft>
+              <a:buClrTx/>
+              <a:buSzTx/>
+              <a:buFontTx/>
+              <a:buNone/>
+              <a:tabLst/>
+              <a:defRPr/>
+            </a:pPr>
+            <a:r>
+              <a:rPr lang="cs-CZ" dirty="0" smtClean="0"/>
+              <a:t>SKIP</a:t>
+            </a:r>
+          </a:p>
+        </p:txBody>
+      </p:sp>
+      <p:sp>
+        <p:nvSpPr>
+          <p:cNvPr id="4" name="Zástupný symbol pro číslo snímku 3"/>
+          <p:cNvSpPr>
+            <a:spLocks noGrp="1"/>
+          </p:cNvSpPr>
+          <p:nvPr>
+            <p:ph type="sldNum" sz="quarter" idx="10"/>
+          </p:nvPr>
+        </p:nvSpPr>
+        <p:spPr/>
+        <p:txBody>
+          <a:bodyPr/>
+          <a:lstStyle/>
+          <a:p>
+            <a:fld id="{6FA6E7A2-E6B5-47DC-8D32-382F19FA4CCF}" type="slidenum">
+              <a:rPr lang="cs-CZ" smtClean="0"/>
+              <a:t>6</a:t>
+            </a:fld>
+            <a:endParaRPr lang="cs-CZ"/>
+          </a:p>
+        </p:txBody>
+      </p:sp>
+    </p:spTree>
+    <p:extLst>
+      <p:ext uri="{BB962C8B-B14F-4D97-AF65-F5344CB8AC3E}">
+        <p14:creationId xmlns:p14="http://schemas.microsoft.com/office/powerpoint/2010/main" val="1930235934"/>
+      </p:ext>
+    </p:extLst>
+  </p:cSld>
+  <p:clrMapOvr>
+    <a:masterClrMapping/>
+  </p:clrMapOvr>
+</p:notes>
+</file>
+
+<file path=ppt/notesSlides/notesSlide7.xml><?xml version="1.0" encoding="utf-8"?>
+<p:notes xmlns:a="http://schemas.openxmlformats.org/drawingml/2006/main" xmlns:r="http://schemas.openxmlformats.org/officeDocument/2006/relationships" xmlns:p="http://schemas.openxmlformats.org/presentationml/2006/main">
+  <p:cSld>
+    <p:spTree>
+      <p:nvGrpSpPr>
+        <p:cNvPr id="1" name=""/>
+        <p:cNvGrpSpPr/>
+        <p:nvPr/>
+      </p:nvGrpSpPr>
+      <p:grpSpPr>
+        <a:xfrm>
+          <a:off x="0" y="0"/>
+          <a:ext cx="0" cy="0"/>
+          <a:chOff x="0" y="0"/>
+          <a:chExt cx="0" cy="0"/>
+        </a:xfrm>
+      </p:grpSpPr>
+      <p:sp>
+        <p:nvSpPr>
+          <p:cNvPr id="2" name="Zástupný symbol pro obrázek snímku 1"/>
+          <p:cNvSpPr>
+            <a:spLocks noGrp="1" noRot="1" noChangeAspect="1"/>
+          </p:cNvSpPr>
+          <p:nvPr>
+            <p:ph type="sldImg"/>
+          </p:nvPr>
+        </p:nvSpPr>
+        <p:spPr/>
+      </p:sp>
+      <p:sp>
+        <p:nvSpPr>
+          <p:cNvPr id="3" name="Zástupný symbol pro poznámky 2"/>
+          <p:cNvSpPr>
+            <a:spLocks noGrp="1"/>
+          </p:cNvSpPr>
+          <p:nvPr>
+            <p:ph type="body" idx="1"/>
+          </p:nvPr>
+        </p:nvSpPr>
+        <p:spPr/>
+        <p:txBody>
+          <a:bodyPr/>
+          <a:lstStyle/>
+          <a:p>
+            <a:endParaRPr lang="cs-CZ" baseline="0" dirty="0" smtClean="0"/>
+          </a:p>
+        </p:txBody>
+      </p:sp>
+      <p:sp>
+        <p:nvSpPr>
+          <p:cNvPr id="4" name="Zástupný symbol pro číslo snímku 3"/>
+          <p:cNvSpPr>
+            <a:spLocks noGrp="1"/>
+          </p:cNvSpPr>
+          <p:nvPr>
+            <p:ph type="sldNum" sz="quarter" idx="10"/>
+          </p:nvPr>
+        </p:nvSpPr>
+        <p:spPr/>
+        <p:txBody>
+          <a:bodyPr/>
+          <a:lstStyle/>
+          <a:p>
+            <a:fld id="{6FA6E7A2-E6B5-47DC-8D32-382F19FA4CCF}" type="slidenum">
+              <a:rPr lang="cs-CZ" smtClean="0"/>
+              <a:t>7</a:t>
+            </a:fld>
+            <a:endParaRPr lang="cs-CZ"/>
+          </a:p>
+        </p:txBody>
+      </p:sp>
+    </p:spTree>
+    <p:extLst>
+      <p:ext uri="{BB962C8B-B14F-4D97-AF65-F5344CB8AC3E}">
+        <p14:creationId xmlns:p14="http://schemas.microsoft.com/office/powerpoint/2010/main" val="4197859937"/>
+      </p:ext>
+    </p:extLst>
+  </p:cSld>
+  <p:clrMapOvr>
+    <a:masterClrMapping/>
+  </p:clrMapOvr>
+</p:notes>
+</file>
+
+<file path=ppt/notesSlides/notesSlide8.xml><?xml version="1.0" encoding="utf-8"?>
+<p:notes xmlns:a="http://schemas.openxmlformats.org/drawingml/2006/main" xmlns:r="http://schemas.openxmlformats.org/officeDocument/2006/relationships" xmlns:p="http://schemas.openxmlformats.org/presentationml/2006/main">
+  <p:cSld>
+    <p:spTree>
+      <p:nvGrpSpPr>
+        <p:cNvPr id="1" name=""/>
+        <p:cNvGrpSpPr/>
+        <p:nvPr/>
+      </p:nvGrpSpPr>
+      <p:grpSpPr>
+        <a:xfrm>
+          <a:off x="0" y="0"/>
+          <a:ext cx="0" cy="0"/>
+          <a:chOff x="0" y="0"/>
+          <a:chExt cx="0" cy="0"/>
+        </a:xfrm>
+      </p:grpSpPr>
+      <p:sp>
+        <p:nvSpPr>
+          <p:cNvPr id="2" name="Zástupný symbol pro obrázek snímku 1"/>
+          <p:cNvSpPr>
+            <a:spLocks noGrp="1" noRot="1" noChangeAspect="1"/>
+          </p:cNvSpPr>
+          <p:nvPr>
+            <p:ph type="sldImg"/>
+          </p:nvPr>
+        </p:nvSpPr>
+        <p:spPr/>
+      </p:sp>
+      <p:sp>
+        <p:nvSpPr>
+          <p:cNvPr id="3" name="Zástupný symbol pro poznámky 2"/>
+          <p:cNvSpPr>
+            <a:spLocks noGrp="1"/>
+          </p:cNvSpPr>
+          <p:nvPr>
+            <p:ph type="body" idx="1"/>
+          </p:nvPr>
+        </p:nvSpPr>
+        <p:spPr/>
+        <p:txBody>
+          <a:bodyPr/>
+          <a:lstStyle/>
+          <a:p>
+            <a:pPr marL="0" marR="0" lvl="0" indent="0" algn="l" defTabSz="914400" rtl="0" eaLnBrk="1" fontAlgn="auto" latinLnBrk="0" hangingPunct="1">
+              <a:lnSpc>
+                <a:spcPct val="100000"/>
+              </a:lnSpc>
+              <a:spcBef>
+                <a:spcPts val="0"/>
+              </a:spcBef>
+              <a:spcAft>
+                <a:spcPts val="0"/>
+              </a:spcAft>
+              <a:buClrTx/>
+              <a:buSzTx/>
+              <a:buFontTx/>
+              <a:buNone/>
+              <a:tabLst/>
+              <a:defRPr/>
+            </a:pPr>
+            <a:r>
+              <a:rPr lang="cs-CZ" dirty="0" smtClean="0"/>
+              <a:t>SKIP</a:t>
+            </a:r>
+          </a:p>
+        </p:txBody>
+      </p:sp>
+      <p:sp>
+        <p:nvSpPr>
+          <p:cNvPr id="4" name="Zástupný symbol pro číslo snímku 3"/>
+          <p:cNvSpPr>
+            <a:spLocks noGrp="1"/>
+          </p:cNvSpPr>
+          <p:nvPr>
+            <p:ph type="sldNum" sz="quarter" idx="10"/>
+          </p:nvPr>
+        </p:nvSpPr>
+        <p:spPr/>
+        <p:txBody>
+          <a:bodyPr/>
+          <a:lstStyle/>
+          <a:p>
+            <a:fld id="{6FA6E7A2-E6B5-47DC-8D32-382F19FA4CCF}" type="slidenum">
+              <a:rPr lang="cs-CZ" smtClean="0"/>
+              <a:t>8</a:t>
+            </a:fld>
+            <a:endParaRPr lang="cs-CZ"/>
+          </a:p>
+        </p:txBody>
+      </p:sp>
+    </p:spTree>
+    <p:extLst>
+      <p:ext uri="{BB962C8B-B14F-4D97-AF65-F5344CB8AC3E}">
+        <p14:creationId xmlns:p14="http://schemas.microsoft.com/office/powerpoint/2010/main" val="3851678940"/>
+      </p:ext>
+    </p:extLst>
+  </p:cSld>
+  <p:clrMapOvr>
+    <a:masterClrMapping/>
+  </p:clrMapOvr>
+</p:notes>
+</file>
+
+<file path=ppt/notesSlides/notesSlide9.xml><?xml version="1.0" encoding="utf-8"?>
+<p:notes xmlns:a="http://schemas.openxmlformats.org/drawingml/2006/main" xmlns:r="http://schemas.openxmlformats.org/officeDocument/2006/relationships" xmlns:p="http://schemas.openxmlformats.org/presentationml/2006/main">
+  <p:cSld>
+    <p:spTree>
+      <p:nvGrpSpPr>
+        <p:cNvPr id="1" name=""/>
+        <p:cNvGrpSpPr/>
+        <p:nvPr/>
+      </p:nvGrpSpPr>
+      <p:grpSpPr>
+        <a:xfrm>
+          <a:off x="0" y="0"/>
+          <a:ext cx="0" cy="0"/>
+          <a:chOff x="0" y="0"/>
+          <a:chExt cx="0" cy="0"/>
+        </a:xfrm>
+      </p:grpSpPr>
+      <p:sp>
+        <p:nvSpPr>
+          <p:cNvPr id="2" name="Zástupný symbol pro obrázek snímku 1"/>
+          <p:cNvSpPr>
+            <a:spLocks noGrp="1" noRot="1" noChangeAspect="1"/>
+          </p:cNvSpPr>
+          <p:nvPr>
+            <p:ph type="sldImg"/>
+          </p:nvPr>
+        </p:nvSpPr>
+        <p:spPr/>
+      </p:sp>
+      <p:sp>
+        <p:nvSpPr>
+          <p:cNvPr id="3" name="Zástupný symbol pro poznámky 2"/>
+          <p:cNvSpPr>
+            <a:spLocks noGrp="1"/>
+          </p:cNvSpPr>
+          <p:nvPr>
+            <p:ph type="body" idx="1"/>
+          </p:nvPr>
+        </p:nvSpPr>
+        <p:spPr/>
+        <p:txBody>
+          <a:bodyPr/>
+          <a:lstStyle/>
+          <a:p>
+            <a:r>
+              <a:rPr lang="cs-CZ" dirty="0" smtClean="0"/>
+              <a:t>Druhou částí</a:t>
+            </a:r>
+            <a:r>
+              <a:rPr lang="cs-CZ" baseline="0" dirty="0" smtClean="0"/>
+              <a:t> byla tvorba prostředí, tedy design.</a:t>
+            </a:r>
+            <a:endParaRPr lang="cs-CZ" dirty="0"/>
+          </a:p>
+        </p:txBody>
+      </p:sp>
+      <p:sp>
+        <p:nvSpPr>
+          <p:cNvPr id="4" name="Zástupný symbol pro číslo snímku 3"/>
+          <p:cNvSpPr>
+            <a:spLocks noGrp="1"/>
+          </p:cNvSpPr>
+          <p:nvPr>
+            <p:ph type="sldNum" sz="quarter" idx="10"/>
+          </p:nvPr>
+        </p:nvSpPr>
+        <p:spPr/>
+        <p:txBody>
+          <a:bodyPr/>
+          <a:lstStyle/>
+          <a:p>
+            <a:fld id="{6FA6E7A2-E6B5-47DC-8D32-382F19FA4CCF}" type="slidenum">
+              <a:rPr lang="cs-CZ" smtClean="0"/>
+              <a:t>9</a:t>
+            </a:fld>
+            <a:endParaRPr lang="cs-CZ"/>
+          </a:p>
+        </p:txBody>
+      </p:sp>
+    </p:spTree>
+    <p:extLst>
+      <p:ext uri="{BB962C8B-B14F-4D97-AF65-F5344CB8AC3E}">
+        <p14:creationId xmlns:p14="http://schemas.microsoft.com/office/powerpoint/2010/main" val="1706981654"/>
+      </p:ext>
+    </p:extLst>
+  </p:cSld>
+  <p:clrMapOvr>
+    <a:masterClrMapping/>
+  </p:clrMapOvr>
+</p:notes>
 </file>
 
 <file path=ppt/slideLayouts/slideLayout1.xml><?xml version="1.0" encoding="utf-8"?>
@@ -3185,7 +5428,7 @@
           <p:nvPr/>
         </p:nvPicPr>
         <p:blipFill>
-          <a:blip r:embed="rId2">
+          <a:blip r:embed="rId3">
             <a:extLst>
               <a:ext uri="{28A0092B-C50C-407E-A947-70E740481C1C}">
                 <a14:useLocalDpi xmlns:a14="http://schemas.microsoft.com/office/drawing/2010/main" val="0"/>
@@ -3275,70 +5518,10 @@
           <a:chExt cx="0" cy="0"/>
         </a:xfrm>
       </p:grpSpPr>
-      <p:pic>
-        <p:nvPicPr>
-          <p:cNvPr id="83" name="Obrázek 82"/>
-          <p:cNvPicPr>
-            <a:picLocks noChangeAspect="1"/>
-          </p:cNvPicPr>
-          <p:nvPr/>
-        </p:nvPicPr>
-        <p:blipFill>
-          <a:blip r:embed="rId2" cstate="print">
-            <a:extLst>
-              <a:ext uri="{28A0092B-C50C-407E-A947-70E740481C1C}">
-                <a14:useLocalDpi xmlns:a14="http://schemas.microsoft.com/office/drawing/2010/main" val="0"/>
-              </a:ext>
-            </a:extLst>
-          </a:blip>
-          <a:stretch>
-            <a:fillRect/>
-          </a:stretch>
-        </p:blipFill>
-        <p:spPr>
-          <a:xfrm>
-            <a:off x="310662" y="320153"/>
-            <a:ext cx="762001" cy="762001"/>
-          </a:xfrm>
-          <a:prstGeom prst="rect">
-            <a:avLst/>
-          </a:prstGeom>
-        </p:spPr>
-      </p:pic>
-      <p:pic>
-        <p:nvPicPr>
-          <p:cNvPr id="2" name="Obrázek 1"/>
-          <p:cNvPicPr>
-            <a:picLocks noChangeAspect="1"/>
-          </p:cNvPicPr>
-          <p:nvPr/>
-        </p:nvPicPr>
-        <p:blipFill>
-          <a:blip r:embed="rId3">
-            <a:extLst>
-              <a:ext uri="{28A0092B-C50C-407E-A947-70E740481C1C}">
-                <a14:useLocalDpi xmlns:a14="http://schemas.microsoft.com/office/drawing/2010/main" val="0"/>
-              </a:ext>
-            </a:extLst>
-          </a:blip>
-          <a:stretch>
-            <a:fillRect/>
-          </a:stretch>
-        </p:blipFill>
-        <p:spPr>
-          <a:xfrm>
-            <a:off x="1880599" y="1185549"/>
-            <a:ext cx="8430802" cy="4486901"/>
-          </a:xfrm>
-          <a:prstGeom prst="rect">
-            <a:avLst/>
-          </a:prstGeom>
-        </p:spPr>
-      </p:pic>
     </p:spTree>
     <p:extLst>
       <p:ext uri="{BB962C8B-B14F-4D97-AF65-F5344CB8AC3E}">
-        <p14:creationId xmlns:p14="http://schemas.microsoft.com/office/powerpoint/2010/main" val="2075301954"/>
+        <p14:creationId xmlns:p14="http://schemas.microsoft.com/office/powerpoint/2010/main" val="315682276"/>
       </p:ext>
     </p:extLst>
   </p:cSld>
@@ -3347,12 +5530,12 @@
   </p:clrMapOvr>
   <mc:AlternateContent xmlns:mc="http://schemas.openxmlformats.org/markup-compatibility/2006" xmlns:p14="http://schemas.microsoft.com/office/powerpoint/2010/main">
     <mc:Choice Requires="p14">
-      <p:transition spd="med" p14:dur="700" advClick="0">
+      <p:transition spd="med" p14:dur="700" advClick="0" advTm="0">
         <p:fade/>
       </p:transition>
     </mc:Choice>
     <mc:Fallback xmlns="">
-      <p:transition spd="med" advClick="0">
+      <p:transition spd="med" advClick="0" advTm="0">
         <p:fade/>
       </p:transition>
     </mc:Fallback>
@@ -3417,7 +5600,7 @@
           <p:nvPr/>
         </p:nvPicPr>
         <p:blipFill>
-          <a:blip r:embed="rId2" cstate="print">
+          <a:blip r:embed="rId3" cstate="print">
             <a:extLst>
               <a:ext uri="{28A0092B-C50C-407E-A947-70E740481C1C}">
                 <a14:useLocalDpi xmlns:a14="http://schemas.microsoft.com/office/drawing/2010/main" val="0"/>
@@ -3447,7 +5630,273 @@
           <p:nvPr/>
         </p:nvPicPr>
         <p:blipFill>
-          <a:blip r:embed="rId3">
+          <a:blip r:embed="rId4">
+            <a:extLst>
+              <a:ext uri="{28A0092B-C50C-407E-A947-70E740481C1C}">
+                <a14:useLocalDpi xmlns:a14="http://schemas.microsoft.com/office/drawing/2010/main" val="0"/>
+              </a:ext>
+            </a:extLst>
+          </a:blip>
+          <a:stretch>
+            <a:fillRect/>
+          </a:stretch>
+        </p:blipFill>
+        <p:spPr>
+          <a:xfrm>
+            <a:off x="1880599" y="1185549"/>
+            <a:ext cx="8430802" cy="4486901"/>
+          </a:xfrm>
+          <a:prstGeom prst="rect">
+            <a:avLst/>
+          </a:prstGeom>
+        </p:spPr>
+      </p:pic>
+    </p:spTree>
+    <p:extLst>
+      <p:ext uri="{BB962C8B-B14F-4D97-AF65-F5344CB8AC3E}">
+        <p14:creationId xmlns:p14="http://schemas.microsoft.com/office/powerpoint/2010/main" val="643218607"/>
+      </p:ext>
+    </p:extLst>
+  </p:cSld>
+  <p:clrMapOvr>
+    <a:masterClrMapping/>
+  </p:clrMapOvr>
+  <mc:AlternateContent xmlns:mc="http://schemas.openxmlformats.org/markup-compatibility/2006" xmlns:p14="http://schemas.microsoft.com/office/powerpoint/2010/main">
+    <mc:Choice Requires="p14">
+      <p:transition spd="med" p14:dur="700" advClick="0">
+        <p:fade/>
+      </p:transition>
+    </mc:Choice>
+    <mc:Fallback xmlns="">
+      <p:transition spd="med" advClick="0">
+        <p:fade/>
+      </p:transition>
+    </mc:Fallback>
+  </mc:AlternateContent>
+  <p:timing>
+    <p:tnLst>
+      <p:par>
+        <p:cTn id="1" dur="indefinite" restart="never" nodeType="tmRoot"/>
+      </p:par>
+    </p:tnLst>
+  </p:timing>
+</p:sld>
+</file>
+
+<file path=ppt/slides/slide12.xml><?xml version="1.0" encoding="utf-8"?>
+<p:sld xmlns:a="http://schemas.openxmlformats.org/drawingml/2006/main" xmlns:r="http://schemas.openxmlformats.org/officeDocument/2006/relationships" xmlns:p="http://schemas.openxmlformats.org/presentationml/2006/main">
+  <p:cSld>
+    <p:bg>
+      <p:bgPr>
+        <a:gradFill flip="none" rotWithShape="1">
+          <a:gsLst>
+            <a:gs pos="0">
+              <a:schemeClr val="accent1">
+                <a:lumMod val="100000"/>
+              </a:schemeClr>
+            </a:gs>
+            <a:gs pos="50000">
+              <a:srgbClr val="5899D4"/>
+            </a:gs>
+            <a:gs pos="100000">
+              <a:schemeClr val="accent1">
+                <a:lumMod val="100000"/>
+              </a:schemeClr>
+            </a:gs>
+          </a:gsLst>
+          <a:lin ang="2700000" scaled="1"/>
+          <a:tileRect/>
+        </a:gradFill>
+        <a:effectLst/>
+      </p:bgPr>
+    </p:bg>
+    <p:spTree>
+      <p:nvGrpSpPr>
+        <p:cNvPr id="1" name=""/>
+        <p:cNvGrpSpPr/>
+        <p:nvPr/>
+      </p:nvGrpSpPr>
+      <p:grpSpPr>
+        <a:xfrm>
+          <a:off x="0" y="0"/>
+          <a:ext cx="0" cy="0"/>
+          <a:chOff x="0" y="0"/>
+          <a:chExt cx="0" cy="0"/>
+        </a:xfrm>
+      </p:grpSpPr>
+      <p:pic>
+        <p:nvPicPr>
+          <p:cNvPr id="83" name="Obrázek 82"/>
+          <p:cNvPicPr>
+            <a:picLocks noChangeAspect="1"/>
+          </p:cNvPicPr>
+          <p:nvPr/>
+        </p:nvPicPr>
+        <p:blipFill>
+          <a:blip r:embed="rId3" cstate="print">
+            <a:extLst>
+              <a:ext uri="{28A0092B-C50C-407E-A947-70E740481C1C}">
+                <a14:useLocalDpi xmlns:a14="http://schemas.microsoft.com/office/drawing/2010/main" val="0"/>
+              </a:ext>
+            </a:extLst>
+          </a:blip>
+          <a:stretch>
+            <a:fillRect/>
+          </a:stretch>
+        </p:blipFill>
+        <p:spPr>
+          <a:xfrm>
+            <a:off x="310662" y="320153"/>
+            <a:ext cx="762001" cy="762001"/>
+          </a:xfrm>
+          <a:prstGeom prst="rect">
+            <a:avLst/>
+          </a:prstGeom>
+        </p:spPr>
+      </p:pic>
+      <p:pic>
+        <p:nvPicPr>
+          <p:cNvPr id="2" name="Obrázek 1"/>
+          <p:cNvPicPr>
+            <a:picLocks noChangeAspect="1"/>
+          </p:cNvPicPr>
+          <p:nvPr/>
+        </p:nvPicPr>
+        <p:blipFill>
+          <a:blip r:embed="rId4">
+            <a:extLst>
+              <a:ext uri="{28A0092B-C50C-407E-A947-70E740481C1C}">
+                <a14:useLocalDpi xmlns:a14="http://schemas.microsoft.com/office/drawing/2010/main" val="0"/>
+              </a:ext>
+            </a:extLst>
+          </a:blip>
+          <a:stretch>
+            <a:fillRect/>
+          </a:stretch>
+        </p:blipFill>
+        <p:spPr>
+          <a:xfrm>
+            <a:off x="1880599" y="1185549"/>
+            <a:ext cx="8430802" cy="4486901"/>
+          </a:xfrm>
+          <a:prstGeom prst="rect">
+            <a:avLst/>
+          </a:prstGeom>
+        </p:spPr>
+      </p:pic>
+    </p:spTree>
+    <p:extLst>
+      <p:ext uri="{BB962C8B-B14F-4D97-AF65-F5344CB8AC3E}">
+        <p14:creationId xmlns:p14="http://schemas.microsoft.com/office/powerpoint/2010/main" val="2075301954"/>
+      </p:ext>
+    </p:extLst>
+  </p:cSld>
+  <p:clrMapOvr>
+    <a:masterClrMapping/>
+  </p:clrMapOvr>
+  <mc:AlternateContent xmlns:mc="http://schemas.openxmlformats.org/markup-compatibility/2006" xmlns:p14="http://schemas.microsoft.com/office/powerpoint/2010/main">
+    <mc:Choice Requires="p14">
+      <p:transition spd="med" p14:dur="700" advClick="0">
+        <p:fade/>
+      </p:transition>
+    </mc:Choice>
+    <mc:Fallback xmlns="">
+      <p:transition spd="med" advClick="0">
+        <p:fade/>
+      </p:transition>
+    </mc:Fallback>
+  </mc:AlternateContent>
+  <p:timing>
+    <p:tnLst>
+      <p:par>
+        <p:cTn id="1" dur="indefinite" restart="never" nodeType="tmRoot"/>
+      </p:par>
+    </p:tnLst>
+  </p:timing>
+</p:sld>
+</file>
+
+<file path=ppt/slides/slide13.xml><?xml version="1.0" encoding="utf-8"?>
+<p:sld xmlns:a="http://schemas.openxmlformats.org/drawingml/2006/main" xmlns:r="http://schemas.openxmlformats.org/officeDocument/2006/relationships" xmlns:p="http://schemas.openxmlformats.org/presentationml/2006/main">
+  <p:cSld>
+    <p:bg>
+      <p:bgPr>
+        <a:gradFill flip="none" rotWithShape="1">
+          <a:gsLst>
+            <a:gs pos="0">
+              <a:schemeClr val="accent1">
+                <a:lumMod val="100000"/>
+              </a:schemeClr>
+            </a:gs>
+            <a:gs pos="50000">
+              <a:srgbClr val="5899D4"/>
+            </a:gs>
+            <a:gs pos="100000">
+              <a:schemeClr val="accent1">
+                <a:lumMod val="100000"/>
+              </a:schemeClr>
+            </a:gs>
+          </a:gsLst>
+          <a:lin ang="2700000" scaled="1"/>
+          <a:tileRect/>
+        </a:gradFill>
+        <a:effectLst/>
+      </p:bgPr>
+    </p:bg>
+    <p:spTree>
+      <p:nvGrpSpPr>
+        <p:cNvPr id="1" name=""/>
+        <p:cNvGrpSpPr/>
+        <p:nvPr/>
+      </p:nvGrpSpPr>
+      <p:grpSpPr>
+        <a:xfrm>
+          <a:off x="0" y="0"/>
+          <a:ext cx="0" cy="0"/>
+          <a:chOff x="0" y="0"/>
+          <a:chExt cx="0" cy="0"/>
+        </a:xfrm>
+      </p:grpSpPr>
+      <p:pic>
+        <p:nvPicPr>
+          <p:cNvPr id="83" name="Obrázek 82"/>
+          <p:cNvPicPr>
+            <a:picLocks noChangeAspect="1"/>
+          </p:cNvPicPr>
+          <p:nvPr/>
+        </p:nvPicPr>
+        <p:blipFill>
+          <a:blip r:embed="rId3" cstate="print">
+            <a:extLst>
+              <a:ext uri="{28A0092B-C50C-407E-A947-70E740481C1C}">
+                <a14:useLocalDpi xmlns:a14="http://schemas.microsoft.com/office/drawing/2010/main" val="0"/>
+              </a:ext>
+            </a:extLst>
+          </a:blip>
+          <a:stretch>
+            <a:fillRect/>
+          </a:stretch>
+        </p:blipFill>
+        <p:spPr>
+          <a:xfrm>
+            <a:off x="310662" y="320153"/>
+            <a:ext cx="762001" cy="762001"/>
+          </a:xfrm>
+          <a:prstGeom prst="rect">
+            <a:avLst/>
+          </a:prstGeom>
+        </p:spPr>
+      </p:pic>
+      <p:pic>
+        <p:nvPicPr>
+          <p:cNvPr id="2" name="Obrázek 1"/>
+          <p:cNvPicPr>
+            <a:picLocks noChangeAspect="1"/>
+          </p:cNvPicPr>
+          <p:nvPr/>
+        </p:nvPicPr>
+        <p:blipFill>
+          <a:blip r:embed="rId4">
             <a:extLst>
               <a:ext uri="{28A0092B-C50C-407E-A947-70E740481C1C}">
                 <a14:useLocalDpi xmlns:a14="http://schemas.microsoft.com/office/drawing/2010/main" val="0"/>
@@ -3500,7 +5949,7 @@
 </p:sld>
 </file>
 
-<file path=ppt/slides/slide12.xml><?xml version="1.0" encoding="utf-8"?>
+<file path=ppt/slides/slide14.xml><?xml version="1.0" encoding="utf-8"?>
 <p:sld xmlns:a="http://schemas.openxmlformats.org/drawingml/2006/main" xmlns:r="http://schemas.openxmlformats.org/officeDocument/2006/relationships" xmlns:p="http://schemas.openxmlformats.org/presentationml/2006/main">
   <p:cSld>
     <p:bg>
@@ -3573,7 +6022,7 @@
 </p:sld>
 </file>
 
-<file path=ppt/slides/slide13.xml><?xml version="1.0" encoding="utf-8"?>
+<file path=ppt/slides/slide15.xml><?xml version="1.0" encoding="utf-8"?>
 <p:sld xmlns:a="http://schemas.openxmlformats.org/drawingml/2006/main" xmlns:r="http://schemas.openxmlformats.org/officeDocument/2006/relationships" xmlns:p="http://schemas.openxmlformats.org/presentationml/2006/main">
   <p:cSld>
     <p:bg>
@@ -3623,7 +6072,7 @@
           <p:nvPr/>
         </p:nvPicPr>
         <p:blipFill>
-          <a:blip r:embed="rId2" cstate="print">
+          <a:blip r:embed="rId3" cstate="print">
             <a:extLst>
               <a:ext uri="{28A0092B-C50C-407E-A947-70E740481C1C}">
                 <a14:useLocalDpi xmlns:a14="http://schemas.microsoft.com/office/drawing/2010/main" val="0"/>
@@ -3706,7 +6155,7 @@
 </p:sld>
 </file>
 
-<file path=ppt/slides/slide14.xml><?xml version="1.0" encoding="utf-8"?>
+<file path=ppt/slides/slide16.xml><?xml version="1.0" encoding="utf-8"?>
 <p:sld xmlns:a="http://schemas.openxmlformats.org/drawingml/2006/main" xmlns:r="http://schemas.openxmlformats.org/officeDocument/2006/relationships" xmlns:p="http://schemas.openxmlformats.org/presentationml/2006/main">
   <p:cSld>
     <p:bg>
@@ -3779,7 +6228,7 @@
 </p:sld>
 </file>
 
-<file path=ppt/slides/slide15.xml><?xml version="1.0" encoding="utf-8"?>
+<file path=ppt/slides/slide17.xml><?xml version="1.0" encoding="utf-8"?>
 <p:sld xmlns:a="http://schemas.openxmlformats.org/drawingml/2006/main" xmlns:r="http://schemas.openxmlformats.org/officeDocument/2006/relationships" xmlns:p="http://schemas.openxmlformats.org/presentationml/2006/main">
   <p:cSld>
     <p:bg>
@@ -3829,7 +6278,7 @@
           <p:nvPr/>
         </p:nvPicPr>
         <p:blipFill>
-          <a:blip r:embed="rId2" cstate="print">
+          <a:blip r:embed="rId3" cstate="print">
             <a:extLst>
               <a:ext uri="{28A0092B-C50C-407E-A947-70E740481C1C}">
                 <a14:useLocalDpi xmlns:a14="http://schemas.microsoft.com/office/drawing/2010/main" val="0"/>
@@ -5300,7 +7749,7 @@
 </p:sld>
 </file>
 
-<file path=ppt/slides/slide16.xml><?xml version="1.0" encoding="utf-8"?>
+<file path=ppt/slides/slide18.xml><?xml version="1.0" encoding="utf-8"?>
 <p:sld xmlns:a="http://schemas.openxmlformats.org/drawingml/2006/main" xmlns:r="http://schemas.openxmlformats.org/officeDocument/2006/relationships" xmlns:p="http://schemas.openxmlformats.org/presentationml/2006/main">
   <p:cSld>
     <p:bg>
@@ -5373,7 +7822,7 @@
 </p:sld>
 </file>
 
-<file path=ppt/slides/slide17.xml><?xml version="1.0" encoding="utf-8"?>
+<file path=ppt/slides/slide19.xml><?xml version="1.0" encoding="utf-8"?>
 <p:sld xmlns:a="http://schemas.openxmlformats.org/drawingml/2006/main" xmlns:r="http://schemas.openxmlformats.org/officeDocument/2006/relationships" xmlns:p="http://schemas.openxmlformats.org/presentationml/2006/main">
   <p:cSld>
     <p:bg>
@@ -5423,36 +7872,6 @@
           <p:nvPr/>
         </p:nvPicPr>
         <p:blipFill>
-          <a:blip r:embed="rId2" cstate="print">
-            <a:extLst>
-              <a:ext uri="{28A0092B-C50C-407E-A947-70E740481C1C}">
-                <a14:useLocalDpi xmlns:a14="http://schemas.microsoft.com/office/drawing/2010/main" val="0"/>
-              </a:ext>
-            </a:extLst>
-          </a:blip>
-          <a:stretch>
-            <a:fillRect/>
-          </a:stretch>
-        </p:blipFill>
-        <p:spPr>
-          <a:xfrm>
-            <a:off x="1512275" y="1213336"/>
-            <a:ext cx="762001" cy="762001"/>
-          </a:xfrm>
-          <a:prstGeom prst="rect">
-            <a:avLst/>
-          </a:prstGeom>
-        </p:spPr>
-      </p:pic>
-      <p:pic>
-        <p:nvPicPr>
-          <p:cNvPr id="3" name="Obrázek 2"/>
-          <p:cNvPicPr>
-            <a:picLocks noChangeAspect="1"/>
-          </p:cNvPicPr>
-          <p:nvPr/>
-        </p:nvPicPr>
-        <p:blipFill>
           <a:blip r:embed="rId3" cstate="print">
             <a:extLst>
               <a:ext uri="{28A0092B-C50C-407E-A947-70E740481C1C}">
@@ -5466,6 +7885,36 @@
         </p:blipFill>
         <p:spPr>
           <a:xfrm>
+            <a:off x="1512275" y="1213336"/>
+            <a:ext cx="762001" cy="762001"/>
+          </a:xfrm>
+          <a:prstGeom prst="rect">
+            <a:avLst/>
+          </a:prstGeom>
+        </p:spPr>
+      </p:pic>
+      <p:pic>
+        <p:nvPicPr>
+          <p:cNvPr id="3" name="Obrázek 2"/>
+          <p:cNvPicPr>
+            <a:picLocks noChangeAspect="1"/>
+          </p:cNvPicPr>
+          <p:nvPr/>
+        </p:nvPicPr>
+        <p:blipFill>
+          <a:blip r:embed="rId4" cstate="print">
+            <a:extLst>
+              <a:ext uri="{28A0092B-C50C-407E-A947-70E740481C1C}">
+                <a14:useLocalDpi xmlns:a14="http://schemas.microsoft.com/office/drawing/2010/main" val="0"/>
+              </a:ext>
+            </a:extLst>
+          </a:blip>
+          <a:stretch>
+            <a:fillRect/>
+          </a:stretch>
+        </p:blipFill>
+        <p:spPr>
+          <a:xfrm>
             <a:off x="1512275" y="3107667"/>
             <a:ext cx="762001" cy="762001"/>
           </a:xfrm>
@@ -5483,7 +7932,7 @@
           <p:nvPr/>
         </p:nvPicPr>
         <p:blipFill>
-          <a:blip r:embed="rId4" cstate="print">
+          <a:blip r:embed="rId5" cstate="print">
             <a:extLst>
               <a:ext uri="{28A0092B-C50C-407E-A947-70E740481C1C}">
                 <a14:useLocalDpi xmlns:a14="http://schemas.microsoft.com/office/drawing/2010/main" val="0"/>
@@ -5839,7 +8288,7 @@
           <p:nvPr/>
         </p:nvPicPr>
         <p:blipFill>
-          <a:blip r:embed="rId2" cstate="print">
+          <a:blip r:embed="rId3" cstate="print">
             <a:extLst>
               <a:ext uri="{28A0092B-C50C-407E-A947-70E740481C1C}">
                 <a14:useLocalDpi xmlns:a14="http://schemas.microsoft.com/office/drawing/2010/main" val="0"/>
@@ -8187,7 +10636,7 @@
           <p:nvPr/>
         </p:nvPicPr>
         <p:blipFill>
-          <a:blip r:embed="rId2" cstate="print">
+          <a:blip r:embed="rId3" cstate="print">
             <a:extLst>
               <a:ext uri="{28A0092B-C50C-407E-A947-70E740481C1C}">
                 <a14:useLocalDpi xmlns:a14="http://schemas.microsoft.com/office/drawing/2010/main" val="0"/>
@@ -8218,13 +10667,13 @@
   <p:clrMapOvr>
     <a:masterClrMapping/>
   </p:clrMapOvr>
-  <mc:AlternateContent xmlns:mc="http://schemas.openxmlformats.org/markup-compatibility/2006">
-    <mc:Choice xmlns:p14="http://schemas.microsoft.com/office/powerpoint/2010/main" Requires="p14">
+  <mc:AlternateContent xmlns:mc="http://schemas.openxmlformats.org/markup-compatibility/2006" xmlns:p14="http://schemas.microsoft.com/office/powerpoint/2010/main">
+    <mc:Choice Requires="p14">
       <p:transition spd="med" p14:dur="700" advClick="0">
         <p:fade/>
       </p:transition>
     </mc:Choice>
-    <mc:Fallback>
+    <mc:Fallback xmlns="">
       <p:transition spd="med" advClick="0">
         <p:fade/>
       </p:transition>
@@ -8356,14 +10805,14 @@
       </p:grpSpPr>
       <p:pic>
         <p:nvPicPr>
-          <p:cNvPr id="2" name="Obrázek 1"/>
+          <p:cNvPr id="83" name="Obrázek 82"/>
           <p:cNvPicPr>
             <a:picLocks noChangeAspect="1"/>
           </p:cNvPicPr>
           <p:nvPr/>
         </p:nvPicPr>
         <p:blipFill>
-          <a:blip r:embed="rId2" cstate="print">
+          <a:blip r:embed="rId3" cstate="print">
             <a:extLst>
               <a:ext uri="{28A0092B-C50C-407E-A947-70E740481C1C}">
                 <a14:useLocalDpi xmlns:a14="http://schemas.microsoft.com/office/drawing/2010/main" val="0"/>
@@ -8376,7 +10825,7 @@
         </p:blipFill>
         <p:spPr>
           <a:xfrm>
-            <a:off x="5715000" y="2486405"/>
+            <a:off x="310662" y="320153"/>
             <a:ext cx="762001" cy="762001"/>
           </a:xfrm>
           <a:prstGeom prst="rect">
@@ -8386,14 +10835,237 @@
       </p:pic>
       <p:sp>
         <p:nvSpPr>
-          <p:cNvPr id="3" name="TextovéPole 2"/>
+          <p:cNvPr id="44" name="Obdélník 43"/>
+          <p:cNvSpPr/>
+          <p:nvPr/>
+        </p:nvSpPr>
+        <p:spPr>
+          <a:xfrm>
+            <a:off x="4876800" y="3746500"/>
+            <a:ext cx="3879266" cy="2527300"/>
+          </a:xfrm>
+          <a:prstGeom prst="rect">
+            <a:avLst/>
+          </a:prstGeom>
+          <a:noFill/>
+          <a:ln>
+            <a:solidFill>
+              <a:schemeClr val="tx1"/>
+            </a:solidFill>
+            <a:prstDash val="dash"/>
+          </a:ln>
+        </p:spPr>
+        <p:style>
+          <a:lnRef idx="2">
+            <a:schemeClr val="accent1">
+              <a:shade val="50000"/>
+            </a:schemeClr>
+          </a:lnRef>
+          <a:fillRef idx="1">
+            <a:schemeClr val="accent1"/>
+          </a:fillRef>
+          <a:effectRef idx="0">
+            <a:schemeClr val="accent1"/>
+          </a:effectRef>
+          <a:fontRef idx="minor">
+            <a:schemeClr val="lt1"/>
+          </a:fontRef>
+        </p:style>
+        <p:txBody>
+          <a:bodyPr rtlCol="0" anchor="ctr"/>
+          <a:lstStyle/>
+          <a:p>
+            <a:pPr algn="ctr"/>
+            <a:endParaRPr lang="cs-CZ" dirty="0"/>
+          </a:p>
+        </p:txBody>
+      </p:sp>
+      <p:sp>
+        <p:nvSpPr>
+          <p:cNvPr id="54" name="Obdélník 53"/>
+          <p:cNvSpPr/>
+          <p:nvPr/>
+        </p:nvSpPr>
+        <p:spPr>
+          <a:xfrm>
+            <a:off x="2032000" y="807672"/>
+            <a:ext cx="2565400" cy="5466128"/>
+          </a:xfrm>
+          <a:prstGeom prst="rect">
+            <a:avLst/>
+          </a:prstGeom>
+          <a:noFill/>
+          <a:ln>
+            <a:solidFill>
+              <a:schemeClr val="tx1"/>
+            </a:solidFill>
+            <a:prstDash val="dash"/>
+          </a:ln>
+        </p:spPr>
+        <p:style>
+          <a:lnRef idx="2">
+            <a:schemeClr val="accent1">
+              <a:shade val="50000"/>
+            </a:schemeClr>
+          </a:lnRef>
+          <a:fillRef idx="1">
+            <a:schemeClr val="accent1"/>
+          </a:fillRef>
+          <a:effectRef idx="0">
+            <a:schemeClr val="accent1"/>
+          </a:effectRef>
+          <a:fontRef idx="minor">
+            <a:schemeClr val="lt1"/>
+          </a:fontRef>
+        </p:style>
+        <p:txBody>
+          <a:bodyPr rtlCol="0" anchor="ctr"/>
+          <a:lstStyle/>
+          <a:p>
+            <a:pPr algn="ctr"/>
+            <a:endParaRPr lang="cs-CZ" dirty="0"/>
+          </a:p>
+        </p:txBody>
+      </p:sp>
+      <p:sp>
+        <p:nvSpPr>
+          <p:cNvPr id="55" name="Obdélník 54"/>
+          <p:cNvSpPr/>
+          <p:nvPr/>
+        </p:nvSpPr>
+        <p:spPr>
+          <a:xfrm>
+            <a:off x="2305944" y="1082154"/>
+            <a:ext cx="2017512" cy="1157654"/>
+          </a:xfrm>
+          <a:prstGeom prst="rect">
+            <a:avLst/>
+          </a:prstGeom>
+          <a:solidFill>
+            <a:schemeClr val="tx2">
+              <a:lumMod val="50000"/>
+            </a:schemeClr>
+          </a:solidFill>
+          <a:ln w="25400" cap="flat" cmpd="sng" algn="ctr">
+            <a:solidFill>
+              <a:schemeClr val="dk1"/>
+            </a:solidFill>
+            <a:prstDash val="solid"/>
+            <a:round/>
+            <a:headEnd type="none" w="med" len="med"/>
+            <a:tailEnd type="none" w="med" len="med"/>
+          </a:ln>
+        </p:spPr>
+        <p:style>
+          <a:lnRef idx="0">
+            <a:scrgbClr r="0" g="0" b="0"/>
+          </a:lnRef>
+          <a:fillRef idx="0">
+            <a:scrgbClr r="0" g="0" b="0"/>
+          </a:fillRef>
+          <a:effectRef idx="0">
+            <a:scrgbClr r="0" g="0" b="0"/>
+          </a:effectRef>
+          <a:fontRef idx="minor">
+            <a:schemeClr val="dk1"/>
+          </a:fontRef>
+        </p:style>
+        <p:txBody>
+          <a:bodyPr rtlCol="0" anchor="ctr"/>
+          <a:lstStyle/>
+          <a:p>
+            <a:pPr algn="ctr"/>
+            <a:r>
+              <a:rPr lang="cs-CZ" dirty="0" smtClean="0">
+                <a:solidFill>
+                  <a:schemeClr val="bg1"/>
+                </a:solidFill>
+              </a:rPr>
+              <a:t>IDBConnector</a:t>
+            </a:r>
+            <a:endParaRPr lang="cs-CZ" dirty="0">
+              <a:solidFill>
+                <a:schemeClr val="bg1"/>
+              </a:solidFill>
+            </a:endParaRPr>
+          </a:p>
+        </p:txBody>
+      </p:sp>
+      <p:sp>
+        <p:nvSpPr>
+          <p:cNvPr id="56" name="Obdélník 55"/>
+          <p:cNvSpPr/>
+          <p:nvPr/>
+        </p:nvSpPr>
+        <p:spPr>
+          <a:xfrm>
+            <a:off x="2305944" y="2514290"/>
+            <a:ext cx="2017512" cy="487883"/>
+          </a:xfrm>
+          <a:prstGeom prst="rect">
+            <a:avLst/>
+          </a:prstGeom>
+          <a:solidFill>
+            <a:schemeClr val="tx1">
+              <a:lumMod val="65000"/>
+              <a:lumOff val="35000"/>
+            </a:schemeClr>
+          </a:solidFill>
+          <a:ln w="15875" cap="flat" cmpd="sng" algn="ctr">
+            <a:solidFill>
+              <a:schemeClr val="dk1"/>
+            </a:solidFill>
+            <a:prstDash val="solid"/>
+            <a:round/>
+            <a:headEnd type="none" w="med" len="med"/>
+            <a:tailEnd type="none" w="med" len="med"/>
+          </a:ln>
+        </p:spPr>
+        <p:style>
+          <a:lnRef idx="0">
+            <a:scrgbClr r="0" g="0" b="0"/>
+          </a:lnRef>
+          <a:fillRef idx="0">
+            <a:scrgbClr r="0" g="0" b="0"/>
+          </a:fillRef>
+          <a:effectRef idx="0">
+            <a:scrgbClr r="0" g="0" b="0"/>
+          </a:effectRef>
+          <a:fontRef idx="minor">
+            <a:schemeClr val="dk1"/>
+          </a:fontRef>
+        </p:style>
+        <p:txBody>
+          <a:bodyPr rtlCol="0" anchor="ctr"/>
+          <a:lstStyle/>
+          <a:p>
+            <a:pPr algn="ctr"/>
+            <a:r>
+              <a:rPr lang="cs-CZ" dirty="0" smtClean="0">
+                <a:solidFill>
+                  <a:schemeClr val="bg1"/>
+                </a:solidFill>
+              </a:rPr>
+              <a:t>MSSQLConnector</a:t>
+            </a:r>
+            <a:endParaRPr lang="cs-CZ" dirty="0">
+              <a:solidFill>
+                <a:schemeClr val="bg1"/>
+              </a:solidFill>
+            </a:endParaRPr>
+          </a:p>
+        </p:txBody>
+      </p:sp>
+      <p:sp>
+        <p:nvSpPr>
+          <p:cNvPr id="57" name="TextovéPole 56"/>
           <p:cNvSpPr txBox="1"/>
           <p:nvPr/>
         </p:nvSpPr>
         <p:spPr>
           <a:xfrm>
-            <a:off x="5583680" y="3468911"/>
-            <a:ext cx="1024639" cy="461665"/>
+            <a:off x="3143018" y="3265691"/>
+            <a:ext cx="343364" cy="923330"/>
           </a:xfrm>
           <a:prstGeom prst="rect">
             <a:avLst/>
@@ -8407,17 +11079,1182 @@
           <a:lstStyle/>
           <a:p>
             <a:r>
-              <a:rPr lang="cs-CZ" sz="2400" dirty="0" smtClean="0"/>
-              <a:t>Design</a:t>
-            </a:r>
-            <a:endParaRPr lang="cs-CZ" sz="2400" dirty="0"/>
-          </a:p>
-        </p:txBody>
-      </p:sp>
+              <a:rPr lang="cs-CZ" dirty="0" smtClean="0"/>
+              <a:t>…</a:t>
+            </a:r>
+          </a:p>
+          <a:p>
+            <a:r>
+              <a:rPr lang="cs-CZ" dirty="0" smtClean="0"/>
+              <a:t>…</a:t>
+            </a:r>
+          </a:p>
+          <a:p>
+            <a:r>
+              <a:rPr lang="cs-CZ" dirty="0" smtClean="0"/>
+              <a:t>…</a:t>
+            </a:r>
+          </a:p>
+        </p:txBody>
+      </p:sp>
+      <p:cxnSp>
+        <p:nvCxnSpPr>
+          <p:cNvPr id="58" name="Přímá spojnice 57"/>
+          <p:cNvCxnSpPr>
+            <a:stCxn id="55" idx="2"/>
+            <a:endCxn id="56" idx="0"/>
+          </p:cNvCxnSpPr>
+          <p:nvPr/>
+        </p:nvCxnSpPr>
+        <p:spPr>
+          <a:xfrm>
+            <a:off x="3314700" y="2239808"/>
+            <a:ext cx="0" cy="274482"/>
+          </a:xfrm>
+          <a:prstGeom prst="line">
+            <a:avLst/>
+          </a:prstGeom>
+          <a:ln>
+            <a:solidFill>
+              <a:schemeClr val="tx1"/>
+            </a:solidFill>
+          </a:ln>
+        </p:spPr>
+        <p:style>
+          <a:lnRef idx="1">
+            <a:schemeClr val="accent1"/>
+          </a:lnRef>
+          <a:fillRef idx="0">
+            <a:schemeClr val="accent1"/>
+          </a:fillRef>
+          <a:effectRef idx="0">
+            <a:schemeClr val="accent1"/>
+          </a:effectRef>
+          <a:fontRef idx="minor">
+            <a:schemeClr val="tx1"/>
+          </a:fontRef>
+        </p:style>
+      </p:cxnSp>
+      <p:sp>
+        <p:nvSpPr>
+          <p:cNvPr id="59" name="Obdélník 58"/>
+          <p:cNvSpPr/>
+          <p:nvPr/>
+        </p:nvSpPr>
+        <p:spPr>
+          <a:xfrm>
+            <a:off x="5827765" y="1082154"/>
+            <a:ext cx="2017512" cy="1157654"/>
+          </a:xfrm>
+          <a:prstGeom prst="rect">
+            <a:avLst/>
+          </a:prstGeom>
+          <a:solidFill>
+            <a:schemeClr val="tx2">
+              <a:lumMod val="50000"/>
+            </a:schemeClr>
+          </a:solidFill>
+          <a:ln w="25400" cap="flat" cmpd="sng" algn="ctr">
+            <a:solidFill>
+              <a:schemeClr val="dk1"/>
+            </a:solidFill>
+            <a:prstDash val="solid"/>
+            <a:round/>
+            <a:headEnd type="none" w="med" len="med"/>
+            <a:tailEnd type="none" w="med" len="med"/>
+          </a:ln>
+        </p:spPr>
+        <p:style>
+          <a:lnRef idx="0">
+            <a:scrgbClr r="0" g="0" b="0"/>
+          </a:lnRef>
+          <a:fillRef idx="0">
+            <a:scrgbClr r="0" g="0" b="0"/>
+          </a:fillRef>
+          <a:effectRef idx="0">
+            <a:scrgbClr r="0" g="0" b="0"/>
+          </a:effectRef>
+          <a:fontRef idx="minor">
+            <a:schemeClr val="dk1"/>
+          </a:fontRef>
+        </p:style>
+        <p:txBody>
+          <a:bodyPr rtlCol="0" anchor="ctr"/>
+          <a:lstStyle/>
+          <a:p>
+            <a:pPr algn="ctr"/>
+            <a:r>
+              <a:rPr lang="cs-CZ" dirty="0" smtClean="0">
+                <a:solidFill>
+                  <a:schemeClr val="bg1"/>
+                </a:solidFill>
+              </a:rPr>
+              <a:t>Application</a:t>
+            </a:r>
+            <a:endParaRPr lang="cs-CZ" dirty="0">
+              <a:solidFill>
+                <a:schemeClr val="bg1"/>
+              </a:solidFill>
+            </a:endParaRPr>
+          </a:p>
+        </p:txBody>
+      </p:sp>
+      <p:sp>
+        <p:nvSpPr>
+          <p:cNvPr id="60" name="Obdélník 59"/>
+          <p:cNvSpPr/>
+          <p:nvPr/>
+        </p:nvSpPr>
+        <p:spPr>
+          <a:xfrm>
+            <a:off x="5804795" y="4011246"/>
+            <a:ext cx="2017512" cy="1157654"/>
+          </a:xfrm>
+          <a:prstGeom prst="rect">
+            <a:avLst/>
+          </a:prstGeom>
+          <a:solidFill>
+            <a:schemeClr val="tx2">
+              <a:lumMod val="50000"/>
+            </a:schemeClr>
+          </a:solidFill>
+          <a:ln w="25400" cap="flat" cmpd="sng" algn="ctr">
+            <a:solidFill>
+              <a:schemeClr val="dk1"/>
+            </a:solidFill>
+            <a:prstDash val="solid"/>
+            <a:round/>
+            <a:headEnd type="none" w="med" len="med"/>
+            <a:tailEnd type="none" w="med" len="med"/>
+          </a:ln>
+        </p:spPr>
+        <p:style>
+          <a:lnRef idx="0">
+            <a:scrgbClr r="0" g="0" b="0"/>
+          </a:lnRef>
+          <a:fillRef idx="0">
+            <a:scrgbClr r="0" g="0" b="0"/>
+          </a:fillRef>
+          <a:effectRef idx="0">
+            <a:scrgbClr r="0" g="0" b="0"/>
+          </a:effectRef>
+          <a:fontRef idx="minor">
+            <a:schemeClr val="dk1"/>
+          </a:fontRef>
+        </p:style>
+        <p:txBody>
+          <a:bodyPr rtlCol="0" anchor="ctr"/>
+          <a:lstStyle/>
+          <a:p>
+            <a:pPr algn="ctr"/>
+            <a:r>
+              <a:rPr lang="cs-CZ" dirty="0" smtClean="0">
+                <a:solidFill>
+                  <a:schemeClr val="bg1"/>
+                </a:solidFill>
+              </a:rPr>
+              <a:t>Data </a:t>
+            </a:r>
+            <a:r>
+              <a:rPr lang="cs-CZ" dirty="0" err="1" smtClean="0">
+                <a:solidFill>
+                  <a:schemeClr val="bg1"/>
+                </a:solidFill>
+              </a:rPr>
+              <a:t>parser</a:t>
+            </a:r>
+            <a:endParaRPr lang="cs-CZ" dirty="0">
+              <a:solidFill>
+                <a:schemeClr val="bg1"/>
+              </a:solidFill>
+            </a:endParaRPr>
+          </a:p>
+        </p:txBody>
+      </p:sp>
+      <p:sp>
+        <p:nvSpPr>
+          <p:cNvPr id="61" name="Obdélník 60"/>
+          <p:cNvSpPr/>
+          <p:nvPr/>
+        </p:nvSpPr>
+        <p:spPr>
+          <a:xfrm>
+            <a:off x="5072734" y="5604347"/>
+            <a:ext cx="921666" cy="487883"/>
+          </a:xfrm>
+          <a:prstGeom prst="rect">
+            <a:avLst/>
+          </a:prstGeom>
+          <a:solidFill>
+            <a:schemeClr val="tx1">
+              <a:lumMod val="65000"/>
+              <a:lumOff val="35000"/>
+            </a:schemeClr>
+          </a:solidFill>
+          <a:ln w="15875" cap="flat" cmpd="sng" algn="ctr">
+            <a:solidFill>
+              <a:schemeClr val="dk1"/>
+            </a:solidFill>
+            <a:prstDash val="solid"/>
+            <a:round/>
+            <a:headEnd type="none" w="med" len="med"/>
+            <a:tailEnd type="none" w="med" len="med"/>
+          </a:ln>
+        </p:spPr>
+        <p:style>
+          <a:lnRef idx="0">
+            <a:scrgbClr r="0" g="0" b="0"/>
+          </a:lnRef>
+          <a:fillRef idx="0">
+            <a:scrgbClr r="0" g="0" b="0"/>
+          </a:fillRef>
+          <a:effectRef idx="0">
+            <a:scrgbClr r="0" g="0" b="0"/>
+          </a:effectRef>
+          <a:fontRef idx="minor">
+            <a:schemeClr val="dk1"/>
+          </a:fontRef>
+        </p:style>
+        <p:txBody>
+          <a:bodyPr rtlCol="0" anchor="ctr"/>
+          <a:lstStyle/>
+          <a:p>
+            <a:pPr algn="ctr"/>
+            <a:r>
+              <a:rPr lang="cs-CZ" dirty="0" smtClean="0">
+                <a:solidFill>
+                  <a:schemeClr val="bg1"/>
+                </a:solidFill>
+              </a:rPr>
+              <a:t>CSV</a:t>
+            </a:r>
+          </a:p>
+        </p:txBody>
+      </p:sp>
+      <p:sp>
+        <p:nvSpPr>
+          <p:cNvPr id="62" name="Obdélník 61"/>
+          <p:cNvSpPr/>
+          <p:nvPr/>
+        </p:nvSpPr>
+        <p:spPr>
+          <a:xfrm>
+            <a:off x="6362701" y="5604346"/>
+            <a:ext cx="901700" cy="487883"/>
+          </a:xfrm>
+          <a:prstGeom prst="rect">
+            <a:avLst/>
+          </a:prstGeom>
+          <a:solidFill>
+            <a:schemeClr val="tx1">
+              <a:lumMod val="65000"/>
+              <a:lumOff val="35000"/>
+            </a:schemeClr>
+          </a:solidFill>
+          <a:ln w="15875" cap="flat" cmpd="sng" algn="ctr">
+            <a:solidFill>
+              <a:schemeClr val="dk1"/>
+            </a:solidFill>
+            <a:prstDash val="solid"/>
+            <a:round/>
+            <a:headEnd type="none" w="med" len="med"/>
+            <a:tailEnd type="none" w="med" len="med"/>
+          </a:ln>
+        </p:spPr>
+        <p:style>
+          <a:lnRef idx="0">
+            <a:scrgbClr r="0" g="0" b="0"/>
+          </a:lnRef>
+          <a:fillRef idx="0">
+            <a:scrgbClr r="0" g="0" b="0"/>
+          </a:fillRef>
+          <a:effectRef idx="0">
+            <a:scrgbClr r="0" g="0" b="0"/>
+          </a:effectRef>
+          <a:fontRef idx="minor">
+            <a:schemeClr val="dk1"/>
+          </a:fontRef>
+        </p:style>
+        <p:txBody>
+          <a:bodyPr rtlCol="0" anchor="ctr"/>
+          <a:lstStyle/>
+          <a:p>
+            <a:pPr algn="ctr"/>
+            <a:r>
+              <a:rPr lang="cs-CZ" dirty="0" smtClean="0">
+                <a:solidFill>
+                  <a:schemeClr val="bg1"/>
+                </a:solidFill>
+              </a:rPr>
+              <a:t>JSON</a:t>
+            </a:r>
+          </a:p>
+        </p:txBody>
+      </p:sp>
+      <p:sp>
+        <p:nvSpPr>
+          <p:cNvPr id="63" name="Obdélník 62"/>
+          <p:cNvSpPr/>
+          <p:nvPr/>
+        </p:nvSpPr>
+        <p:spPr>
+          <a:xfrm>
+            <a:off x="7638465" y="5604346"/>
+            <a:ext cx="900043" cy="487883"/>
+          </a:xfrm>
+          <a:prstGeom prst="rect">
+            <a:avLst/>
+          </a:prstGeom>
+          <a:solidFill>
+            <a:schemeClr val="tx1">
+              <a:lumMod val="65000"/>
+              <a:lumOff val="35000"/>
+            </a:schemeClr>
+          </a:solidFill>
+          <a:ln w="15875" cap="flat" cmpd="sng" algn="ctr">
+            <a:solidFill>
+              <a:schemeClr val="dk1"/>
+            </a:solidFill>
+            <a:prstDash val="solid"/>
+            <a:round/>
+            <a:headEnd type="none" w="med" len="med"/>
+            <a:tailEnd type="none" w="med" len="med"/>
+          </a:ln>
+        </p:spPr>
+        <p:style>
+          <a:lnRef idx="0">
+            <a:scrgbClr r="0" g="0" b="0"/>
+          </a:lnRef>
+          <a:fillRef idx="0">
+            <a:scrgbClr r="0" g="0" b="0"/>
+          </a:fillRef>
+          <a:effectRef idx="0">
+            <a:scrgbClr r="0" g="0" b="0"/>
+          </a:effectRef>
+          <a:fontRef idx="minor">
+            <a:schemeClr val="dk1"/>
+          </a:fontRef>
+        </p:style>
+        <p:txBody>
+          <a:bodyPr rtlCol="0" anchor="ctr"/>
+          <a:lstStyle/>
+          <a:p>
+            <a:pPr algn="ctr"/>
+            <a:r>
+              <a:rPr lang="cs-CZ" dirty="0" smtClean="0">
+                <a:solidFill>
+                  <a:schemeClr val="bg1"/>
+                </a:solidFill>
+              </a:rPr>
+              <a:t>XML</a:t>
+            </a:r>
+          </a:p>
+        </p:txBody>
+      </p:sp>
+      <p:cxnSp>
+        <p:nvCxnSpPr>
+          <p:cNvPr id="64" name="Přímá spojnice 63"/>
+          <p:cNvCxnSpPr>
+            <a:stCxn id="61" idx="0"/>
+            <a:endCxn id="60" idx="2"/>
+          </p:cNvCxnSpPr>
+          <p:nvPr/>
+        </p:nvCxnSpPr>
+        <p:spPr>
+          <a:xfrm flipV="1">
+            <a:off x="5533567" y="5168900"/>
+            <a:ext cx="1279984" cy="435447"/>
+          </a:xfrm>
+          <a:prstGeom prst="line">
+            <a:avLst/>
+          </a:prstGeom>
+          <a:ln>
+            <a:solidFill>
+              <a:schemeClr val="tx1"/>
+            </a:solidFill>
+          </a:ln>
+        </p:spPr>
+        <p:style>
+          <a:lnRef idx="1">
+            <a:schemeClr val="accent1"/>
+          </a:lnRef>
+          <a:fillRef idx="0">
+            <a:schemeClr val="accent1"/>
+          </a:fillRef>
+          <a:effectRef idx="0">
+            <a:schemeClr val="accent1"/>
+          </a:effectRef>
+          <a:fontRef idx="minor">
+            <a:schemeClr val="tx1"/>
+          </a:fontRef>
+        </p:style>
+      </p:cxnSp>
+      <p:cxnSp>
+        <p:nvCxnSpPr>
+          <p:cNvPr id="65" name="Přímá spojnice 64"/>
+          <p:cNvCxnSpPr>
+            <a:stCxn id="60" idx="2"/>
+            <a:endCxn id="62" idx="0"/>
+          </p:cNvCxnSpPr>
+          <p:nvPr/>
+        </p:nvCxnSpPr>
+        <p:spPr>
+          <a:xfrm>
+            <a:off x="6813551" y="5168900"/>
+            <a:ext cx="0" cy="435446"/>
+          </a:xfrm>
+          <a:prstGeom prst="line">
+            <a:avLst/>
+          </a:prstGeom>
+          <a:ln>
+            <a:solidFill>
+              <a:schemeClr val="tx1"/>
+            </a:solidFill>
+          </a:ln>
+        </p:spPr>
+        <p:style>
+          <a:lnRef idx="1">
+            <a:schemeClr val="accent1"/>
+          </a:lnRef>
+          <a:fillRef idx="0">
+            <a:schemeClr val="accent1"/>
+          </a:fillRef>
+          <a:effectRef idx="0">
+            <a:schemeClr val="accent1"/>
+          </a:effectRef>
+          <a:fontRef idx="minor">
+            <a:schemeClr val="tx1"/>
+          </a:fontRef>
+        </p:style>
+      </p:cxnSp>
+      <p:cxnSp>
+        <p:nvCxnSpPr>
+          <p:cNvPr id="66" name="Přímá spojnice 65"/>
+          <p:cNvCxnSpPr>
+            <a:stCxn id="63" idx="0"/>
+            <a:endCxn id="60" idx="2"/>
+          </p:cNvCxnSpPr>
+          <p:nvPr/>
+        </p:nvCxnSpPr>
+        <p:spPr>
+          <a:xfrm flipH="1" flipV="1">
+            <a:off x="6813551" y="5168900"/>
+            <a:ext cx="1274936" cy="435446"/>
+          </a:xfrm>
+          <a:prstGeom prst="line">
+            <a:avLst/>
+          </a:prstGeom>
+          <a:ln>
+            <a:solidFill>
+              <a:schemeClr val="tx1"/>
+            </a:solidFill>
+          </a:ln>
+        </p:spPr>
+        <p:style>
+          <a:lnRef idx="1">
+            <a:schemeClr val="accent1"/>
+          </a:lnRef>
+          <a:fillRef idx="0">
+            <a:schemeClr val="accent1"/>
+          </a:fillRef>
+          <a:effectRef idx="0">
+            <a:schemeClr val="accent1"/>
+          </a:effectRef>
+          <a:fontRef idx="minor">
+            <a:schemeClr val="tx1"/>
+          </a:fontRef>
+        </p:style>
+      </p:cxnSp>
+      <p:cxnSp>
+        <p:nvCxnSpPr>
+          <p:cNvPr id="67" name="Přímá spojnice 66"/>
+          <p:cNvCxnSpPr>
+            <a:stCxn id="60" idx="0"/>
+            <a:endCxn id="59" idx="2"/>
+          </p:cNvCxnSpPr>
+          <p:nvPr/>
+        </p:nvCxnSpPr>
+        <p:spPr>
+          <a:xfrm flipV="1">
+            <a:off x="6813551" y="2239808"/>
+            <a:ext cx="22970" cy="1771438"/>
+          </a:xfrm>
+          <a:prstGeom prst="line">
+            <a:avLst/>
+          </a:prstGeom>
+          <a:ln w="19050">
+            <a:solidFill>
+              <a:schemeClr val="tx1"/>
+            </a:solidFill>
+          </a:ln>
+        </p:spPr>
+        <p:style>
+          <a:lnRef idx="1">
+            <a:schemeClr val="accent1"/>
+          </a:lnRef>
+          <a:fillRef idx="0">
+            <a:schemeClr val="accent1"/>
+          </a:fillRef>
+          <a:effectRef idx="0">
+            <a:schemeClr val="accent1"/>
+          </a:effectRef>
+          <a:fontRef idx="minor">
+            <a:schemeClr val="tx1"/>
+          </a:fontRef>
+        </p:style>
+      </p:cxnSp>
+      <p:sp>
+        <p:nvSpPr>
+          <p:cNvPr id="68" name="Obdélník 67"/>
+          <p:cNvSpPr/>
+          <p:nvPr/>
+        </p:nvSpPr>
+        <p:spPr>
+          <a:xfrm>
+            <a:off x="8952000" y="807672"/>
+            <a:ext cx="2565400" cy="5466128"/>
+          </a:xfrm>
+          <a:prstGeom prst="rect">
+            <a:avLst/>
+          </a:prstGeom>
+          <a:noFill/>
+          <a:ln>
+            <a:solidFill>
+              <a:schemeClr val="tx1"/>
+            </a:solidFill>
+            <a:prstDash val="dash"/>
+          </a:ln>
+        </p:spPr>
+        <p:style>
+          <a:lnRef idx="2">
+            <a:schemeClr val="accent1">
+              <a:shade val="50000"/>
+            </a:schemeClr>
+          </a:lnRef>
+          <a:fillRef idx="1">
+            <a:schemeClr val="accent1"/>
+          </a:fillRef>
+          <a:effectRef idx="0">
+            <a:schemeClr val="accent1"/>
+          </a:effectRef>
+          <a:fontRef idx="minor">
+            <a:schemeClr val="lt1"/>
+          </a:fontRef>
+        </p:style>
+        <p:txBody>
+          <a:bodyPr rtlCol="0" anchor="ctr"/>
+          <a:lstStyle/>
+          <a:p>
+            <a:pPr algn="ctr"/>
+            <a:endParaRPr lang="cs-CZ" dirty="0"/>
+          </a:p>
+        </p:txBody>
+      </p:sp>
+      <p:sp>
+        <p:nvSpPr>
+          <p:cNvPr id="69" name="Obdélník 68"/>
+          <p:cNvSpPr/>
+          <p:nvPr/>
+        </p:nvSpPr>
+        <p:spPr>
+          <a:xfrm>
+            <a:off x="1765820" y="515572"/>
+            <a:ext cx="9994380" cy="5961428"/>
+          </a:xfrm>
+          <a:prstGeom prst="rect">
+            <a:avLst/>
+          </a:prstGeom>
+          <a:noFill/>
+          <a:ln w="31750">
+            <a:solidFill>
+              <a:schemeClr val="tx1"/>
+            </a:solidFill>
+            <a:prstDash val="dash"/>
+          </a:ln>
+        </p:spPr>
+        <p:style>
+          <a:lnRef idx="2">
+            <a:schemeClr val="accent1">
+              <a:shade val="50000"/>
+            </a:schemeClr>
+          </a:lnRef>
+          <a:fillRef idx="1">
+            <a:schemeClr val="accent1"/>
+          </a:fillRef>
+          <a:effectRef idx="0">
+            <a:schemeClr val="accent1"/>
+          </a:effectRef>
+          <a:fontRef idx="minor">
+            <a:schemeClr val="lt1"/>
+          </a:fontRef>
+        </p:style>
+        <p:txBody>
+          <a:bodyPr rtlCol="0" anchor="ctr"/>
+          <a:lstStyle/>
+          <a:p>
+            <a:pPr algn="ctr"/>
+            <a:endParaRPr lang="cs-CZ" dirty="0"/>
+          </a:p>
+        </p:txBody>
+      </p:sp>
+      <p:sp>
+        <p:nvSpPr>
+          <p:cNvPr id="79" name="Obdélník 78"/>
+          <p:cNvSpPr/>
+          <p:nvPr/>
+        </p:nvSpPr>
+        <p:spPr>
+          <a:xfrm>
+            <a:off x="9225944" y="1082154"/>
+            <a:ext cx="2017512" cy="1157654"/>
+          </a:xfrm>
+          <a:prstGeom prst="rect">
+            <a:avLst/>
+          </a:prstGeom>
+          <a:solidFill>
+            <a:schemeClr val="tx2">
+              <a:lumMod val="50000"/>
+            </a:schemeClr>
+          </a:solidFill>
+          <a:ln w="25400" cap="flat" cmpd="sng" algn="ctr">
+            <a:solidFill>
+              <a:schemeClr val="dk1"/>
+            </a:solidFill>
+            <a:prstDash val="solid"/>
+            <a:round/>
+            <a:headEnd type="none" w="med" len="med"/>
+            <a:tailEnd type="none" w="med" len="med"/>
+          </a:ln>
+        </p:spPr>
+        <p:style>
+          <a:lnRef idx="0">
+            <a:scrgbClr r="0" g="0" b="0"/>
+          </a:lnRef>
+          <a:fillRef idx="0">
+            <a:scrgbClr r="0" g="0" b="0"/>
+          </a:fillRef>
+          <a:effectRef idx="0">
+            <a:scrgbClr r="0" g="0" b="0"/>
+          </a:effectRef>
+          <a:fontRef idx="minor">
+            <a:schemeClr val="dk1"/>
+          </a:fontRef>
+        </p:style>
+        <p:txBody>
+          <a:bodyPr rtlCol="0" anchor="ctr"/>
+          <a:lstStyle/>
+          <a:p>
+            <a:pPr algn="ctr"/>
+            <a:r>
+              <a:rPr lang="cs-CZ" dirty="0" smtClean="0">
+                <a:solidFill>
+                  <a:schemeClr val="bg1"/>
+                </a:solidFill>
+              </a:rPr>
+              <a:t>Laptop</a:t>
+            </a:r>
+            <a:endParaRPr lang="cs-CZ" dirty="0">
+              <a:solidFill>
+                <a:schemeClr val="bg1"/>
+              </a:solidFill>
+            </a:endParaRPr>
+          </a:p>
+        </p:txBody>
+      </p:sp>
+      <p:sp>
+        <p:nvSpPr>
+          <p:cNvPr id="80" name="Obdélník 79"/>
+          <p:cNvSpPr/>
+          <p:nvPr/>
+        </p:nvSpPr>
+        <p:spPr>
+          <a:xfrm>
+            <a:off x="9225944" y="2514289"/>
+            <a:ext cx="2017512" cy="487883"/>
+          </a:xfrm>
+          <a:prstGeom prst="rect">
+            <a:avLst/>
+          </a:prstGeom>
+          <a:solidFill>
+            <a:schemeClr val="tx1">
+              <a:lumMod val="65000"/>
+              <a:lumOff val="35000"/>
+            </a:schemeClr>
+          </a:solidFill>
+          <a:ln w="15875" cap="flat" cmpd="sng" algn="ctr">
+            <a:solidFill>
+              <a:schemeClr val="dk1"/>
+            </a:solidFill>
+            <a:prstDash val="solid"/>
+            <a:round/>
+            <a:headEnd type="none" w="med" len="med"/>
+            <a:tailEnd type="none" w="med" len="med"/>
+          </a:ln>
+        </p:spPr>
+        <p:style>
+          <a:lnRef idx="0">
+            <a:scrgbClr r="0" g="0" b="0"/>
+          </a:lnRef>
+          <a:fillRef idx="0">
+            <a:scrgbClr r="0" g="0" b="0"/>
+          </a:fillRef>
+          <a:effectRef idx="0">
+            <a:scrgbClr r="0" g="0" b="0"/>
+          </a:effectRef>
+          <a:fontRef idx="minor">
+            <a:schemeClr val="dk1"/>
+          </a:fontRef>
+        </p:style>
+        <p:txBody>
+          <a:bodyPr rtlCol="0" anchor="ctr"/>
+          <a:lstStyle/>
+          <a:p>
+            <a:pPr algn="ctr"/>
+            <a:r>
+              <a:rPr lang="cs-CZ" dirty="0" smtClean="0">
+                <a:solidFill>
+                  <a:schemeClr val="bg1"/>
+                </a:solidFill>
+              </a:rPr>
+              <a:t>Display</a:t>
+            </a:r>
+          </a:p>
+        </p:txBody>
+      </p:sp>
+      <p:cxnSp>
+        <p:nvCxnSpPr>
+          <p:cNvPr id="81" name="Přímá spojnice 80"/>
+          <p:cNvCxnSpPr>
+            <a:stCxn id="80" idx="0"/>
+            <a:endCxn id="79" idx="2"/>
+          </p:cNvCxnSpPr>
+          <p:nvPr/>
+        </p:nvCxnSpPr>
+        <p:spPr>
+          <a:xfrm flipV="1">
+            <a:off x="10234700" y="2239808"/>
+            <a:ext cx="0" cy="274481"/>
+          </a:xfrm>
+          <a:prstGeom prst="line">
+            <a:avLst/>
+          </a:prstGeom>
+          <a:ln>
+            <a:solidFill>
+              <a:schemeClr val="tx1"/>
+            </a:solidFill>
+          </a:ln>
+        </p:spPr>
+        <p:style>
+          <a:lnRef idx="1">
+            <a:schemeClr val="accent1"/>
+          </a:lnRef>
+          <a:fillRef idx="0">
+            <a:schemeClr val="accent1"/>
+          </a:fillRef>
+          <a:effectRef idx="0">
+            <a:schemeClr val="accent1"/>
+          </a:effectRef>
+          <a:fontRef idx="minor">
+            <a:schemeClr val="tx1"/>
+          </a:fontRef>
+        </p:style>
+      </p:cxnSp>
+      <p:sp>
+        <p:nvSpPr>
+          <p:cNvPr id="82" name="Obdélník 81"/>
+          <p:cNvSpPr/>
+          <p:nvPr/>
+        </p:nvSpPr>
+        <p:spPr>
+          <a:xfrm>
+            <a:off x="9225944" y="3002172"/>
+            <a:ext cx="2017512" cy="487883"/>
+          </a:xfrm>
+          <a:prstGeom prst="rect">
+            <a:avLst/>
+          </a:prstGeom>
+          <a:solidFill>
+            <a:schemeClr val="tx1">
+              <a:lumMod val="65000"/>
+              <a:lumOff val="35000"/>
+            </a:schemeClr>
+          </a:solidFill>
+          <a:ln w="15875" cap="flat" cmpd="sng" algn="ctr">
+            <a:solidFill>
+              <a:schemeClr val="dk1"/>
+            </a:solidFill>
+            <a:prstDash val="solid"/>
+            <a:round/>
+            <a:headEnd type="none" w="med" len="med"/>
+            <a:tailEnd type="none" w="med" len="med"/>
+          </a:ln>
+        </p:spPr>
+        <p:style>
+          <a:lnRef idx="0">
+            <a:scrgbClr r="0" g="0" b="0"/>
+          </a:lnRef>
+          <a:fillRef idx="0">
+            <a:scrgbClr r="0" g="0" b="0"/>
+          </a:fillRef>
+          <a:effectRef idx="0">
+            <a:scrgbClr r="0" g="0" b="0"/>
+          </a:effectRef>
+          <a:fontRef idx="minor">
+            <a:schemeClr val="dk1"/>
+          </a:fontRef>
+        </p:style>
+        <p:txBody>
+          <a:bodyPr rtlCol="0" anchor="ctr"/>
+          <a:lstStyle/>
+          <a:p>
+            <a:pPr algn="ctr"/>
+            <a:r>
+              <a:rPr lang="cs-CZ" dirty="0" smtClean="0">
+                <a:solidFill>
+                  <a:schemeClr val="bg1"/>
+                </a:solidFill>
+              </a:rPr>
+              <a:t>CPU</a:t>
+            </a:r>
+          </a:p>
+        </p:txBody>
+      </p:sp>
+      <p:sp>
+        <p:nvSpPr>
+          <p:cNvPr id="84" name="Obdélník 83"/>
+          <p:cNvSpPr/>
+          <p:nvPr/>
+        </p:nvSpPr>
+        <p:spPr>
+          <a:xfrm>
+            <a:off x="9225944" y="3482327"/>
+            <a:ext cx="2017512" cy="487883"/>
+          </a:xfrm>
+          <a:prstGeom prst="rect">
+            <a:avLst/>
+          </a:prstGeom>
+          <a:solidFill>
+            <a:schemeClr val="tx1">
+              <a:lumMod val="65000"/>
+              <a:lumOff val="35000"/>
+            </a:schemeClr>
+          </a:solidFill>
+          <a:ln w="15875" cap="flat" cmpd="sng" algn="ctr">
+            <a:solidFill>
+              <a:schemeClr val="dk1"/>
+            </a:solidFill>
+            <a:prstDash val="solid"/>
+            <a:round/>
+            <a:headEnd type="none" w="med" len="med"/>
+            <a:tailEnd type="none" w="med" len="med"/>
+          </a:ln>
+        </p:spPr>
+        <p:style>
+          <a:lnRef idx="0">
+            <a:scrgbClr r="0" g="0" b="0"/>
+          </a:lnRef>
+          <a:fillRef idx="0">
+            <a:scrgbClr r="0" g="0" b="0"/>
+          </a:fillRef>
+          <a:effectRef idx="0">
+            <a:scrgbClr r="0" g="0" b="0"/>
+          </a:effectRef>
+          <a:fontRef idx="minor">
+            <a:schemeClr val="dk1"/>
+          </a:fontRef>
+        </p:style>
+        <p:txBody>
+          <a:bodyPr rtlCol="0" anchor="ctr"/>
+          <a:lstStyle/>
+          <a:p>
+            <a:pPr algn="ctr"/>
+            <a:r>
+              <a:rPr lang="cs-CZ" dirty="0" smtClean="0">
+                <a:solidFill>
+                  <a:schemeClr val="bg1"/>
+                </a:solidFill>
+              </a:rPr>
+              <a:t>HDD</a:t>
+            </a:r>
+          </a:p>
+        </p:txBody>
+      </p:sp>
+      <p:sp>
+        <p:nvSpPr>
+          <p:cNvPr id="85" name="Obdélník 84"/>
+          <p:cNvSpPr/>
+          <p:nvPr/>
+        </p:nvSpPr>
+        <p:spPr>
+          <a:xfrm>
+            <a:off x="9225944" y="3962482"/>
+            <a:ext cx="2017512" cy="487883"/>
+          </a:xfrm>
+          <a:prstGeom prst="rect">
+            <a:avLst/>
+          </a:prstGeom>
+          <a:solidFill>
+            <a:schemeClr val="tx1">
+              <a:lumMod val="65000"/>
+              <a:lumOff val="35000"/>
+            </a:schemeClr>
+          </a:solidFill>
+          <a:ln w="15875" cap="flat" cmpd="sng" algn="ctr">
+            <a:solidFill>
+              <a:schemeClr val="dk1"/>
+            </a:solidFill>
+            <a:prstDash val="solid"/>
+            <a:round/>
+            <a:headEnd type="none" w="med" len="med"/>
+            <a:tailEnd type="none" w="med" len="med"/>
+          </a:ln>
+        </p:spPr>
+        <p:style>
+          <a:lnRef idx="0">
+            <a:scrgbClr r="0" g="0" b="0"/>
+          </a:lnRef>
+          <a:fillRef idx="0">
+            <a:scrgbClr r="0" g="0" b="0"/>
+          </a:fillRef>
+          <a:effectRef idx="0">
+            <a:scrgbClr r="0" g="0" b="0"/>
+          </a:effectRef>
+          <a:fontRef idx="minor">
+            <a:schemeClr val="dk1"/>
+          </a:fontRef>
+        </p:style>
+        <p:txBody>
+          <a:bodyPr rtlCol="0" anchor="ctr"/>
+          <a:lstStyle/>
+          <a:p>
+            <a:pPr algn="ctr"/>
+            <a:r>
+              <a:rPr lang="cs-CZ" dirty="0" smtClean="0">
+                <a:solidFill>
+                  <a:schemeClr val="bg1"/>
+                </a:solidFill>
+              </a:rPr>
+              <a:t>RAM</a:t>
+            </a:r>
+          </a:p>
+        </p:txBody>
+      </p:sp>
+      <p:sp>
+        <p:nvSpPr>
+          <p:cNvPr id="86" name="Obdélník 85"/>
+          <p:cNvSpPr/>
+          <p:nvPr/>
+        </p:nvSpPr>
+        <p:spPr>
+          <a:xfrm>
+            <a:off x="9228960" y="4442637"/>
+            <a:ext cx="2017512" cy="487883"/>
+          </a:xfrm>
+          <a:prstGeom prst="rect">
+            <a:avLst/>
+          </a:prstGeom>
+          <a:solidFill>
+            <a:schemeClr val="tx1">
+              <a:lumMod val="65000"/>
+              <a:lumOff val="35000"/>
+            </a:schemeClr>
+          </a:solidFill>
+          <a:ln w="15875" cap="flat" cmpd="sng" algn="ctr">
+            <a:solidFill>
+              <a:schemeClr val="dk1"/>
+            </a:solidFill>
+            <a:prstDash val="solid"/>
+            <a:round/>
+            <a:headEnd type="none" w="med" len="med"/>
+            <a:tailEnd type="none" w="med" len="med"/>
+          </a:ln>
+        </p:spPr>
+        <p:style>
+          <a:lnRef idx="0">
+            <a:scrgbClr r="0" g="0" b="0"/>
+          </a:lnRef>
+          <a:fillRef idx="0">
+            <a:scrgbClr r="0" g="0" b="0"/>
+          </a:fillRef>
+          <a:effectRef idx="0">
+            <a:scrgbClr r="0" g="0" b="0"/>
+          </a:effectRef>
+          <a:fontRef idx="minor">
+            <a:schemeClr val="dk1"/>
+          </a:fontRef>
+        </p:style>
+        <p:txBody>
+          <a:bodyPr rtlCol="0" anchor="ctr"/>
+          <a:lstStyle/>
+          <a:p>
+            <a:pPr algn="ctr"/>
+            <a:r>
+              <a:rPr lang="cs-CZ" dirty="0" smtClean="0">
+                <a:solidFill>
+                  <a:schemeClr val="bg1"/>
+                </a:solidFill>
+              </a:rPr>
+              <a:t>OS</a:t>
+            </a:r>
+          </a:p>
+        </p:txBody>
+      </p:sp>
+      <p:sp>
+        <p:nvSpPr>
+          <p:cNvPr id="87" name="TextovéPole 86"/>
+          <p:cNvSpPr txBox="1"/>
+          <p:nvPr/>
+        </p:nvSpPr>
+        <p:spPr>
+          <a:xfrm>
+            <a:off x="10063018" y="5064626"/>
+            <a:ext cx="343364" cy="923330"/>
+          </a:xfrm>
+          <a:prstGeom prst="rect">
+            <a:avLst/>
+          </a:prstGeom>
+          <a:noFill/>
+        </p:spPr>
+        <p:txBody>
+          <a:bodyPr wrap="none" rtlCol="0">
+            <a:spAutoFit/>
+          </a:bodyPr>
+          <a:lstStyle/>
+          <a:p>
+            <a:r>
+              <a:rPr lang="cs-CZ" dirty="0" smtClean="0"/>
+              <a:t>…</a:t>
+            </a:r>
+          </a:p>
+          <a:p>
+            <a:r>
+              <a:rPr lang="cs-CZ" dirty="0" smtClean="0"/>
+              <a:t>…</a:t>
+            </a:r>
+          </a:p>
+          <a:p>
+            <a:r>
+              <a:rPr lang="cs-CZ" dirty="0" smtClean="0"/>
+              <a:t>…</a:t>
+            </a:r>
+          </a:p>
+        </p:txBody>
+      </p:sp>
+      <p:cxnSp>
+        <p:nvCxnSpPr>
+          <p:cNvPr id="88" name="Přímá spojnice 87"/>
+          <p:cNvCxnSpPr>
+            <a:stCxn id="79" idx="1"/>
+            <a:endCxn id="59" idx="3"/>
+          </p:cNvCxnSpPr>
+          <p:nvPr/>
+        </p:nvCxnSpPr>
+        <p:spPr>
+          <a:xfrm flipH="1">
+            <a:off x="7845277" y="1660981"/>
+            <a:ext cx="1380667" cy="0"/>
+          </a:xfrm>
+          <a:prstGeom prst="line">
+            <a:avLst/>
+          </a:prstGeom>
+          <a:ln w="19050">
+            <a:solidFill>
+              <a:schemeClr val="tx1"/>
+            </a:solidFill>
+          </a:ln>
+        </p:spPr>
+        <p:style>
+          <a:lnRef idx="1">
+            <a:schemeClr val="accent1"/>
+          </a:lnRef>
+          <a:fillRef idx="0">
+            <a:schemeClr val="accent1"/>
+          </a:fillRef>
+          <a:effectRef idx="0">
+            <a:schemeClr val="accent1"/>
+          </a:effectRef>
+          <a:fontRef idx="minor">
+            <a:schemeClr val="tx1"/>
+          </a:fontRef>
+        </p:style>
+      </p:cxnSp>
+      <p:cxnSp>
+        <p:nvCxnSpPr>
+          <p:cNvPr id="89" name="Přímá spojnice 88"/>
+          <p:cNvCxnSpPr>
+            <a:stCxn id="59" idx="1"/>
+            <a:endCxn id="55" idx="3"/>
+          </p:cNvCxnSpPr>
+          <p:nvPr/>
+        </p:nvCxnSpPr>
+        <p:spPr>
+          <a:xfrm flipH="1">
+            <a:off x="4323456" y="1660981"/>
+            <a:ext cx="1504309" cy="0"/>
+          </a:xfrm>
+          <a:prstGeom prst="line">
+            <a:avLst/>
+          </a:prstGeom>
+          <a:ln w="47625">
+            <a:solidFill>
+              <a:schemeClr val="tx1"/>
+            </a:solidFill>
+          </a:ln>
+        </p:spPr>
+        <p:style>
+          <a:lnRef idx="1">
+            <a:schemeClr val="accent1"/>
+          </a:lnRef>
+          <a:fillRef idx="0">
+            <a:schemeClr val="accent1"/>
+          </a:fillRef>
+          <a:effectRef idx="0">
+            <a:schemeClr val="accent1"/>
+          </a:effectRef>
+          <a:fontRef idx="minor">
+            <a:schemeClr val="tx1"/>
+          </a:fontRef>
+        </p:style>
+      </p:cxnSp>
+      <p:cxnSp>
+        <p:nvCxnSpPr>
+          <p:cNvPr id="90" name="Přímá spojnice 89"/>
+          <p:cNvCxnSpPr/>
+          <p:nvPr/>
+        </p:nvCxnSpPr>
+        <p:spPr>
+          <a:xfrm flipH="1">
+            <a:off x="0" y="1660981"/>
+            <a:ext cx="2305945" cy="0"/>
+          </a:xfrm>
+          <a:prstGeom prst="line">
+            <a:avLst/>
+          </a:prstGeom>
+          <a:ln w="47625">
+            <a:solidFill>
+              <a:schemeClr val="tx1"/>
+            </a:solidFill>
+          </a:ln>
+        </p:spPr>
+        <p:style>
+          <a:lnRef idx="1">
+            <a:schemeClr val="accent1"/>
+          </a:lnRef>
+          <a:fillRef idx="0">
+            <a:schemeClr val="accent1"/>
+          </a:fillRef>
+          <a:effectRef idx="0">
+            <a:schemeClr val="accent1"/>
+          </a:effectRef>
+          <a:fontRef idx="minor">
+            <a:schemeClr val="tx1"/>
+          </a:fontRef>
+        </p:style>
+      </p:cxnSp>
     </p:spTree>
     <p:extLst>
       <p:ext uri="{BB962C8B-B14F-4D97-AF65-F5344CB8AC3E}">
-        <p14:creationId xmlns:p14="http://schemas.microsoft.com/office/powerpoint/2010/main" val="340351001"/>
+        <p14:creationId xmlns:p14="http://schemas.microsoft.com/office/powerpoint/2010/main" val="1297313408"/>
       </p:ext>
     </p:extLst>
   </p:cSld>
@@ -8490,7 +12327,7 @@
     </p:spTree>
     <p:extLst>
       <p:ext uri="{BB962C8B-B14F-4D97-AF65-F5344CB8AC3E}">
-        <p14:creationId xmlns:p14="http://schemas.microsoft.com/office/powerpoint/2010/main" val="315682276"/>
+        <p14:creationId xmlns:p14="http://schemas.microsoft.com/office/powerpoint/2010/main" val="42844688"/>
       </p:ext>
     </p:extLst>
   </p:cSld>
@@ -8562,14 +12399,14 @@
       </p:grpSpPr>
       <p:pic>
         <p:nvPicPr>
-          <p:cNvPr id="83" name="Obrázek 82"/>
+          <p:cNvPr id="2" name="Obrázek 1"/>
           <p:cNvPicPr>
             <a:picLocks noChangeAspect="1"/>
           </p:cNvPicPr>
           <p:nvPr/>
         </p:nvPicPr>
         <p:blipFill>
-          <a:blip r:embed="rId2" cstate="print">
+          <a:blip r:embed="rId3" cstate="print">
             <a:extLst>
               <a:ext uri="{28A0092B-C50C-407E-A947-70E740481C1C}">
                 <a14:useLocalDpi xmlns:a14="http://schemas.microsoft.com/office/drawing/2010/main" val="0"/>
@@ -8582,7 +12419,7 @@
         </p:blipFill>
         <p:spPr>
           <a:xfrm>
-            <a:off x="310662" y="320153"/>
+            <a:off x="5715000" y="2486405"/>
             <a:ext cx="762001" cy="762001"/>
           </a:xfrm>
           <a:prstGeom prst="rect">
@@ -8590,40 +12427,40 @@
           </a:prstGeom>
         </p:spPr>
       </p:pic>
-      <p:pic>
-        <p:nvPicPr>
-          <p:cNvPr id="2" name="Obrázek 1"/>
-          <p:cNvPicPr>
-            <a:picLocks noChangeAspect="1"/>
-          </p:cNvPicPr>
+      <p:sp>
+        <p:nvSpPr>
+          <p:cNvPr id="3" name="TextovéPole 2"/>
+          <p:cNvSpPr txBox="1"/>
           <p:nvPr/>
-        </p:nvPicPr>
-        <p:blipFill>
-          <a:blip r:embed="rId3">
-            <a:extLst>
-              <a:ext uri="{28A0092B-C50C-407E-A947-70E740481C1C}">
-                <a14:useLocalDpi xmlns:a14="http://schemas.microsoft.com/office/drawing/2010/main" val="0"/>
-              </a:ext>
-            </a:extLst>
-          </a:blip>
-          <a:stretch>
-            <a:fillRect/>
-          </a:stretch>
-        </p:blipFill>
+        </p:nvSpPr>
         <p:spPr>
           <a:xfrm>
-            <a:off x="1880599" y="1185549"/>
-            <a:ext cx="8430802" cy="4486901"/>
+            <a:off x="5583680" y="3468911"/>
+            <a:ext cx="1024639" cy="461665"/>
           </a:xfrm>
           <a:prstGeom prst="rect">
             <a:avLst/>
           </a:prstGeom>
-        </p:spPr>
-      </p:pic>
+          <a:noFill/>
+        </p:spPr>
+        <p:txBody>
+          <a:bodyPr wrap="none" rtlCol="0">
+            <a:spAutoFit/>
+          </a:bodyPr>
+          <a:lstStyle/>
+          <a:p>
+            <a:r>
+              <a:rPr lang="cs-CZ" sz="2400" dirty="0" smtClean="0"/>
+              <a:t>Design</a:t>
+            </a:r>
+            <a:endParaRPr lang="cs-CZ" sz="2400" dirty="0"/>
+          </a:p>
+        </p:txBody>
+      </p:sp>
     </p:spTree>
     <p:extLst>
       <p:ext uri="{BB962C8B-B14F-4D97-AF65-F5344CB8AC3E}">
-        <p14:creationId xmlns:p14="http://schemas.microsoft.com/office/powerpoint/2010/main" val="643218607"/>
+        <p14:creationId xmlns:p14="http://schemas.microsoft.com/office/powerpoint/2010/main" val="340351001"/>
       </p:ext>
     </p:extLst>
   </p:cSld>
@@ -8911,4 +12748,265 @@
     </a:ext>
   </a:extLst>
 </a:theme>
+</file>
+
+<file path=ppt/theme/theme2.xml><?xml version="1.0" encoding="utf-8"?>
+<a:theme xmlns:a="http://schemas.openxmlformats.org/drawingml/2006/main" name="Motiv Office">
+  <a:themeElements>
+    <a:clrScheme name="Kancelář">
+      <a:dk1>
+        <a:sysClr val="windowText" lastClr="000000"/>
+      </a:dk1>
+      <a:lt1>
+        <a:sysClr val="window" lastClr="FFFFFF"/>
+      </a:lt1>
+      <a:dk2>
+        <a:srgbClr val="44546A"/>
+      </a:dk2>
+      <a:lt2>
+        <a:srgbClr val="E7E6E6"/>
+      </a:lt2>
+      <a:accent1>
+        <a:srgbClr val="5B9BD5"/>
+      </a:accent1>
+      <a:accent2>
+        <a:srgbClr val="ED7D31"/>
+      </a:accent2>
+      <a:accent3>
+        <a:srgbClr val="A5A5A5"/>
+      </a:accent3>
+      <a:accent4>
+        <a:srgbClr val="FFC000"/>
+      </a:accent4>
+      <a:accent5>
+        <a:srgbClr val="4472C4"/>
+      </a:accent5>
+      <a:accent6>
+        <a:srgbClr val="70AD47"/>
+      </a:accent6>
+      <a:hlink>
+        <a:srgbClr val="0563C1"/>
+      </a:hlink>
+      <a:folHlink>
+        <a:srgbClr val="954F72"/>
+      </a:folHlink>
+    </a:clrScheme>
+    <a:fontScheme name="Kancelář">
+      <a:majorFont>
+        <a:latin typeface="Calibri Light" panose="020F0302020204030204"/>
+        <a:ea typeface=""/>
+        <a:cs typeface=""/>
+        <a:font script="Jpan" typeface="游ゴシック Light"/>
+        <a:font script="Hang" typeface="맑은 고딕"/>
+        <a:font script="Hans" typeface="等线 Light"/>
+        <a:font script="Hant" typeface="新細明體"/>
+        <a:font script="Arab" typeface="Times New Roman"/>
+        <a:font script="Hebr" typeface="Times New Roman"/>
+        <a:font script="Thai" typeface="Angsana New"/>
+        <a:font script="Ethi" typeface="Nyala"/>
+        <a:font script="Beng" typeface="Vrinda"/>
+        <a:font script="Gujr" typeface="Shruti"/>
+        <a:font script="Khmr" typeface="MoolBoran"/>
+        <a:font script="Knda" typeface="Tunga"/>
+        <a:font script="Guru" typeface="Raavi"/>
+        <a:font script="Cans" typeface="Euphemia"/>
+        <a:font script="Cher" typeface="Plantagenet Cherokee"/>
+        <a:font script="Yiii" typeface="Microsoft Yi Baiti"/>
+        <a:font script="Tibt" typeface="Microsoft Himalaya"/>
+        <a:font script="Thaa" typeface="MV Boli"/>
+        <a:font script="Deva" typeface="Mangal"/>
+        <a:font script="Telu" typeface="Gautami"/>
+        <a:font script="Taml" typeface="Latha"/>
+        <a:font script="Syrc" typeface="Estrangelo Edessa"/>
+        <a:font script="Orya" typeface="Kalinga"/>
+        <a:font script="Mlym" typeface="Kartika"/>
+        <a:font script="Laoo" typeface="DokChampa"/>
+        <a:font script="Sinh" typeface="Iskoola Pota"/>
+        <a:font script="Mong" typeface="Mongolian Baiti"/>
+        <a:font script="Viet" typeface="Times New Roman"/>
+        <a:font script="Uigh" typeface="Microsoft Uighur"/>
+        <a:font script="Geor" typeface="Sylfaen"/>
+      </a:majorFont>
+      <a:minorFont>
+        <a:latin typeface="Calibri" panose="020F0502020204030204"/>
+        <a:ea typeface=""/>
+        <a:cs typeface=""/>
+        <a:font script="Jpan" typeface="游ゴシック"/>
+        <a:font script="Hang" typeface="맑은 고딕"/>
+        <a:font script="Hans" typeface="等线"/>
+        <a:font script="Hant" typeface="新細明體"/>
+        <a:font script="Arab" typeface="Arial"/>
+        <a:font script="Hebr" typeface="Arial"/>
+        <a:font script="Thai" typeface="Cordia New"/>
+        <a:font script="Ethi" typeface="Nyala"/>
+        <a:font script="Beng" typeface="Vrinda"/>
+        <a:font script="Gujr" typeface="Shruti"/>
+        <a:font script="Khmr" typeface="DaunPenh"/>
+        <a:font script="Knda" typeface="Tunga"/>
+        <a:font script="Guru" typeface="Raavi"/>
+        <a:font script="Cans" typeface="Euphemia"/>
+        <a:font script="Cher" typeface="Plantagenet Cherokee"/>
+        <a:font script="Yiii" typeface="Microsoft Yi Baiti"/>
+        <a:font script="Tibt" typeface="Microsoft Himalaya"/>
+        <a:font script="Thaa" typeface="MV Boli"/>
+        <a:font script="Deva" typeface="Mangal"/>
+        <a:font script="Telu" typeface="Gautami"/>
+        <a:font script="Taml" typeface="Latha"/>
+        <a:font script="Syrc" typeface="Estrangelo Edessa"/>
+        <a:font script="Orya" typeface="Kalinga"/>
+        <a:font script="Mlym" typeface="Kartika"/>
+        <a:font script="Laoo" typeface="DokChampa"/>
+        <a:font script="Sinh" typeface="Iskoola Pota"/>
+        <a:font script="Mong" typeface="Mongolian Baiti"/>
+        <a:font script="Viet" typeface="Arial"/>
+        <a:font script="Uigh" typeface="Microsoft Uighur"/>
+        <a:font script="Geor" typeface="Sylfaen"/>
+      </a:minorFont>
+    </a:fontScheme>
+    <a:fmtScheme name="Kancelář">
+      <a:fillStyleLst>
+        <a:solidFill>
+          <a:schemeClr val="phClr"/>
+        </a:solidFill>
+        <a:gradFill rotWithShape="1">
+          <a:gsLst>
+            <a:gs pos="0">
+              <a:schemeClr val="phClr">
+                <a:lumMod val="110000"/>
+                <a:satMod val="105000"/>
+                <a:tint val="67000"/>
+              </a:schemeClr>
+            </a:gs>
+            <a:gs pos="50000">
+              <a:schemeClr val="phClr">
+                <a:lumMod val="105000"/>
+                <a:satMod val="103000"/>
+                <a:tint val="73000"/>
+              </a:schemeClr>
+            </a:gs>
+            <a:gs pos="100000">
+              <a:schemeClr val="phClr">
+                <a:lumMod val="105000"/>
+                <a:satMod val="109000"/>
+                <a:tint val="81000"/>
+              </a:schemeClr>
+            </a:gs>
+          </a:gsLst>
+          <a:lin ang="5400000" scaled="0"/>
+        </a:gradFill>
+        <a:gradFill rotWithShape="1">
+          <a:gsLst>
+            <a:gs pos="0">
+              <a:schemeClr val="phClr">
+                <a:satMod val="103000"/>
+                <a:lumMod val="102000"/>
+                <a:tint val="94000"/>
+              </a:schemeClr>
+            </a:gs>
+            <a:gs pos="50000">
+              <a:schemeClr val="phClr">
+                <a:satMod val="110000"/>
+                <a:lumMod val="100000"/>
+                <a:shade val="100000"/>
+              </a:schemeClr>
+            </a:gs>
+            <a:gs pos="100000">
+              <a:schemeClr val="phClr">
+                <a:lumMod val="99000"/>
+                <a:satMod val="120000"/>
+                <a:shade val="78000"/>
+              </a:schemeClr>
+            </a:gs>
+          </a:gsLst>
+          <a:lin ang="5400000" scaled="0"/>
+        </a:gradFill>
+      </a:fillStyleLst>
+      <a:lnStyleLst>
+        <a:ln w="6350" cap="flat" cmpd="sng" algn="ctr">
+          <a:solidFill>
+            <a:schemeClr val="phClr"/>
+          </a:solidFill>
+          <a:prstDash val="solid"/>
+          <a:miter lim="800000"/>
+        </a:ln>
+        <a:ln w="12700" cap="flat" cmpd="sng" algn="ctr">
+          <a:solidFill>
+            <a:schemeClr val="phClr"/>
+          </a:solidFill>
+          <a:prstDash val="solid"/>
+          <a:miter lim="800000"/>
+        </a:ln>
+        <a:ln w="19050" cap="flat" cmpd="sng" algn="ctr">
+          <a:solidFill>
+            <a:schemeClr val="phClr"/>
+          </a:solidFill>
+          <a:prstDash val="solid"/>
+          <a:miter lim="800000"/>
+        </a:ln>
+      </a:lnStyleLst>
+      <a:effectStyleLst>
+        <a:effectStyle>
+          <a:effectLst/>
+        </a:effectStyle>
+        <a:effectStyle>
+          <a:effectLst/>
+        </a:effectStyle>
+        <a:effectStyle>
+          <a:effectLst>
+            <a:outerShdw blurRad="57150" dist="19050" dir="5400000" algn="ctr" rotWithShape="0">
+              <a:srgbClr val="000000">
+                <a:alpha val="63000"/>
+              </a:srgbClr>
+            </a:outerShdw>
+          </a:effectLst>
+        </a:effectStyle>
+      </a:effectStyleLst>
+      <a:bgFillStyleLst>
+        <a:solidFill>
+          <a:schemeClr val="phClr"/>
+        </a:solidFill>
+        <a:solidFill>
+          <a:schemeClr val="phClr">
+            <a:tint val="95000"/>
+            <a:satMod val="170000"/>
+          </a:schemeClr>
+        </a:solidFill>
+        <a:gradFill rotWithShape="1">
+          <a:gsLst>
+            <a:gs pos="0">
+              <a:schemeClr val="phClr">
+                <a:tint val="93000"/>
+                <a:satMod val="150000"/>
+                <a:shade val="98000"/>
+                <a:lumMod val="102000"/>
+              </a:schemeClr>
+            </a:gs>
+            <a:gs pos="50000">
+              <a:schemeClr val="phClr">
+                <a:tint val="98000"/>
+                <a:satMod val="130000"/>
+                <a:shade val="90000"/>
+                <a:lumMod val="103000"/>
+              </a:schemeClr>
+            </a:gs>
+            <a:gs pos="100000">
+              <a:schemeClr val="phClr">
+                <a:shade val="63000"/>
+                <a:satMod val="120000"/>
+              </a:schemeClr>
+            </a:gs>
+          </a:gsLst>
+          <a:lin ang="5400000" scaled="0"/>
+        </a:gradFill>
+      </a:bgFillStyleLst>
+    </a:fmtScheme>
+  </a:themeElements>
+  <a:objectDefaults/>
+  <a:extraClrSchemeLst/>
+  <a:extLst>
+    <a:ext uri="{05A4C25C-085E-4340-85A3-A5531E510DB2}">
+      <thm15:themeFamily xmlns:thm15="http://schemas.microsoft.com/office/thememl/2012/main" name="Office Theme" id="{62F939B6-93AF-4DB8-9C6B-D6C7DFDC589F}" vid="{4A3C46E8-61CC-4603-A589-7422A47A8E4A}"/>
+    </a:ext>
+  </a:extLst>
+</a:theme>
 </file>
</xml_diff>

<commit_message>
Updated presenttion with internal database functiosn
</commit_message>
<xml_diff>
--- a/Presentation/Presentation.pptx
+++ b/Presentation/Presentation.pptx
@@ -205,7 +205,7 @@
             </a:lvl1pPr>
           </a:lstStyle>
           <a:p>
-            <a:endParaRPr lang="cs-CZ"/>
+            <a:endParaRPr lang="cs-CZ" dirty="0"/>
           </a:p>
         </p:txBody>
       </p:sp>
@@ -240,7 +240,7 @@
               <a:rPr lang="cs-CZ" smtClean="0"/>
               <a:t>13.05.2017</a:t>
             </a:fld>
-            <a:endParaRPr lang="cs-CZ"/>
+            <a:endParaRPr lang="cs-CZ" dirty="0"/>
           </a:p>
         </p:txBody>
       </p:sp>
@@ -273,7 +273,7 @@
           <a:bodyPr vert="horz" lIns="91440" tIns="45720" rIns="91440" bIns="45720" rtlCol="0" anchor="ctr"/>
           <a:lstStyle/>
           <a:p>
-            <a:endParaRPr lang="cs-CZ"/>
+            <a:endParaRPr lang="cs-CZ" dirty="0"/>
           </a:p>
         </p:txBody>
       </p:sp>
@@ -364,7 +364,7 @@
             </a:lvl1pPr>
           </a:lstStyle>
           <a:p>
-            <a:endParaRPr lang="cs-CZ"/>
+            <a:endParaRPr lang="cs-CZ" dirty="0"/>
           </a:p>
         </p:txBody>
       </p:sp>
@@ -399,7 +399,7 @@
               <a:rPr lang="cs-CZ" smtClean="0"/>
               <a:t>‹#›</a:t>
             </a:fld>
-            <a:endParaRPr lang="cs-CZ"/>
+            <a:endParaRPr lang="cs-CZ" dirty="0"/>
           </a:p>
         </p:txBody>
       </p:sp>
@@ -685,7 +685,7 @@
               <a:rPr lang="cs-CZ" smtClean="0"/>
               <a:t>10</a:t>
             </a:fld>
-            <a:endParaRPr lang="cs-CZ"/>
+            <a:endParaRPr lang="cs-CZ" dirty="0"/>
           </a:p>
         </p:txBody>
       </p:sp>
@@ -752,27 +752,11 @@
             </a:r>
             <a:r>
               <a:rPr lang="cs-CZ" baseline="0" dirty="0" smtClean="0"/>
-              <a:t> přeskočím jednotlivé animace a přechody, tak se dostanu k vkládaní dat, která lze vkládat pomocí záložky </a:t>
-            </a:r>
-            <a:r>
-              <a:rPr lang="cs-CZ" baseline="0" dirty="0" err="1" smtClean="0"/>
-              <a:t>Add</a:t>
-            </a:r>
-            <a:r>
-              <a:rPr lang="cs-CZ" baseline="0" dirty="0" smtClean="0"/>
-              <a:t>. Vložení je možné jak kliknutím a vyhledáním souboru, tak pomocí </a:t>
-            </a:r>
-            <a:r>
-              <a:rPr lang="cs-CZ" baseline="0" dirty="0" err="1" smtClean="0"/>
-              <a:t>Drag</a:t>
-            </a:r>
-            <a:r>
-              <a:rPr lang="en-US" baseline="0" dirty="0" err="1" smtClean="0"/>
-              <a:t>AndDrop</a:t>
+              <a:t> přeskočím jednotlivé animace a přechody, tak se dostanu k vkládaní dat, která lze vkládat pomocí záložky Add. Vložení je možné jak kliknutím a vyhledáním souboru, tak pomocí Drag</a:t>
             </a:r>
             <a:r>
               <a:rPr lang="en-US" baseline="0" dirty="0" smtClean="0"/>
-              <a:t>. Po </a:t>
+              <a:t>AndDrop. Po </a:t>
             </a:r>
             <a:r>
               <a:rPr lang="cs-CZ" baseline="0" dirty="0" smtClean="0"/>
@@ -801,7 +785,7 @@
               <a:rPr lang="cs-CZ" smtClean="0"/>
               <a:t>11</a:t>
             </a:fld>
-            <a:endParaRPr lang="cs-CZ"/>
+            <a:endParaRPr lang="cs-CZ" dirty="0"/>
           </a:p>
         </p:txBody>
       </p:sp>
@@ -893,7 +877,7 @@
               <a:rPr lang="cs-CZ" smtClean="0"/>
               <a:t>12</a:t>
             </a:fld>
-            <a:endParaRPr lang="cs-CZ"/>
+            <a:endParaRPr lang="cs-CZ" dirty="0"/>
           </a:p>
         </p:txBody>
       </p:sp>
@@ -985,7 +969,7 @@
               <a:rPr lang="cs-CZ" smtClean="0"/>
               <a:t>13</a:t>
             </a:fld>
-            <a:endParaRPr lang="cs-CZ"/>
+            <a:endParaRPr lang="cs-CZ" dirty="0"/>
           </a:p>
         </p:txBody>
       </p:sp>
@@ -1089,7 +1073,7 @@
               <a:rPr lang="cs-CZ" smtClean="0"/>
               <a:t>14</a:t>
             </a:fld>
-            <a:endParaRPr lang="cs-CZ"/>
+            <a:endParaRPr lang="cs-CZ" dirty="0"/>
           </a:p>
         </p:txBody>
       </p:sp>
@@ -1181,7 +1165,7 @@
               <a:rPr lang="cs-CZ" smtClean="0"/>
               <a:t>15</a:t>
             </a:fld>
-            <a:endParaRPr lang="cs-CZ"/>
+            <a:endParaRPr lang="cs-CZ" dirty="0"/>
           </a:p>
         </p:txBody>
       </p:sp>
@@ -1370,15 +1354,7 @@
           <a:p>
             <a:r>
               <a:rPr lang="cs-CZ" baseline="0" dirty="0" smtClean="0"/>
-              <a:t>Při importu se využívá Data </a:t>
-            </a:r>
-            <a:r>
-              <a:rPr lang="cs-CZ" baseline="0" dirty="0" err="1" smtClean="0"/>
-              <a:t>Parser</a:t>
-            </a:r>
-            <a:r>
-              <a:rPr lang="cs-CZ" baseline="0" dirty="0" smtClean="0"/>
-              <a:t>, který umí zpracovat 3 typy vstupních souborů. CSV, JSON a XML.</a:t>
+              <a:t>Při importu se využívá Data Parser, který umí zpracovat 3 typy vstupních souborů. CSV, JSON a XML.</a:t>
             </a:r>
           </a:p>
           <a:p>
@@ -1412,7 +1388,7 @@
               <a:rPr lang="cs-CZ" smtClean="0"/>
               <a:t>17</a:t>
             </a:fld>
-            <a:endParaRPr lang="cs-CZ"/>
+            <a:endParaRPr lang="cs-CZ" dirty="0"/>
           </a:p>
         </p:txBody>
       </p:sp>
@@ -1516,7 +1492,7 @@
               <a:rPr lang="cs-CZ" smtClean="0"/>
               <a:t>18</a:t>
             </a:fld>
-            <a:endParaRPr lang="cs-CZ"/>
+            <a:endParaRPr lang="cs-CZ" dirty="0"/>
           </a:p>
         </p:txBody>
       </p:sp>
@@ -1614,7 +1590,7 @@
               <a:rPr lang="cs-CZ" smtClean="0"/>
               <a:t>19</a:t>
             </a:fld>
-            <a:endParaRPr lang="cs-CZ"/>
+            <a:endParaRPr lang="cs-CZ" dirty="0"/>
           </a:p>
         </p:txBody>
       </p:sp>
@@ -1961,15 +1937,7 @@
             </a:r>
             <a:r>
               <a:rPr lang="cs-CZ" baseline="0" dirty="0" smtClean="0"/>
-              <a:t> byla navrhnuta tak, že každá část notebooku má vlastní tabulku, která obsahuje jedinečné ID a všechny parametry, například RAM obsahuje typ, frekvenci a velikost. Všechny tyto tabulky se spojují do jediné velké M:N tabulky, která vše spojuje do jednoho celku. Hlavní tabulka navíc ještě kromě jednotlivých částí obsahuje rozměry jednotlivých modelů a unikátní produktové číslo. Nakonec je v databázi tabulka, obsahující veškerou historii vyhledávání a tabulka s </a:t>
-            </a:r>
-            <a:r>
-              <a:rPr lang="cs-CZ" baseline="0" dirty="0" err="1" smtClean="0"/>
-              <a:t>hashy</a:t>
-            </a:r>
-            <a:r>
-              <a:rPr lang="cs-CZ" baseline="0" dirty="0" smtClean="0"/>
-              <a:t> jednotlivých přidaných souborů.</a:t>
+              <a:t> byla navrhnuta tak, že každá část notebooku má vlastní tabulku, která obsahuje jedinečné ID a všechny parametry, například RAM obsahuje typ, frekvenci a velikost. Všechny tyto tabulky se spojují do jediné velké M:N tabulky, která vše spojuje do jednoho celku. Hlavní tabulka navíc ještě kromě jednotlivých částí obsahuje rozměry jednotlivých modelů a unikátní produktové číslo. Nakonec je v databázi tabulka, obsahující veškerou historii vyhledávání a tabulka s hashy jednotlivých přidaných souborů.</a:t>
             </a:r>
           </a:p>
         </p:txBody>
@@ -1993,7 +1961,7 @@
               <a:rPr lang="cs-CZ" smtClean="0"/>
               <a:t>5</a:t>
             </a:fld>
-            <a:endParaRPr lang="cs-CZ"/>
+            <a:endParaRPr lang="cs-CZ" dirty="0"/>
           </a:p>
         </p:txBody>
       </p:sp>
@@ -2097,7 +2065,7 @@
               <a:rPr lang="cs-CZ" smtClean="0"/>
               <a:t>6</a:t>
             </a:fld>
-            <a:endParaRPr lang="cs-CZ"/>
+            <a:endParaRPr lang="cs-CZ" dirty="0"/>
           </a:p>
         </p:txBody>
       </p:sp>
@@ -2158,7 +2126,34 @@
           <a:bodyPr/>
           <a:lstStyle/>
           <a:p>
-            <a:endParaRPr lang="cs-CZ" baseline="0" dirty="0" smtClean="0"/>
+            <a:r>
+              <a:rPr lang="cs-CZ" baseline="0" dirty="0" smtClean="0"/>
+              <a:t>Práce s daty je řešena v databázi. Přístup do databáze zastřešuje pohled, který pracuje se dvěma funkcemi. První je Linker, který propojuje jednotlivé tabulky do jedné. Druhou je Consistency, která zjišťuje konzistence jednotlivých notebooků a to přes zjištění počtu unikátních prvků. Pokud je počet větší než 1, není konzistentní. Vkládání dat probíhá přes instead of trigger na pohledu, kterému se předají údaje a ten podle nich buď přidá nový notebook, nebo nepřidá v případě, pokud již notebook v databázi existuje. Pro navrácení výsledku importu byla vytvořena </a:t>
+            </a:r>
+            <a:r>
+              <a:rPr lang="cs-CZ" baseline="0" dirty="0" err="1" smtClean="0"/>
+              <a:t>procedure</a:t>
+            </a:r>
+            <a:r>
+              <a:rPr lang="cs-CZ" baseline="0" dirty="0" smtClean="0"/>
+              <a:t> Return result, který vrací výsledek pomocí </a:t>
+            </a:r>
+            <a:r>
+              <a:rPr lang="cs-CZ" baseline="0" dirty="0" err="1" smtClean="0"/>
+              <a:t>print</a:t>
+            </a:r>
+            <a:r>
+              <a:rPr lang="cs-CZ" baseline="0" dirty="0" smtClean="0"/>
+              <a:t>, a ten se zachycuje </a:t>
+            </a:r>
+            <a:r>
+              <a:rPr lang="cs-CZ" baseline="0" dirty="0" err="1" smtClean="0"/>
+              <a:t>eventem</a:t>
+            </a:r>
+            <a:r>
+              <a:rPr lang="cs-CZ" baseline="0" dirty="0" smtClean="0"/>
+              <a:t> v aplikaci.</a:t>
+            </a:r>
           </a:p>
         </p:txBody>
       </p:sp>
@@ -2181,7 +2176,7 @@
               <a:rPr lang="cs-CZ" smtClean="0"/>
               <a:t>7</a:t>
             </a:fld>
-            <a:endParaRPr lang="cs-CZ"/>
+            <a:endParaRPr lang="cs-CZ" dirty="0"/>
           </a:p>
         </p:txBody>
       </p:sp>
@@ -2285,7 +2280,7 @@
               <a:rPr lang="cs-CZ" smtClean="0"/>
               <a:t>8</a:t>
             </a:fld>
-            <a:endParaRPr lang="cs-CZ"/>
+            <a:endParaRPr lang="cs-CZ" dirty="0"/>
           </a:p>
         </p:txBody>
       </p:sp>
@@ -2377,7 +2372,7 @@
               <a:rPr lang="cs-CZ" smtClean="0"/>
               <a:t>9</a:t>
             </a:fld>
-            <a:endParaRPr lang="cs-CZ"/>
+            <a:endParaRPr lang="cs-CZ" dirty="0"/>
           </a:p>
         </p:txBody>
       </p:sp>
@@ -6719,15 +6714,7 @@
                   <a:schemeClr val="bg1"/>
                 </a:solidFill>
               </a:rPr>
-              <a:t>Data </a:t>
-            </a:r>
-            <a:r>
-              <a:rPr lang="cs-CZ" dirty="0" err="1" smtClean="0">
-                <a:solidFill>
-                  <a:schemeClr val="bg1"/>
-                </a:solidFill>
-              </a:rPr>
-              <a:t>parser</a:t>
+              <a:t>Data parser</a:t>
             </a:r>
             <a:endParaRPr lang="cs-CZ" dirty="0">
               <a:solidFill>
@@ -10803,6 +10790,41 @@
           <a:chExt cx="0" cy="0"/>
         </a:xfrm>
       </p:grpSpPr>
+      <p:cxnSp>
+        <p:nvCxnSpPr>
+          <p:cNvPr id="97" name="Přímá spojnice 96"/>
+          <p:cNvCxnSpPr/>
+          <p:nvPr/>
+        </p:nvCxnSpPr>
+        <p:spPr>
+          <a:xfrm flipH="1">
+            <a:off x="4323456" y="2827119"/>
+            <a:ext cx="1504309" cy="0"/>
+          </a:xfrm>
+          <a:prstGeom prst="line">
+            <a:avLst/>
+          </a:prstGeom>
+          <a:ln w="47625">
+            <a:solidFill>
+              <a:schemeClr val="tx1"/>
+            </a:solidFill>
+          </a:ln>
+        </p:spPr>
+        <p:style>
+          <a:lnRef idx="1">
+            <a:schemeClr val="accent1"/>
+          </a:lnRef>
+          <a:fillRef idx="0">
+            <a:schemeClr val="accent1"/>
+          </a:fillRef>
+          <a:effectRef idx="0">
+            <a:schemeClr val="accent1"/>
+          </a:effectRef>
+          <a:fontRef idx="minor">
+            <a:schemeClr val="tx1"/>
+          </a:fontRef>
+        </p:style>
+      </p:cxnSp>
       <p:pic>
         <p:nvPicPr>
           <p:cNvPr id="83" name="Obrázek 82"/>
@@ -10841,8 +10863,8 @@
         </p:nvSpPr>
         <p:spPr>
           <a:xfrm>
-            <a:off x="4876800" y="3746500"/>
-            <a:ext cx="3879266" cy="2527300"/>
+            <a:off x="8587308" y="807671"/>
+            <a:ext cx="2868833" cy="5466128"/>
           </a:xfrm>
           <a:prstGeom prst="rect">
             <a:avLst/>
@@ -10889,7 +10911,7 @@
         <p:spPr>
           <a:xfrm>
             <a:off x="2032000" y="807672"/>
-            <a:ext cx="2565400" cy="5466128"/>
+            <a:ext cx="2615156" cy="5466128"/>
           </a:xfrm>
           <a:prstGeom prst="rect">
             <a:avLst/>
@@ -10927,6 +10949,76 @@
           </a:p>
         </p:txBody>
       </p:sp>
+      <p:cxnSp>
+        <p:nvCxnSpPr>
+          <p:cNvPr id="99" name="Přímá spojnice 98"/>
+          <p:cNvCxnSpPr/>
+          <p:nvPr/>
+        </p:nvCxnSpPr>
+        <p:spPr>
+          <a:xfrm flipH="1">
+            <a:off x="7673424" y="2827119"/>
+            <a:ext cx="1504309" cy="0"/>
+          </a:xfrm>
+          <a:prstGeom prst="line">
+            <a:avLst/>
+          </a:prstGeom>
+          <a:ln w="47625">
+            <a:solidFill>
+              <a:schemeClr val="tx1"/>
+            </a:solidFill>
+          </a:ln>
+        </p:spPr>
+        <p:style>
+          <a:lnRef idx="1">
+            <a:schemeClr val="accent1"/>
+          </a:lnRef>
+          <a:fillRef idx="0">
+            <a:schemeClr val="accent1"/>
+          </a:fillRef>
+          <a:effectRef idx="0">
+            <a:schemeClr val="accent1"/>
+          </a:effectRef>
+          <a:fontRef idx="minor">
+            <a:schemeClr val="tx1"/>
+          </a:fontRef>
+        </p:style>
+      </p:cxnSp>
+      <p:cxnSp>
+        <p:nvCxnSpPr>
+          <p:cNvPr id="100" name="Přímá spojnice 99"/>
+          <p:cNvCxnSpPr/>
+          <p:nvPr/>
+        </p:nvCxnSpPr>
+        <p:spPr>
+          <a:xfrm flipH="1">
+            <a:off x="7673424" y="4668924"/>
+            <a:ext cx="1504309" cy="0"/>
+          </a:xfrm>
+          <a:prstGeom prst="line">
+            <a:avLst/>
+          </a:prstGeom>
+          <a:ln w="47625">
+            <a:solidFill>
+              <a:schemeClr val="tx1"/>
+            </a:solidFill>
+          </a:ln>
+        </p:spPr>
+        <p:style>
+          <a:lnRef idx="1">
+            <a:schemeClr val="accent1"/>
+          </a:lnRef>
+          <a:fillRef idx="0">
+            <a:schemeClr val="accent1"/>
+          </a:fillRef>
+          <a:effectRef idx="0">
+            <a:schemeClr val="accent1"/>
+          </a:effectRef>
+          <a:fontRef idx="minor">
+            <a:schemeClr val="tx1"/>
+          </a:fontRef>
+        </p:style>
+      </p:cxnSp>
       <p:sp>
         <p:nvSpPr>
           <p:cNvPr id="55" name="Obdélník 54"/>
@@ -10936,7 +11028,7 @@
         <p:spPr>
           <a:xfrm>
             <a:off x="2305944" y="1082154"/>
-            <a:ext cx="2017512" cy="1157654"/>
+            <a:ext cx="2017512" cy="3039904"/>
           </a:xfrm>
           <a:prstGeom prst="rect">
             <a:avLst/>
@@ -10981,7 +11073,18 @@
                   <a:schemeClr val="bg1"/>
                 </a:solidFill>
               </a:rPr>
-              <a:t>IDBConnector</a:t>
+              <a:t>Databázový</a:t>
+            </a:r>
+          </a:p>
+          <a:p>
+            <a:pPr algn="ctr"/>
+            <a:r>
+              <a:rPr lang="cs-CZ" dirty="0" smtClean="0">
+                <a:solidFill>
+                  <a:schemeClr val="bg1"/>
+                </a:solidFill>
+              </a:rPr>
+              <a:t>Pohled</a:t>
             </a:r>
             <a:endParaRPr lang="cs-CZ" dirty="0">
               <a:solidFill>
@@ -10993,14 +11096,469 @@
       </p:sp>
       <p:sp>
         <p:nvSpPr>
-          <p:cNvPr id="56" name="Obdélník 55"/>
+          <p:cNvPr id="69" name="Obdélník 68"/>
           <p:cNvSpPr/>
           <p:nvPr/>
         </p:nvSpPr>
         <p:spPr>
           <a:xfrm>
-            <a:off x="2305944" y="2514290"/>
-            <a:ext cx="2017512" cy="487883"/>
+            <a:off x="1765820" y="515572"/>
+            <a:ext cx="9994380" cy="5961428"/>
+          </a:xfrm>
+          <a:prstGeom prst="rect">
+            <a:avLst/>
+          </a:prstGeom>
+          <a:noFill/>
+          <a:ln w="31750">
+            <a:solidFill>
+              <a:schemeClr val="tx1"/>
+            </a:solidFill>
+            <a:prstDash val="dash"/>
+          </a:ln>
+        </p:spPr>
+        <p:style>
+          <a:lnRef idx="2">
+            <a:schemeClr val="accent1">
+              <a:shade val="50000"/>
+            </a:schemeClr>
+          </a:lnRef>
+          <a:fillRef idx="1">
+            <a:schemeClr val="accent1"/>
+          </a:fillRef>
+          <a:effectRef idx="0">
+            <a:schemeClr val="accent1"/>
+          </a:effectRef>
+          <a:fontRef idx="minor">
+            <a:schemeClr val="lt1"/>
+          </a:fontRef>
+        </p:style>
+        <p:txBody>
+          <a:bodyPr rtlCol="0" anchor="ctr"/>
+          <a:lstStyle/>
+          <a:p>
+            <a:pPr algn="ctr"/>
+            <a:endParaRPr lang="cs-CZ" dirty="0"/>
+          </a:p>
+        </p:txBody>
+      </p:sp>
+      <p:cxnSp>
+        <p:nvCxnSpPr>
+          <p:cNvPr id="90" name="Přímá spojnice 89"/>
+          <p:cNvCxnSpPr/>
+          <p:nvPr/>
+        </p:nvCxnSpPr>
+        <p:spPr>
+          <a:xfrm flipH="1">
+            <a:off x="-1" y="2827119"/>
+            <a:ext cx="2305945" cy="0"/>
+          </a:xfrm>
+          <a:prstGeom prst="line">
+            <a:avLst/>
+          </a:prstGeom>
+          <a:ln w="47625">
+            <a:solidFill>
+              <a:schemeClr val="tx1"/>
+            </a:solidFill>
+          </a:ln>
+        </p:spPr>
+        <p:style>
+          <a:lnRef idx="1">
+            <a:schemeClr val="accent1"/>
+          </a:lnRef>
+          <a:fillRef idx="0">
+            <a:schemeClr val="accent1"/>
+          </a:fillRef>
+          <a:effectRef idx="0">
+            <a:schemeClr val="accent1"/>
+          </a:effectRef>
+          <a:fontRef idx="minor">
+            <a:schemeClr val="tx1"/>
+          </a:fontRef>
+        </p:style>
+      </p:cxnSp>
+      <p:sp>
+        <p:nvSpPr>
+          <p:cNvPr id="91" name="Zaoblený obdélník 90"/>
+          <p:cNvSpPr/>
+          <p:nvPr/>
+        </p:nvSpPr>
+        <p:spPr>
+          <a:xfrm>
+            <a:off x="8864578" y="1082153"/>
+            <a:ext cx="2325383" cy="4991257"/>
+          </a:xfrm>
+          <a:prstGeom prst="roundRect">
+            <a:avLst/>
+          </a:prstGeom>
+          <a:solidFill>
+            <a:srgbClr val="A2C0DC"/>
+          </a:solidFill>
+          <a:ln w="25400" cap="flat" cmpd="sng" algn="ctr">
+            <a:solidFill>
+              <a:schemeClr val="dk1"/>
+            </a:solidFill>
+            <a:prstDash val="solid"/>
+            <a:round/>
+            <a:headEnd type="none" w="med" len="med"/>
+            <a:tailEnd type="none" w="med" len="med"/>
+          </a:ln>
+        </p:spPr>
+        <p:style>
+          <a:lnRef idx="0">
+            <a:scrgbClr r="0" g="0" b="0"/>
+          </a:lnRef>
+          <a:fillRef idx="0">
+            <a:scrgbClr r="0" g="0" b="0"/>
+          </a:fillRef>
+          <a:effectRef idx="0">
+            <a:scrgbClr r="0" g="0" b="0"/>
+          </a:effectRef>
+          <a:fontRef idx="minor">
+            <a:schemeClr val="dk1"/>
+          </a:fontRef>
+        </p:style>
+        <p:txBody>
+          <a:bodyPr rtlCol="0" anchor="ctr"/>
+          <a:lstStyle/>
+          <a:p>
+            <a:pPr algn="ctr"/>
+            <a:r>
+              <a:rPr lang="cs-CZ" sz="2400" dirty="0" smtClean="0">
+                <a:ln w="0"/>
+                <a:solidFill>
+                  <a:schemeClr val="tx1"/>
+                </a:solidFill>
+                <a:effectLst>
+                  <a:outerShdw blurRad="38100" dist="19050" dir="2700000" algn="tl" rotWithShape="0">
+                    <a:schemeClr val="dk1">
+                      <a:alpha val="40000"/>
+                    </a:schemeClr>
+                  </a:outerShdw>
+                </a:effectLst>
+              </a:rPr>
+              <a:t>Laptop</a:t>
+            </a:r>
+          </a:p>
+          <a:p>
+            <a:pPr algn="ctr"/>
+            <a:endParaRPr lang="cs-CZ" dirty="0">
+              <a:ln w="0"/>
+              <a:solidFill>
+                <a:schemeClr val="tx1"/>
+              </a:solidFill>
+              <a:effectLst>
+                <a:outerShdw blurRad="38100" dist="19050" dir="2700000" algn="tl" rotWithShape="0">
+                  <a:schemeClr val="dk1">
+                    <a:alpha val="40000"/>
+                  </a:schemeClr>
+                </a:outerShdw>
+              </a:effectLst>
+            </a:endParaRPr>
+          </a:p>
+          <a:p>
+            <a:pPr algn="ctr"/>
+            <a:r>
+              <a:rPr lang="cs-CZ" sz="1400" dirty="0" smtClean="0">
+                <a:ln w="0"/>
+                <a:solidFill>
+                  <a:srgbClr val="C00000"/>
+                </a:solidFill>
+                <a:effectLst>
+                  <a:outerShdw blurRad="38100" dist="19050" dir="2700000" algn="tl" rotWithShape="0">
+                    <a:schemeClr val="dk1">
+                      <a:alpha val="40000"/>
+                    </a:schemeClr>
+                  </a:outerShdw>
+                </a:effectLst>
+              </a:rPr>
+              <a:t>Product_code (PK)</a:t>
+            </a:r>
+          </a:p>
+          <a:p>
+            <a:pPr algn="ctr"/>
+            <a:r>
+              <a:rPr lang="cs-CZ" sz="1400" dirty="0" smtClean="0">
+                <a:ln w="0"/>
+                <a:solidFill>
+                  <a:srgbClr val="C00000"/>
+                </a:solidFill>
+                <a:effectLst>
+                  <a:outerShdw blurRad="38100" dist="19050" dir="2700000" algn="tl" rotWithShape="0">
+                    <a:schemeClr val="dk1">
+                      <a:alpha val="40000"/>
+                    </a:schemeClr>
+                  </a:outerShdw>
+                </a:effectLst>
+              </a:rPr>
+              <a:t>Color (PK)</a:t>
+            </a:r>
+          </a:p>
+          <a:p>
+            <a:pPr algn="ctr"/>
+            <a:r>
+              <a:rPr lang="cs-CZ" sz="1400" dirty="0" smtClean="0">
+                <a:ln w="0"/>
+                <a:solidFill>
+                  <a:srgbClr val="C00000"/>
+                </a:solidFill>
+                <a:effectLst>
+                  <a:outerShdw blurRad="38100" dist="19050" dir="2700000" algn="tl" rotWithShape="0">
+                    <a:schemeClr val="dk1">
+                      <a:alpha val="40000"/>
+                    </a:schemeClr>
+                  </a:outerShdw>
+                </a:effectLst>
+              </a:rPr>
+              <a:t>Width (PK)</a:t>
+            </a:r>
+          </a:p>
+          <a:p>
+            <a:pPr algn="ctr"/>
+            <a:r>
+              <a:rPr lang="cs-CZ" sz="1400" dirty="0" smtClean="0">
+                <a:ln w="0"/>
+                <a:solidFill>
+                  <a:srgbClr val="C00000"/>
+                </a:solidFill>
+                <a:effectLst>
+                  <a:outerShdw blurRad="38100" dist="19050" dir="2700000" algn="tl" rotWithShape="0">
+                    <a:schemeClr val="dk1">
+                      <a:alpha val="40000"/>
+                    </a:schemeClr>
+                  </a:outerShdw>
+                </a:effectLst>
+              </a:rPr>
+              <a:t>Height (PK)</a:t>
+            </a:r>
+          </a:p>
+          <a:p>
+            <a:pPr algn="ctr"/>
+            <a:r>
+              <a:rPr lang="cs-CZ" sz="1400" dirty="0" smtClean="0">
+                <a:ln w="0"/>
+                <a:solidFill>
+                  <a:srgbClr val="C00000"/>
+                </a:solidFill>
+                <a:effectLst>
+                  <a:outerShdw blurRad="38100" dist="19050" dir="2700000" algn="tl" rotWithShape="0">
+                    <a:schemeClr val="dk1">
+                      <a:alpha val="40000"/>
+                    </a:schemeClr>
+                  </a:outerShdw>
+                </a:effectLst>
+              </a:rPr>
+              <a:t>Depth (PK)</a:t>
+            </a:r>
+          </a:p>
+          <a:p>
+            <a:pPr algn="ctr"/>
+            <a:r>
+              <a:rPr lang="cs-CZ" sz="1400" dirty="0" smtClean="0">
+                <a:ln w="0"/>
+                <a:solidFill>
+                  <a:srgbClr val="C00000"/>
+                </a:solidFill>
+                <a:effectLst>
+                  <a:outerShdw blurRad="38100" dist="19050" dir="2700000" algn="tl" rotWithShape="0">
+                    <a:schemeClr val="dk1">
+                      <a:alpha val="40000"/>
+                    </a:schemeClr>
+                  </a:outerShdw>
+                </a:effectLst>
+              </a:rPr>
+              <a:t>Weight (PK)</a:t>
+            </a:r>
+          </a:p>
+          <a:p>
+            <a:pPr algn="ctr"/>
+            <a:endParaRPr lang="cs-CZ" sz="1400" dirty="0" smtClean="0">
+              <a:ln w="0"/>
+              <a:solidFill>
+                <a:schemeClr val="tx1"/>
+              </a:solidFill>
+              <a:effectLst>
+                <a:outerShdw blurRad="38100" dist="19050" dir="2700000" algn="tl" rotWithShape="0">
+                  <a:schemeClr val="dk1">
+                    <a:alpha val="40000"/>
+                  </a:schemeClr>
+                </a:outerShdw>
+              </a:effectLst>
+            </a:endParaRPr>
+          </a:p>
+          <a:p>
+            <a:pPr algn="ctr"/>
+            <a:r>
+              <a:rPr lang="cs-CZ" sz="1400" dirty="0" smtClean="0">
+                <a:ln w="0"/>
+                <a:solidFill>
+                  <a:schemeClr val="accent5">
+                    <a:lumMod val="50000"/>
+                  </a:schemeClr>
+                </a:solidFill>
+                <a:effectLst>
+                  <a:outerShdw blurRad="38100" dist="19050" dir="2700000" algn="tl" rotWithShape="0">
+                    <a:schemeClr val="dk1">
+                      <a:alpha val="40000"/>
+                    </a:schemeClr>
+                  </a:outerShdw>
+                </a:effectLst>
+              </a:rPr>
+              <a:t>Id_display (PFK)</a:t>
+            </a:r>
+          </a:p>
+          <a:p>
+            <a:pPr algn="ctr"/>
+            <a:r>
+              <a:rPr lang="cs-CZ" sz="1400" dirty="0" smtClean="0">
+                <a:ln w="0"/>
+                <a:solidFill>
+                  <a:schemeClr val="accent5">
+                    <a:lumMod val="50000"/>
+                  </a:schemeClr>
+                </a:solidFill>
+                <a:effectLst>
+                  <a:outerShdw blurRad="38100" dist="19050" dir="2700000" algn="tl" rotWithShape="0">
+                    <a:schemeClr val="dk1">
+                      <a:alpha val="40000"/>
+                    </a:schemeClr>
+                  </a:outerShdw>
+                </a:effectLst>
+              </a:rPr>
+              <a:t>Id_cpu (PFK)</a:t>
+            </a:r>
+          </a:p>
+          <a:p>
+            <a:pPr algn="ctr"/>
+            <a:r>
+              <a:rPr lang="cs-CZ" sz="1400" dirty="0" smtClean="0">
+                <a:ln w="0"/>
+                <a:solidFill>
+                  <a:schemeClr val="accent5">
+                    <a:lumMod val="50000"/>
+                  </a:schemeClr>
+                </a:solidFill>
+                <a:effectLst>
+                  <a:outerShdw blurRad="38100" dist="19050" dir="2700000" algn="tl" rotWithShape="0">
+                    <a:schemeClr val="dk1">
+                      <a:alpha val="40000"/>
+                    </a:schemeClr>
+                  </a:outerShdw>
+                </a:effectLst>
+              </a:rPr>
+              <a:t>Id_ram (PFK)</a:t>
+            </a:r>
+          </a:p>
+          <a:p>
+            <a:pPr algn="ctr"/>
+            <a:r>
+              <a:rPr lang="cs-CZ" sz="1400" dirty="0" smtClean="0">
+                <a:ln w="0"/>
+                <a:solidFill>
+                  <a:schemeClr val="accent5">
+                    <a:lumMod val="50000"/>
+                  </a:schemeClr>
+                </a:solidFill>
+                <a:effectLst>
+                  <a:outerShdw blurRad="38100" dist="19050" dir="2700000" algn="tl" rotWithShape="0">
+                    <a:schemeClr val="dk1">
+                      <a:alpha val="40000"/>
+                    </a:schemeClr>
+                  </a:outerShdw>
+                </a:effectLst>
+              </a:rPr>
+              <a:t>Id_hdd (PFK)</a:t>
+            </a:r>
+          </a:p>
+          <a:p>
+            <a:pPr algn="ctr"/>
+            <a:r>
+              <a:rPr lang="cs-CZ" sz="1400" dirty="0" smtClean="0">
+                <a:ln w="0"/>
+                <a:solidFill>
+                  <a:schemeClr val="accent5">
+                    <a:lumMod val="50000"/>
+                  </a:schemeClr>
+                </a:solidFill>
+                <a:effectLst>
+                  <a:outerShdw blurRad="38100" dist="19050" dir="2700000" algn="tl" rotWithShape="0">
+                    <a:schemeClr val="dk1">
+                      <a:alpha val="40000"/>
+                    </a:schemeClr>
+                  </a:outerShdw>
+                </a:effectLst>
+              </a:rPr>
+              <a:t>Os (PFK)</a:t>
+            </a:r>
+          </a:p>
+          <a:p>
+            <a:pPr algn="ctr"/>
+            <a:r>
+              <a:rPr lang="cs-CZ" sz="1400" dirty="0" smtClean="0">
+                <a:ln w="0"/>
+                <a:solidFill>
+                  <a:schemeClr val="accent5">
+                    <a:lumMod val="50000"/>
+                  </a:schemeClr>
+                </a:solidFill>
+                <a:effectLst>
+                  <a:outerShdw blurRad="38100" dist="19050" dir="2700000" algn="tl" rotWithShape="0">
+                    <a:schemeClr val="dk1">
+                      <a:alpha val="40000"/>
+                    </a:schemeClr>
+                  </a:outerShdw>
+                </a:effectLst>
+              </a:rPr>
+              <a:t>Type (PFK)</a:t>
+            </a:r>
+          </a:p>
+          <a:p>
+            <a:pPr algn="ctr"/>
+            <a:r>
+              <a:rPr lang="cs-CZ" sz="1400" dirty="0" smtClean="0">
+                <a:ln w="0"/>
+                <a:solidFill>
+                  <a:schemeClr val="accent5">
+                    <a:lumMod val="50000"/>
+                  </a:schemeClr>
+                </a:solidFill>
+                <a:effectLst>
+                  <a:outerShdw blurRad="38100" dist="19050" dir="2700000" algn="tl" rotWithShape="0">
+                    <a:schemeClr val="dk1">
+                      <a:alpha val="40000"/>
+                    </a:schemeClr>
+                  </a:outerShdw>
+                </a:effectLst>
+              </a:rPr>
+              <a:t>File (PFK)</a:t>
+            </a:r>
+            <a:endParaRPr lang="cs-CZ" sz="1400" dirty="0">
+              <a:ln w="0"/>
+              <a:solidFill>
+                <a:schemeClr val="accent5">
+                  <a:lumMod val="50000"/>
+                </a:schemeClr>
+              </a:solidFill>
+              <a:effectLst>
+                <a:outerShdw blurRad="38100" dist="19050" dir="2700000" algn="tl" rotWithShape="0">
+                  <a:schemeClr val="dk1">
+                    <a:alpha val="40000"/>
+                  </a:schemeClr>
+                </a:outerShdw>
+              </a:effectLst>
+            </a:endParaRPr>
+          </a:p>
+        </p:txBody>
+      </p:sp>
+      <p:sp>
+        <p:nvSpPr>
+          <p:cNvPr id="92" name="Obdélník 91"/>
+          <p:cNvSpPr/>
+          <p:nvPr/>
+        </p:nvSpPr>
+        <p:spPr>
+          <a:xfrm>
+            <a:off x="2305944" y="4368121"/>
+            <a:ext cx="2017512" cy="934742"/>
           </a:xfrm>
           <a:prstGeom prst="rect">
             <a:avLst/>
@@ -11046,9 +11604,9 @@
                   <a:schemeClr val="bg1"/>
                 </a:solidFill>
               </a:rPr>
-              <a:t>MSSQLConnector</a:t>
-            </a:r>
-            <a:endParaRPr lang="cs-CZ" dirty="0">
+              <a:t>Instead of trigger</a:t>
+            </a:r>
+            <a:endParaRPr lang="cs-CZ" dirty="0" smtClean="0">
               <a:solidFill>
                 <a:schemeClr val="bg1"/>
               </a:solidFill>
@@ -11056,60 +11614,19 @@
           </a:p>
         </p:txBody>
       </p:sp>
-      <p:sp>
-        <p:nvSpPr>
-          <p:cNvPr id="57" name="TextovéPole 56"/>
-          <p:cNvSpPr txBox="1"/>
-          <p:nvPr/>
-        </p:nvSpPr>
-        <p:spPr>
-          <a:xfrm>
-            <a:off x="3143018" y="3265691"/>
-            <a:ext cx="343364" cy="923330"/>
-          </a:xfrm>
-          <a:prstGeom prst="rect">
-            <a:avLst/>
-          </a:prstGeom>
-          <a:noFill/>
-        </p:spPr>
-        <p:txBody>
-          <a:bodyPr wrap="none" rtlCol="0">
-            <a:spAutoFit/>
-          </a:bodyPr>
-          <a:lstStyle/>
-          <a:p>
-            <a:r>
-              <a:rPr lang="cs-CZ" dirty="0" smtClean="0"/>
-              <a:t>…</a:t>
-            </a:r>
-          </a:p>
-          <a:p>
-            <a:r>
-              <a:rPr lang="cs-CZ" dirty="0" smtClean="0"/>
-              <a:t>…</a:t>
-            </a:r>
-          </a:p>
-          <a:p>
-            <a:r>
-              <a:rPr lang="cs-CZ" dirty="0" smtClean="0"/>
-              <a:t>…</a:t>
-            </a:r>
-          </a:p>
-        </p:txBody>
-      </p:sp>
       <p:cxnSp>
         <p:nvCxnSpPr>
-          <p:cNvPr id="58" name="Přímá spojnice 57"/>
+          <p:cNvPr id="19" name="Přímá spojnice 18"/>
           <p:cNvCxnSpPr>
             <a:stCxn id="55" idx="2"/>
-            <a:endCxn id="56" idx="0"/>
+            <a:endCxn id="92" idx="0"/>
           </p:cNvCxnSpPr>
           <p:nvPr/>
         </p:nvCxnSpPr>
         <p:spPr>
           <a:xfrm>
-            <a:off x="3314700" y="2239808"/>
-            <a:ext cx="0" cy="274482"/>
+            <a:off x="3314700" y="4122058"/>
+            <a:ext cx="0" cy="246063"/>
           </a:xfrm>
           <a:prstGeom prst="line">
             <a:avLst/>
@@ -11137,150 +11654,14 @@
       </p:cxnSp>
       <p:sp>
         <p:nvSpPr>
-          <p:cNvPr id="59" name="Obdélník 58"/>
+          <p:cNvPr id="94" name="Obdélník 93"/>
           <p:cNvSpPr/>
           <p:nvPr/>
         </p:nvSpPr>
         <p:spPr>
           <a:xfrm>
-            <a:off x="5827765" y="1082154"/>
-            <a:ext cx="2017512" cy="1157654"/>
-          </a:xfrm>
-          <a:prstGeom prst="rect">
-            <a:avLst/>
-          </a:prstGeom>
-          <a:solidFill>
-            <a:schemeClr val="tx2">
-              <a:lumMod val="50000"/>
-            </a:schemeClr>
-          </a:solidFill>
-          <a:ln w="25400" cap="flat" cmpd="sng" algn="ctr">
-            <a:solidFill>
-              <a:schemeClr val="dk1"/>
-            </a:solidFill>
-            <a:prstDash val="solid"/>
-            <a:round/>
-            <a:headEnd type="none" w="med" len="med"/>
-            <a:tailEnd type="none" w="med" len="med"/>
-          </a:ln>
-        </p:spPr>
-        <p:style>
-          <a:lnRef idx="0">
-            <a:scrgbClr r="0" g="0" b="0"/>
-          </a:lnRef>
-          <a:fillRef idx="0">
-            <a:scrgbClr r="0" g="0" b="0"/>
-          </a:fillRef>
-          <a:effectRef idx="0">
-            <a:scrgbClr r="0" g="0" b="0"/>
-          </a:effectRef>
-          <a:fontRef idx="minor">
-            <a:schemeClr val="dk1"/>
-          </a:fontRef>
-        </p:style>
-        <p:txBody>
-          <a:bodyPr rtlCol="0" anchor="ctr"/>
-          <a:lstStyle/>
-          <a:p>
-            <a:pPr algn="ctr"/>
-            <a:r>
-              <a:rPr lang="cs-CZ" dirty="0" smtClean="0">
-                <a:solidFill>
-                  <a:schemeClr val="bg1"/>
-                </a:solidFill>
-              </a:rPr>
-              <a:t>Application</a:t>
-            </a:r>
-            <a:endParaRPr lang="cs-CZ" dirty="0">
-              <a:solidFill>
-                <a:schemeClr val="bg1"/>
-              </a:solidFill>
-            </a:endParaRPr>
-          </a:p>
-        </p:txBody>
-      </p:sp>
-      <p:sp>
-        <p:nvSpPr>
-          <p:cNvPr id="60" name="Obdélník 59"/>
-          <p:cNvSpPr/>
-          <p:nvPr/>
-        </p:nvSpPr>
-        <p:spPr>
-          <a:xfrm>
-            <a:off x="5804795" y="4011246"/>
-            <a:ext cx="2017512" cy="1157654"/>
-          </a:xfrm>
-          <a:prstGeom prst="rect">
-            <a:avLst/>
-          </a:prstGeom>
-          <a:solidFill>
-            <a:schemeClr val="tx2">
-              <a:lumMod val="50000"/>
-            </a:schemeClr>
-          </a:solidFill>
-          <a:ln w="25400" cap="flat" cmpd="sng" algn="ctr">
-            <a:solidFill>
-              <a:schemeClr val="dk1"/>
-            </a:solidFill>
-            <a:prstDash val="solid"/>
-            <a:round/>
-            <a:headEnd type="none" w="med" len="med"/>
-            <a:tailEnd type="none" w="med" len="med"/>
-          </a:ln>
-        </p:spPr>
-        <p:style>
-          <a:lnRef idx="0">
-            <a:scrgbClr r="0" g="0" b="0"/>
-          </a:lnRef>
-          <a:fillRef idx="0">
-            <a:scrgbClr r="0" g="0" b="0"/>
-          </a:fillRef>
-          <a:effectRef idx="0">
-            <a:scrgbClr r="0" g="0" b="0"/>
-          </a:effectRef>
-          <a:fontRef idx="minor">
-            <a:schemeClr val="dk1"/>
-          </a:fontRef>
-        </p:style>
-        <p:txBody>
-          <a:bodyPr rtlCol="0" anchor="ctr"/>
-          <a:lstStyle/>
-          <a:p>
-            <a:pPr algn="ctr"/>
-            <a:r>
-              <a:rPr lang="cs-CZ" dirty="0" smtClean="0">
-                <a:solidFill>
-                  <a:schemeClr val="bg1"/>
-                </a:solidFill>
-              </a:rPr>
-              <a:t>Data </a:t>
-            </a:r>
-            <a:r>
-              <a:rPr lang="cs-CZ" dirty="0" err="1" smtClean="0">
-                <a:solidFill>
-                  <a:schemeClr val="bg1"/>
-                </a:solidFill>
-              </a:rPr>
-              <a:t>parser</a:t>
-            </a:r>
-            <a:endParaRPr lang="cs-CZ" dirty="0">
-              <a:solidFill>
-                <a:schemeClr val="bg1"/>
-              </a:solidFill>
-            </a:endParaRPr>
-          </a:p>
-        </p:txBody>
-      </p:sp>
-      <p:sp>
-        <p:nvSpPr>
-          <p:cNvPr id="61" name="Obdélník 60"/>
-          <p:cNvSpPr/>
-          <p:nvPr/>
-        </p:nvSpPr>
-        <p:spPr>
-          <a:xfrm>
-            <a:off x="5072734" y="5604347"/>
-            <a:ext cx="921666" cy="487883"/>
+            <a:off x="5655912" y="2052919"/>
+            <a:ext cx="2017512" cy="1485683"/>
           </a:xfrm>
           <a:prstGeom prst="rect">
             <a:avLst/>
@@ -11326,21 +11707,26 @@
                   <a:schemeClr val="bg1"/>
                 </a:solidFill>
               </a:rPr>
-              <a:t>CSV</a:t>
-            </a:r>
-          </a:p>
-        </p:txBody>
-      </p:sp>
-      <p:sp>
-        <p:nvSpPr>
-          <p:cNvPr id="62" name="Obdélník 61"/>
+              <a:t>Linker</a:t>
+            </a:r>
+            <a:endParaRPr lang="cs-CZ" dirty="0" smtClean="0">
+              <a:solidFill>
+                <a:schemeClr val="bg1"/>
+              </a:solidFill>
+            </a:endParaRPr>
+          </a:p>
+        </p:txBody>
+      </p:sp>
+      <p:sp>
+        <p:nvSpPr>
+          <p:cNvPr id="95" name="Obdélník 94"/>
           <p:cNvSpPr/>
           <p:nvPr/>
         </p:nvSpPr>
         <p:spPr>
           <a:xfrm>
-            <a:off x="6362701" y="5604346"/>
-            <a:ext cx="901700" cy="487883"/>
+            <a:off x="5655912" y="3926083"/>
+            <a:ext cx="2017512" cy="1485683"/>
           </a:xfrm>
           <a:prstGeom prst="rect">
             <a:avLst/>
@@ -11386,21 +11772,63 @@
                   <a:schemeClr val="bg1"/>
                 </a:solidFill>
               </a:rPr>
-              <a:t>JSON</a:t>
-            </a:r>
-          </a:p>
-        </p:txBody>
-      </p:sp>
-      <p:sp>
-        <p:nvSpPr>
-          <p:cNvPr id="63" name="Obdélník 62"/>
+              <a:t>Consistency</a:t>
+            </a:r>
+            <a:endParaRPr lang="cs-CZ" dirty="0" smtClean="0">
+              <a:solidFill>
+                <a:schemeClr val="bg1"/>
+              </a:solidFill>
+            </a:endParaRPr>
+          </a:p>
+        </p:txBody>
+      </p:sp>
+      <p:cxnSp>
+        <p:nvCxnSpPr>
+          <p:cNvPr id="98" name="Přímá spojnice 97"/>
+          <p:cNvCxnSpPr>
+            <a:stCxn id="95" idx="1"/>
+          </p:cNvCxnSpPr>
+          <p:nvPr/>
+        </p:nvCxnSpPr>
+        <p:spPr>
+          <a:xfrm flipH="1" flipV="1">
+            <a:off x="4323457" y="3221266"/>
+            <a:ext cx="1332455" cy="1447659"/>
+          </a:xfrm>
+          <a:prstGeom prst="line">
+            <a:avLst/>
+          </a:prstGeom>
+          <a:ln w="47625">
+            <a:solidFill>
+              <a:schemeClr val="tx1"/>
+            </a:solidFill>
+          </a:ln>
+        </p:spPr>
+        <p:style>
+          <a:lnRef idx="1">
+            <a:schemeClr val="accent1"/>
+          </a:lnRef>
+          <a:fillRef idx="0">
+            <a:schemeClr val="accent1"/>
+          </a:fillRef>
+          <a:effectRef idx="0">
+            <a:schemeClr val="accent1"/>
+          </a:effectRef>
+          <a:fontRef idx="minor">
+            <a:schemeClr val="tx1"/>
+          </a:fontRef>
+        </p:style>
+      </p:cxnSp>
+      <p:sp>
+        <p:nvSpPr>
+          <p:cNvPr id="103" name="Obdélník 102"/>
           <p:cNvSpPr/>
           <p:nvPr/>
         </p:nvSpPr>
         <p:spPr>
           <a:xfrm>
-            <a:off x="7638465" y="5604346"/>
-            <a:ext cx="900043" cy="487883"/>
+            <a:off x="2305944" y="5548925"/>
+            <a:ext cx="2017512" cy="491407"/>
           </a:xfrm>
           <a:prstGeom prst="rect">
             <a:avLst/>
@@ -11446,24 +11874,29 @@
                   <a:schemeClr val="bg1"/>
                 </a:solidFill>
               </a:rPr>
-              <a:t>XML</a:t>
-            </a:r>
+              <a:t>Return result</a:t>
+            </a:r>
+            <a:endParaRPr lang="cs-CZ" dirty="0" smtClean="0">
+              <a:solidFill>
+                <a:schemeClr val="bg1"/>
+              </a:solidFill>
+            </a:endParaRPr>
           </a:p>
         </p:txBody>
       </p:sp>
       <p:cxnSp>
         <p:nvCxnSpPr>
-          <p:cNvPr id="64" name="Přímá spojnice 63"/>
+          <p:cNvPr id="105" name="Přímá spojnice 104"/>
           <p:cNvCxnSpPr>
-            <a:stCxn id="61" idx="0"/>
-            <a:endCxn id="60" idx="2"/>
+            <a:stCxn id="92" idx="2"/>
+            <a:endCxn id="103" idx="0"/>
           </p:cNvCxnSpPr>
           <p:nvPr/>
         </p:nvCxnSpPr>
         <p:spPr>
-          <a:xfrm flipV="1">
-            <a:off x="5533567" y="5168900"/>
-            <a:ext cx="1279984" cy="435447"/>
+          <a:xfrm>
+            <a:off x="3314700" y="5302863"/>
+            <a:ext cx="0" cy="246062"/>
           </a:xfrm>
           <a:prstGeom prst="line">
             <a:avLst/>
@@ -11491,749 +11924,25 @@
       </p:cxnSp>
       <p:cxnSp>
         <p:nvCxnSpPr>
-          <p:cNvPr id="65" name="Přímá spojnice 64"/>
+          <p:cNvPr id="108" name="Přímá spojnice se šipkou 107"/>
           <p:cNvCxnSpPr>
-            <a:stCxn id="60" idx="2"/>
-            <a:endCxn id="62" idx="0"/>
+            <a:stCxn id="103" idx="1"/>
           </p:cNvCxnSpPr>
           <p:nvPr/>
         </p:nvCxnSpPr>
         <p:spPr>
-          <a:xfrm>
-            <a:off x="6813551" y="5168900"/>
-            <a:ext cx="0" cy="435446"/>
-          </a:xfrm>
-          <a:prstGeom prst="line">
-            <a:avLst/>
-          </a:prstGeom>
-          <a:ln>
-            <a:solidFill>
-              <a:schemeClr val="tx1"/>
-            </a:solidFill>
-          </a:ln>
-        </p:spPr>
-        <p:style>
-          <a:lnRef idx="1">
-            <a:schemeClr val="accent1"/>
-          </a:lnRef>
-          <a:fillRef idx="0">
-            <a:schemeClr val="accent1"/>
-          </a:fillRef>
-          <a:effectRef idx="0">
-            <a:schemeClr val="accent1"/>
-          </a:effectRef>
-          <a:fontRef idx="minor">
-            <a:schemeClr val="tx1"/>
-          </a:fontRef>
-        </p:style>
-      </p:cxnSp>
-      <p:cxnSp>
-        <p:nvCxnSpPr>
-          <p:cNvPr id="66" name="Přímá spojnice 65"/>
-          <p:cNvCxnSpPr>
-            <a:stCxn id="63" idx="0"/>
-            <a:endCxn id="60" idx="2"/>
-          </p:cNvCxnSpPr>
-          <p:nvPr/>
-        </p:nvCxnSpPr>
-        <p:spPr>
-          <a:xfrm flipH="1" flipV="1">
-            <a:off x="6813551" y="5168900"/>
-            <a:ext cx="1274936" cy="435446"/>
-          </a:xfrm>
-          <a:prstGeom prst="line">
-            <a:avLst/>
-          </a:prstGeom>
-          <a:ln>
-            <a:solidFill>
-              <a:schemeClr val="tx1"/>
-            </a:solidFill>
-          </a:ln>
-        </p:spPr>
-        <p:style>
-          <a:lnRef idx="1">
-            <a:schemeClr val="accent1"/>
-          </a:lnRef>
-          <a:fillRef idx="0">
-            <a:schemeClr val="accent1"/>
-          </a:fillRef>
-          <a:effectRef idx="0">
-            <a:schemeClr val="accent1"/>
-          </a:effectRef>
-          <a:fontRef idx="minor">
-            <a:schemeClr val="tx1"/>
-          </a:fontRef>
-        </p:style>
-      </p:cxnSp>
-      <p:cxnSp>
-        <p:nvCxnSpPr>
-          <p:cNvPr id="67" name="Přímá spojnice 66"/>
-          <p:cNvCxnSpPr>
-            <a:stCxn id="60" idx="0"/>
-            <a:endCxn id="59" idx="2"/>
-          </p:cNvCxnSpPr>
-          <p:nvPr/>
-        </p:nvCxnSpPr>
-        <p:spPr>
-          <a:xfrm flipV="1">
-            <a:off x="6813551" y="2239808"/>
-            <a:ext cx="22970" cy="1771438"/>
-          </a:xfrm>
-          <a:prstGeom prst="line">
-            <a:avLst/>
-          </a:prstGeom>
-          <a:ln w="19050">
-            <a:solidFill>
-              <a:schemeClr val="tx1"/>
-            </a:solidFill>
-          </a:ln>
-        </p:spPr>
-        <p:style>
-          <a:lnRef idx="1">
-            <a:schemeClr val="accent1"/>
-          </a:lnRef>
-          <a:fillRef idx="0">
-            <a:schemeClr val="accent1"/>
-          </a:fillRef>
-          <a:effectRef idx="0">
-            <a:schemeClr val="accent1"/>
-          </a:effectRef>
-          <a:fontRef idx="minor">
-            <a:schemeClr val="tx1"/>
-          </a:fontRef>
-        </p:style>
-      </p:cxnSp>
-      <p:sp>
-        <p:nvSpPr>
-          <p:cNvPr id="68" name="Obdélník 67"/>
-          <p:cNvSpPr/>
-          <p:nvPr/>
-        </p:nvSpPr>
-        <p:spPr>
-          <a:xfrm>
-            <a:off x="8952000" y="807672"/>
-            <a:ext cx="2565400" cy="5466128"/>
-          </a:xfrm>
-          <a:prstGeom prst="rect">
-            <a:avLst/>
-          </a:prstGeom>
-          <a:noFill/>
-          <a:ln>
-            <a:solidFill>
-              <a:schemeClr val="tx1"/>
-            </a:solidFill>
-            <a:prstDash val="dash"/>
-          </a:ln>
-        </p:spPr>
-        <p:style>
-          <a:lnRef idx="2">
-            <a:schemeClr val="accent1">
-              <a:shade val="50000"/>
-            </a:schemeClr>
-          </a:lnRef>
-          <a:fillRef idx="1">
-            <a:schemeClr val="accent1"/>
-          </a:fillRef>
-          <a:effectRef idx="0">
-            <a:schemeClr val="accent1"/>
-          </a:effectRef>
-          <a:fontRef idx="minor">
-            <a:schemeClr val="lt1"/>
-          </a:fontRef>
-        </p:style>
-        <p:txBody>
-          <a:bodyPr rtlCol="0" anchor="ctr"/>
-          <a:lstStyle/>
-          <a:p>
-            <a:pPr algn="ctr"/>
-            <a:endParaRPr lang="cs-CZ" dirty="0"/>
-          </a:p>
-        </p:txBody>
-      </p:sp>
-      <p:sp>
-        <p:nvSpPr>
-          <p:cNvPr id="69" name="Obdélník 68"/>
-          <p:cNvSpPr/>
-          <p:nvPr/>
-        </p:nvSpPr>
-        <p:spPr>
-          <a:xfrm>
-            <a:off x="1765820" y="515572"/>
-            <a:ext cx="9994380" cy="5961428"/>
-          </a:xfrm>
-          <a:prstGeom prst="rect">
-            <a:avLst/>
-          </a:prstGeom>
-          <a:noFill/>
-          <a:ln w="31750">
-            <a:solidFill>
-              <a:schemeClr val="tx1"/>
-            </a:solidFill>
-            <a:prstDash val="dash"/>
-          </a:ln>
-        </p:spPr>
-        <p:style>
-          <a:lnRef idx="2">
-            <a:schemeClr val="accent1">
-              <a:shade val="50000"/>
-            </a:schemeClr>
-          </a:lnRef>
-          <a:fillRef idx="1">
-            <a:schemeClr val="accent1"/>
-          </a:fillRef>
-          <a:effectRef idx="0">
-            <a:schemeClr val="accent1"/>
-          </a:effectRef>
-          <a:fontRef idx="minor">
-            <a:schemeClr val="lt1"/>
-          </a:fontRef>
-        </p:style>
-        <p:txBody>
-          <a:bodyPr rtlCol="0" anchor="ctr"/>
-          <a:lstStyle/>
-          <a:p>
-            <a:pPr algn="ctr"/>
-            <a:endParaRPr lang="cs-CZ" dirty="0"/>
-          </a:p>
-        </p:txBody>
-      </p:sp>
-      <p:sp>
-        <p:nvSpPr>
-          <p:cNvPr id="79" name="Obdélník 78"/>
-          <p:cNvSpPr/>
-          <p:nvPr/>
-        </p:nvSpPr>
-        <p:spPr>
-          <a:xfrm>
-            <a:off x="9225944" y="1082154"/>
-            <a:ext cx="2017512" cy="1157654"/>
-          </a:xfrm>
-          <a:prstGeom prst="rect">
-            <a:avLst/>
-          </a:prstGeom>
-          <a:solidFill>
-            <a:schemeClr val="tx2">
-              <a:lumMod val="50000"/>
-            </a:schemeClr>
-          </a:solidFill>
-          <a:ln w="25400" cap="flat" cmpd="sng" algn="ctr">
-            <a:solidFill>
-              <a:schemeClr val="dk1"/>
-            </a:solidFill>
-            <a:prstDash val="solid"/>
-            <a:round/>
-            <a:headEnd type="none" w="med" len="med"/>
-            <a:tailEnd type="none" w="med" len="med"/>
-          </a:ln>
-        </p:spPr>
-        <p:style>
-          <a:lnRef idx="0">
-            <a:scrgbClr r="0" g="0" b="0"/>
-          </a:lnRef>
-          <a:fillRef idx="0">
-            <a:scrgbClr r="0" g="0" b="0"/>
-          </a:fillRef>
-          <a:effectRef idx="0">
-            <a:scrgbClr r="0" g="0" b="0"/>
-          </a:effectRef>
-          <a:fontRef idx="minor">
-            <a:schemeClr val="dk1"/>
-          </a:fontRef>
-        </p:style>
-        <p:txBody>
-          <a:bodyPr rtlCol="0" anchor="ctr"/>
-          <a:lstStyle/>
-          <a:p>
-            <a:pPr algn="ctr"/>
-            <a:r>
-              <a:rPr lang="cs-CZ" dirty="0" smtClean="0">
-                <a:solidFill>
-                  <a:schemeClr val="bg1"/>
-                </a:solidFill>
-              </a:rPr>
-              <a:t>Laptop</a:t>
-            </a:r>
-            <a:endParaRPr lang="cs-CZ" dirty="0">
-              <a:solidFill>
-                <a:schemeClr val="bg1"/>
-              </a:solidFill>
-            </a:endParaRPr>
-          </a:p>
-        </p:txBody>
-      </p:sp>
-      <p:sp>
-        <p:nvSpPr>
-          <p:cNvPr id="80" name="Obdélník 79"/>
-          <p:cNvSpPr/>
-          <p:nvPr/>
-        </p:nvSpPr>
-        <p:spPr>
-          <a:xfrm>
-            <a:off x="9225944" y="2514289"/>
-            <a:ext cx="2017512" cy="487883"/>
-          </a:xfrm>
-          <a:prstGeom prst="rect">
-            <a:avLst/>
-          </a:prstGeom>
-          <a:solidFill>
-            <a:schemeClr val="tx1">
-              <a:lumMod val="65000"/>
-              <a:lumOff val="35000"/>
-            </a:schemeClr>
-          </a:solidFill>
-          <a:ln w="15875" cap="flat" cmpd="sng" algn="ctr">
-            <a:solidFill>
-              <a:schemeClr val="dk1"/>
-            </a:solidFill>
-            <a:prstDash val="solid"/>
-            <a:round/>
-            <a:headEnd type="none" w="med" len="med"/>
-            <a:tailEnd type="none" w="med" len="med"/>
-          </a:ln>
-        </p:spPr>
-        <p:style>
-          <a:lnRef idx="0">
-            <a:scrgbClr r="0" g="0" b="0"/>
-          </a:lnRef>
-          <a:fillRef idx="0">
-            <a:scrgbClr r="0" g="0" b="0"/>
-          </a:fillRef>
-          <a:effectRef idx="0">
-            <a:scrgbClr r="0" g="0" b="0"/>
-          </a:effectRef>
-          <a:fontRef idx="minor">
-            <a:schemeClr val="dk1"/>
-          </a:fontRef>
-        </p:style>
-        <p:txBody>
-          <a:bodyPr rtlCol="0" anchor="ctr"/>
-          <a:lstStyle/>
-          <a:p>
-            <a:pPr algn="ctr"/>
-            <a:r>
-              <a:rPr lang="cs-CZ" dirty="0" smtClean="0">
-                <a:solidFill>
-                  <a:schemeClr val="bg1"/>
-                </a:solidFill>
-              </a:rPr>
-              <a:t>Display</a:t>
-            </a:r>
-          </a:p>
-        </p:txBody>
-      </p:sp>
-      <p:cxnSp>
-        <p:nvCxnSpPr>
-          <p:cNvPr id="81" name="Přímá spojnice 80"/>
-          <p:cNvCxnSpPr>
-            <a:stCxn id="80" idx="0"/>
-            <a:endCxn id="79" idx="2"/>
-          </p:cNvCxnSpPr>
-          <p:nvPr/>
-        </p:nvCxnSpPr>
-        <p:spPr>
-          <a:xfrm flipV="1">
-            <a:off x="10234700" y="2239808"/>
-            <a:ext cx="0" cy="274481"/>
-          </a:xfrm>
-          <a:prstGeom prst="line">
-            <a:avLst/>
-          </a:prstGeom>
-          <a:ln>
-            <a:solidFill>
-              <a:schemeClr val="tx1"/>
-            </a:solidFill>
-          </a:ln>
-        </p:spPr>
-        <p:style>
-          <a:lnRef idx="1">
-            <a:schemeClr val="accent1"/>
-          </a:lnRef>
-          <a:fillRef idx="0">
-            <a:schemeClr val="accent1"/>
-          </a:fillRef>
-          <a:effectRef idx="0">
-            <a:schemeClr val="accent1"/>
-          </a:effectRef>
-          <a:fontRef idx="minor">
-            <a:schemeClr val="tx1"/>
-          </a:fontRef>
-        </p:style>
-      </p:cxnSp>
-      <p:sp>
-        <p:nvSpPr>
-          <p:cNvPr id="82" name="Obdélník 81"/>
-          <p:cNvSpPr/>
-          <p:nvPr/>
-        </p:nvSpPr>
-        <p:spPr>
-          <a:xfrm>
-            <a:off x="9225944" y="3002172"/>
-            <a:ext cx="2017512" cy="487883"/>
-          </a:xfrm>
-          <a:prstGeom prst="rect">
-            <a:avLst/>
-          </a:prstGeom>
-          <a:solidFill>
-            <a:schemeClr val="tx1">
-              <a:lumMod val="65000"/>
-              <a:lumOff val="35000"/>
-            </a:schemeClr>
-          </a:solidFill>
-          <a:ln w="15875" cap="flat" cmpd="sng" algn="ctr">
-            <a:solidFill>
-              <a:schemeClr val="dk1"/>
-            </a:solidFill>
-            <a:prstDash val="solid"/>
-            <a:round/>
-            <a:headEnd type="none" w="med" len="med"/>
-            <a:tailEnd type="none" w="med" len="med"/>
-          </a:ln>
-        </p:spPr>
-        <p:style>
-          <a:lnRef idx="0">
-            <a:scrgbClr r="0" g="0" b="0"/>
-          </a:lnRef>
-          <a:fillRef idx="0">
-            <a:scrgbClr r="0" g="0" b="0"/>
-          </a:fillRef>
-          <a:effectRef idx="0">
-            <a:scrgbClr r="0" g="0" b="0"/>
-          </a:effectRef>
-          <a:fontRef idx="minor">
-            <a:schemeClr val="dk1"/>
-          </a:fontRef>
-        </p:style>
-        <p:txBody>
-          <a:bodyPr rtlCol="0" anchor="ctr"/>
-          <a:lstStyle/>
-          <a:p>
-            <a:pPr algn="ctr"/>
-            <a:r>
-              <a:rPr lang="cs-CZ" dirty="0" smtClean="0">
-                <a:solidFill>
-                  <a:schemeClr val="bg1"/>
-                </a:solidFill>
-              </a:rPr>
-              <a:t>CPU</a:t>
-            </a:r>
-          </a:p>
-        </p:txBody>
-      </p:sp>
-      <p:sp>
-        <p:nvSpPr>
-          <p:cNvPr id="84" name="Obdélník 83"/>
-          <p:cNvSpPr/>
-          <p:nvPr/>
-        </p:nvSpPr>
-        <p:spPr>
-          <a:xfrm>
-            <a:off x="9225944" y="3482327"/>
-            <a:ext cx="2017512" cy="487883"/>
-          </a:xfrm>
-          <a:prstGeom prst="rect">
-            <a:avLst/>
-          </a:prstGeom>
-          <a:solidFill>
-            <a:schemeClr val="tx1">
-              <a:lumMod val="65000"/>
-              <a:lumOff val="35000"/>
-            </a:schemeClr>
-          </a:solidFill>
-          <a:ln w="15875" cap="flat" cmpd="sng" algn="ctr">
-            <a:solidFill>
-              <a:schemeClr val="dk1"/>
-            </a:solidFill>
-            <a:prstDash val="solid"/>
-            <a:round/>
-            <a:headEnd type="none" w="med" len="med"/>
-            <a:tailEnd type="none" w="med" len="med"/>
-          </a:ln>
-        </p:spPr>
-        <p:style>
-          <a:lnRef idx="0">
-            <a:scrgbClr r="0" g="0" b="0"/>
-          </a:lnRef>
-          <a:fillRef idx="0">
-            <a:scrgbClr r="0" g="0" b="0"/>
-          </a:fillRef>
-          <a:effectRef idx="0">
-            <a:scrgbClr r="0" g="0" b="0"/>
-          </a:effectRef>
-          <a:fontRef idx="minor">
-            <a:schemeClr val="dk1"/>
-          </a:fontRef>
-        </p:style>
-        <p:txBody>
-          <a:bodyPr rtlCol="0" anchor="ctr"/>
-          <a:lstStyle/>
-          <a:p>
-            <a:pPr algn="ctr"/>
-            <a:r>
-              <a:rPr lang="cs-CZ" dirty="0" smtClean="0">
-                <a:solidFill>
-                  <a:schemeClr val="bg1"/>
-                </a:solidFill>
-              </a:rPr>
-              <a:t>HDD</a:t>
-            </a:r>
-          </a:p>
-        </p:txBody>
-      </p:sp>
-      <p:sp>
-        <p:nvSpPr>
-          <p:cNvPr id="85" name="Obdélník 84"/>
-          <p:cNvSpPr/>
-          <p:nvPr/>
-        </p:nvSpPr>
-        <p:spPr>
-          <a:xfrm>
-            <a:off x="9225944" y="3962482"/>
-            <a:ext cx="2017512" cy="487883"/>
-          </a:xfrm>
-          <a:prstGeom prst="rect">
-            <a:avLst/>
-          </a:prstGeom>
-          <a:solidFill>
-            <a:schemeClr val="tx1">
-              <a:lumMod val="65000"/>
-              <a:lumOff val="35000"/>
-            </a:schemeClr>
-          </a:solidFill>
-          <a:ln w="15875" cap="flat" cmpd="sng" algn="ctr">
-            <a:solidFill>
-              <a:schemeClr val="dk1"/>
-            </a:solidFill>
-            <a:prstDash val="solid"/>
-            <a:round/>
-            <a:headEnd type="none" w="med" len="med"/>
-            <a:tailEnd type="none" w="med" len="med"/>
-          </a:ln>
-        </p:spPr>
-        <p:style>
-          <a:lnRef idx="0">
-            <a:scrgbClr r="0" g="0" b="0"/>
-          </a:lnRef>
-          <a:fillRef idx="0">
-            <a:scrgbClr r="0" g="0" b="0"/>
-          </a:fillRef>
-          <a:effectRef idx="0">
-            <a:scrgbClr r="0" g="0" b="0"/>
-          </a:effectRef>
-          <a:fontRef idx="minor">
-            <a:schemeClr val="dk1"/>
-          </a:fontRef>
-        </p:style>
-        <p:txBody>
-          <a:bodyPr rtlCol="0" anchor="ctr"/>
-          <a:lstStyle/>
-          <a:p>
-            <a:pPr algn="ctr"/>
-            <a:r>
-              <a:rPr lang="cs-CZ" dirty="0" smtClean="0">
-                <a:solidFill>
-                  <a:schemeClr val="bg1"/>
-                </a:solidFill>
-              </a:rPr>
-              <a:t>RAM</a:t>
-            </a:r>
-          </a:p>
-        </p:txBody>
-      </p:sp>
-      <p:sp>
-        <p:nvSpPr>
-          <p:cNvPr id="86" name="Obdélník 85"/>
-          <p:cNvSpPr/>
-          <p:nvPr/>
-        </p:nvSpPr>
-        <p:spPr>
-          <a:xfrm>
-            <a:off x="9228960" y="4442637"/>
-            <a:ext cx="2017512" cy="487883"/>
-          </a:xfrm>
-          <a:prstGeom prst="rect">
-            <a:avLst/>
-          </a:prstGeom>
-          <a:solidFill>
-            <a:schemeClr val="tx1">
-              <a:lumMod val="65000"/>
-              <a:lumOff val="35000"/>
-            </a:schemeClr>
-          </a:solidFill>
-          <a:ln w="15875" cap="flat" cmpd="sng" algn="ctr">
-            <a:solidFill>
-              <a:schemeClr val="dk1"/>
-            </a:solidFill>
-            <a:prstDash val="solid"/>
-            <a:round/>
-            <a:headEnd type="none" w="med" len="med"/>
-            <a:tailEnd type="none" w="med" len="med"/>
-          </a:ln>
-        </p:spPr>
-        <p:style>
-          <a:lnRef idx="0">
-            <a:scrgbClr r="0" g="0" b="0"/>
-          </a:lnRef>
-          <a:fillRef idx="0">
-            <a:scrgbClr r="0" g="0" b="0"/>
-          </a:fillRef>
-          <a:effectRef idx="0">
-            <a:scrgbClr r="0" g="0" b="0"/>
-          </a:effectRef>
-          <a:fontRef idx="minor">
-            <a:schemeClr val="dk1"/>
-          </a:fontRef>
-        </p:style>
-        <p:txBody>
-          <a:bodyPr rtlCol="0" anchor="ctr"/>
-          <a:lstStyle/>
-          <a:p>
-            <a:pPr algn="ctr"/>
-            <a:r>
-              <a:rPr lang="cs-CZ" dirty="0" smtClean="0">
-                <a:solidFill>
-                  <a:schemeClr val="bg1"/>
-                </a:solidFill>
-              </a:rPr>
-              <a:t>OS</a:t>
-            </a:r>
-          </a:p>
-        </p:txBody>
-      </p:sp>
-      <p:sp>
-        <p:nvSpPr>
-          <p:cNvPr id="87" name="TextovéPole 86"/>
-          <p:cNvSpPr txBox="1"/>
-          <p:nvPr/>
-        </p:nvSpPr>
-        <p:spPr>
-          <a:xfrm>
-            <a:off x="10063018" y="5064626"/>
-            <a:ext cx="343364" cy="923330"/>
-          </a:xfrm>
-          <a:prstGeom prst="rect">
-            <a:avLst/>
-          </a:prstGeom>
-          <a:noFill/>
-        </p:spPr>
-        <p:txBody>
-          <a:bodyPr wrap="none" rtlCol="0">
-            <a:spAutoFit/>
-          </a:bodyPr>
-          <a:lstStyle/>
-          <a:p>
-            <a:r>
-              <a:rPr lang="cs-CZ" dirty="0" smtClean="0"/>
-              <a:t>…</a:t>
-            </a:r>
-          </a:p>
-          <a:p>
-            <a:r>
-              <a:rPr lang="cs-CZ" dirty="0" smtClean="0"/>
-              <a:t>…</a:t>
-            </a:r>
-          </a:p>
-          <a:p>
-            <a:r>
-              <a:rPr lang="cs-CZ" dirty="0" smtClean="0"/>
-              <a:t>…</a:t>
-            </a:r>
-          </a:p>
-        </p:txBody>
-      </p:sp>
-      <p:cxnSp>
-        <p:nvCxnSpPr>
-          <p:cNvPr id="88" name="Přímá spojnice 87"/>
-          <p:cNvCxnSpPr>
-            <a:stCxn id="79" idx="1"/>
-            <a:endCxn id="59" idx="3"/>
-          </p:cNvCxnSpPr>
-          <p:nvPr/>
-        </p:nvCxnSpPr>
-        <p:spPr>
           <a:xfrm flipH="1">
-            <a:off x="7845277" y="1660981"/>
-            <a:ext cx="1380667" cy="0"/>
-          </a:xfrm>
-          <a:prstGeom prst="line">
-            <a:avLst/>
-          </a:prstGeom>
-          <a:ln w="19050">
-            <a:solidFill>
-              <a:schemeClr val="tx1"/>
-            </a:solidFill>
-          </a:ln>
-        </p:spPr>
-        <p:style>
-          <a:lnRef idx="1">
-            <a:schemeClr val="accent1"/>
-          </a:lnRef>
-          <a:fillRef idx="0">
-            <a:schemeClr val="accent1"/>
-          </a:fillRef>
-          <a:effectRef idx="0">
-            <a:schemeClr val="accent1"/>
-          </a:effectRef>
-          <a:fontRef idx="minor">
-            <a:schemeClr val="tx1"/>
-          </a:fontRef>
-        </p:style>
-      </p:cxnSp>
-      <p:cxnSp>
-        <p:nvCxnSpPr>
-          <p:cNvPr id="89" name="Přímá spojnice 88"/>
-          <p:cNvCxnSpPr>
-            <a:stCxn id="59" idx="1"/>
-            <a:endCxn id="55" idx="3"/>
-          </p:cNvCxnSpPr>
-          <p:nvPr/>
-        </p:nvCxnSpPr>
-        <p:spPr>
-          <a:xfrm flipH="1">
-            <a:off x="4323456" y="1660981"/>
-            <a:ext cx="1504309" cy="0"/>
-          </a:xfrm>
-          <a:prstGeom prst="line">
+            <a:off x="0" y="5794629"/>
+            <a:ext cx="2305944" cy="0"/>
+          </a:xfrm>
+          <a:prstGeom prst="straightConnector1">
             <a:avLst/>
           </a:prstGeom>
           <a:ln w="47625">
             <a:solidFill>
               <a:schemeClr val="tx1"/>
             </a:solidFill>
-          </a:ln>
-        </p:spPr>
-        <p:style>
-          <a:lnRef idx="1">
-            <a:schemeClr val="accent1"/>
-          </a:lnRef>
-          <a:fillRef idx="0">
-            <a:schemeClr val="accent1"/>
-          </a:fillRef>
-          <a:effectRef idx="0">
-            <a:schemeClr val="accent1"/>
-          </a:effectRef>
-          <a:fontRef idx="minor">
-            <a:schemeClr val="tx1"/>
-          </a:fontRef>
-        </p:style>
-      </p:cxnSp>
-      <p:cxnSp>
-        <p:nvCxnSpPr>
-          <p:cNvPr id="90" name="Přímá spojnice 89"/>
-          <p:cNvCxnSpPr/>
-          <p:nvPr/>
-        </p:nvCxnSpPr>
-        <p:spPr>
-          <a:xfrm flipH="1">
-            <a:off x="0" y="1660981"/>
-            <a:ext cx="2305945" cy="0"/>
-          </a:xfrm>
-          <a:prstGeom prst="line">
-            <a:avLst/>
-          </a:prstGeom>
-          <a:ln w="47625">
-            <a:solidFill>
-              <a:schemeClr val="tx1"/>
-            </a:solidFill>
+            <a:tailEnd type="triangle"/>
           </a:ln>
         </p:spPr>
         <p:style>

</xml_diff>

<commit_message>
Added Speak in PDF
</commit_message>
<xml_diff>
--- a/Presentation/Presentation.pptx
+++ b/Presentation/Presentation.pptx
@@ -11606,11 +11606,6 @@
               </a:rPr>
               <a:t>Instead of trigger</a:t>
             </a:r>
-            <a:endParaRPr lang="cs-CZ" dirty="0" smtClean="0">
-              <a:solidFill>
-                <a:schemeClr val="bg1"/>
-              </a:solidFill>
-            </a:endParaRPr>
           </a:p>
         </p:txBody>
       </p:sp>
@@ -11709,11 +11704,6 @@
               </a:rPr>
               <a:t>Linker</a:t>
             </a:r>
-            <a:endParaRPr lang="cs-CZ" dirty="0" smtClean="0">
-              <a:solidFill>
-                <a:schemeClr val="bg1"/>
-              </a:solidFill>
-            </a:endParaRPr>
           </a:p>
         </p:txBody>
       </p:sp>
@@ -11774,11 +11764,6 @@
               </a:rPr>
               <a:t>Consistency</a:t>
             </a:r>
-            <a:endParaRPr lang="cs-CZ" dirty="0" smtClean="0">
-              <a:solidFill>
-                <a:schemeClr val="bg1"/>
-              </a:solidFill>
-            </a:endParaRPr>
           </a:p>
         </p:txBody>
       </p:sp>
@@ -11876,11 +11861,6 @@
               </a:rPr>
               <a:t>Return result</a:t>
             </a:r>
-            <a:endParaRPr lang="cs-CZ" dirty="0" smtClean="0">
-              <a:solidFill>
-                <a:schemeClr val="bg1"/>
-              </a:solidFill>
-            </a:endParaRPr>
           </a:p>
         </p:txBody>
       </p:sp>

</xml_diff>

<commit_message>
Updated Presentation Text About Database Insert
</commit_message>
<xml_diff>
--- a/Presentation/Presentation.pptx
+++ b/Presentation/Presentation.pptx
@@ -238,7 +238,7 @@
           <a:p>
             <a:fld id="{2610D134-D424-48DC-B576-06513DB14862}" type="datetimeFigureOut">
               <a:rPr lang="cs-CZ" smtClean="0"/>
-              <a:t>13.05.2017</a:t>
+              <a:t>16.05.2017</a:t>
             </a:fld>
             <a:endParaRPr lang="cs-CZ" dirty="0"/>
           </a:p>
@@ -2128,7 +2128,15 @@
           <a:p>
             <a:r>
               <a:rPr lang="cs-CZ" baseline="0" dirty="0" smtClean="0"/>
-              <a:t>Práce s daty je řešena v databázi. Přístup do databáze zastřešuje pohled, který pracuje se dvěma funkcemi. První je Linker, který propojuje jednotlivé tabulky do jedné. Druhou je Consistency, která zjišťuje konzistence jednotlivých notebooků a to přes zjištění počtu unikátních prvků. Pokud je počet větší než 1, není konzistentní. Vkládání dat probíhá přes instead of trigger na pohledu, kterému se předají údaje a ten podle nich buď přidá nový notebook, nebo nepřidá v případě, pokud již notebook v databázi existuje. Pro navrácení výsledku importu byla vytvořena </a:t>
+              <a:t>Práce s daty je řešena v databázi. Přístup do databáze zastřešuje pohled, který pracuje se dvěma funkcemi. První je Linker, který propojuje jednotlivé tabulky do jedné. Druhou je Consistency, která zjišťuje konzistence jednotlivých notebooků a to přes zjištění počtu unikátních prvků. Pokud je počet větší než 1, není konzistentní. Vkládání dat probíhá přes instead of trigger na pohledu, kterému se předají údaje a ten podle nich </a:t>
+            </a:r>
+            <a:r>
+              <a:rPr lang="cs-CZ" baseline="0" dirty="0" smtClean="0"/>
+              <a:t>buď přidá nový notebook, nebo přidá pouze nekonzistentní data, pokud již notebook v databázi existuje. </a:t>
+            </a:r>
+            <a:r>
+              <a:rPr lang="cs-CZ" baseline="0" dirty="0" smtClean="0"/>
+              <a:t>Pro navrácení výsledku importu byla vytvořena </a:t>
             </a:r>
             <a:r>
               <a:rPr lang="cs-CZ" baseline="0" dirty="0" err="1" smtClean="0"/>
@@ -2520,7 +2528,7 @@
           <a:p>
             <a:fld id="{6695D279-B01E-4739-A6F2-6A2DE81A62F9}" type="datetimeFigureOut">
               <a:rPr lang="cs-CZ" smtClean="0"/>
-              <a:t>13.05.2017</a:t>
+              <a:t>16.05.2017</a:t>
             </a:fld>
             <a:endParaRPr lang="cs-CZ" dirty="0"/>
           </a:p>
@@ -2702,7 +2710,7 @@
           <a:p>
             <a:fld id="{6695D279-B01E-4739-A6F2-6A2DE81A62F9}" type="datetimeFigureOut">
               <a:rPr lang="cs-CZ" smtClean="0"/>
-              <a:t>13.05.2017</a:t>
+              <a:t>16.05.2017</a:t>
             </a:fld>
             <a:endParaRPr lang="cs-CZ" dirty="0"/>
           </a:p>
@@ -2894,7 +2902,7 @@
           <a:p>
             <a:fld id="{6695D279-B01E-4739-A6F2-6A2DE81A62F9}" type="datetimeFigureOut">
               <a:rPr lang="cs-CZ" smtClean="0"/>
-              <a:t>13.05.2017</a:t>
+              <a:t>16.05.2017</a:t>
             </a:fld>
             <a:endParaRPr lang="cs-CZ" dirty="0"/>
           </a:p>
@@ -3076,7 +3084,7 @@
           <a:p>
             <a:fld id="{6695D279-B01E-4739-A6F2-6A2DE81A62F9}" type="datetimeFigureOut">
               <a:rPr lang="cs-CZ" smtClean="0"/>
-              <a:t>13.05.2017</a:t>
+              <a:t>16.05.2017</a:t>
             </a:fld>
             <a:endParaRPr lang="cs-CZ" dirty="0"/>
           </a:p>
@@ -3334,7 +3342,7 @@
           <a:p>
             <a:fld id="{6695D279-B01E-4739-A6F2-6A2DE81A62F9}" type="datetimeFigureOut">
               <a:rPr lang="cs-CZ" smtClean="0"/>
-              <a:t>13.05.2017</a:t>
+              <a:t>16.05.2017</a:t>
             </a:fld>
             <a:endParaRPr lang="cs-CZ" dirty="0"/>
           </a:p>
@@ -3578,7 +3586,7 @@
           <a:p>
             <a:fld id="{6695D279-B01E-4739-A6F2-6A2DE81A62F9}" type="datetimeFigureOut">
               <a:rPr lang="cs-CZ" smtClean="0"/>
-              <a:t>13.05.2017</a:t>
+              <a:t>16.05.2017</a:t>
             </a:fld>
             <a:endParaRPr lang="cs-CZ" dirty="0"/>
           </a:p>
@@ -3957,7 +3965,7 @@
           <a:p>
             <a:fld id="{6695D279-B01E-4739-A6F2-6A2DE81A62F9}" type="datetimeFigureOut">
               <a:rPr lang="cs-CZ" smtClean="0"/>
-              <a:t>13.05.2017</a:t>
+              <a:t>16.05.2017</a:t>
             </a:fld>
             <a:endParaRPr lang="cs-CZ" dirty="0"/>
           </a:p>
@@ -4087,7 +4095,7 @@
           <a:p>
             <a:fld id="{6695D279-B01E-4739-A6F2-6A2DE81A62F9}" type="datetimeFigureOut">
               <a:rPr lang="cs-CZ" smtClean="0"/>
-              <a:t>13.05.2017</a:t>
+              <a:t>16.05.2017</a:t>
             </a:fld>
             <a:endParaRPr lang="cs-CZ" dirty="0"/>
           </a:p>
@@ -4194,7 +4202,7 @@
           <a:p>
             <a:fld id="{6695D279-B01E-4739-A6F2-6A2DE81A62F9}" type="datetimeFigureOut">
               <a:rPr lang="cs-CZ" smtClean="0"/>
-              <a:t>13.05.2017</a:t>
+              <a:t>16.05.2017</a:t>
             </a:fld>
             <a:endParaRPr lang="cs-CZ" dirty="0"/>
           </a:p>
@@ -4483,7 +4491,7 @@
           <a:p>
             <a:fld id="{6695D279-B01E-4739-A6F2-6A2DE81A62F9}" type="datetimeFigureOut">
               <a:rPr lang="cs-CZ" smtClean="0"/>
-              <a:t>13.05.2017</a:t>
+              <a:t>16.05.2017</a:t>
             </a:fld>
             <a:endParaRPr lang="cs-CZ" dirty="0"/>
           </a:p>
@@ -4748,7 +4756,7 @@
           <a:p>
             <a:fld id="{6695D279-B01E-4739-A6F2-6A2DE81A62F9}" type="datetimeFigureOut">
               <a:rPr lang="cs-CZ" smtClean="0"/>
-              <a:t>13.05.2017</a:t>
+              <a:t>16.05.2017</a:t>
             </a:fld>
             <a:endParaRPr lang="cs-CZ" dirty="0"/>
           </a:p>
@@ -4973,7 +4981,7 @@
           <a:p>
             <a:fld id="{6695D279-B01E-4739-A6F2-6A2DE81A62F9}" type="datetimeFigureOut">
               <a:rPr lang="cs-CZ" smtClean="0"/>
-              <a:t>13.05.2017</a:t>
+              <a:t>16.05.2017</a:t>
             </a:fld>
             <a:endParaRPr lang="cs-CZ" dirty="0"/>
           </a:p>

</xml_diff>